<commit_message>
[Feature] Described the working of Jarnik
</commit_message>
<xml_diff>
--- a/output-presentation.pptx
+++ b/output-presentation.pptx
@@ -5,31 +5,33 @@
     <p:sldMasterId id="2147483761" r:id="rId1"/>
   </p:sldMasterIdLst>
   <p:notesMasterIdLst>
-    <p:notesMasterId r:id="rId24"/>
+    <p:notesMasterId r:id="rId26"/>
   </p:notesMasterIdLst>
   <p:sldIdLst>
     <p:sldId id="256" r:id="rId2"/>
     <p:sldId id="257" r:id="rId3"/>
     <p:sldId id="258" r:id="rId4"/>
     <p:sldId id="259" r:id="rId5"/>
-    <p:sldId id="260" r:id="rId6"/>
-    <p:sldId id="261" r:id="rId7"/>
-    <p:sldId id="262" r:id="rId8"/>
-    <p:sldId id="264" r:id="rId9"/>
-    <p:sldId id="265" r:id="rId10"/>
-    <p:sldId id="267" r:id="rId11"/>
-    <p:sldId id="268" r:id="rId12"/>
-    <p:sldId id="269" r:id="rId13"/>
-    <p:sldId id="271" r:id="rId14"/>
-    <p:sldId id="273" r:id="rId15"/>
-    <p:sldId id="274" r:id="rId16"/>
-    <p:sldId id="275" r:id="rId17"/>
-    <p:sldId id="276" r:id="rId18"/>
-    <p:sldId id="277" r:id="rId19"/>
-    <p:sldId id="278" r:id="rId20"/>
-    <p:sldId id="279" r:id="rId21"/>
-    <p:sldId id="280" r:id="rId22"/>
-    <p:sldId id="281" r:id="rId23"/>
+    <p:sldId id="282" r:id="rId6"/>
+    <p:sldId id="260" r:id="rId7"/>
+    <p:sldId id="261" r:id="rId8"/>
+    <p:sldId id="262" r:id="rId9"/>
+    <p:sldId id="283" r:id="rId10"/>
+    <p:sldId id="264" r:id="rId11"/>
+    <p:sldId id="265" r:id="rId12"/>
+    <p:sldId id="267" r:id="rId13"/>
+    <p:sldId id="268" r:id="rId14"/>
+    <p:sldId id="269" r:id="rId15"/>
+    <p:sldId id="271" r:id="rId16"/>
+    <p:sldId id="273" r:id="rId17"/>
+    <p:sldId id="274" r:id="rId18"/>
+    <p:sldId id="275" r:id="rId19"/>
+    <p:sldId id="276" r:id="rId20"/>
+    <p:sldId id="277" r:id="rId21"/>
+    <p:sldId id="278" r:id="rId22"/>
+    <p:sldId id="279" r:id="rId23"/>
+    <p:sldId id="280" r:id="rId24"/>
+    <p:sldId id="281" r:id="rId25"/>
   </p:sldIdLst>
   <p:sldSz cx="12192000" cy="6858000"/>
   <p:notesSz cx="6858000" cy="9144000"/>
@@ -218,7 +220,7 @@
           <a:p>
             <a:fld id="{B20F7C0A-6886-490A-B1E4-0E503B574F77}" type="datetimeFigureOut">
               <a:rPr lang="cs-CZ" smtClean="0"/>
-              <a:t>13.04.2023</a:t>
+              <a:t>24.04.2023</a:t>
             </a:fld>
             <a:endParaRPr lang="cs-CZ"/>
           </a:p>
@@ -643,7 +645,7 @@
     </p:spTree>
     <p:extLst>
       <p:ext uri="{BB962C8B-B14F-4D97-AF65-F5344CB8AC3E}">
-        <p14:creationId xmlns:p14="http://schemas.microsoft.com/office/powerpoint/2010/main" val="3367930030"/>
+        <p14:creationId xmlns:p14="http://schemas.microsoft.com/office/powerpoint/2010/main" val="3259443989"/>
       </p:ext>
     </p:extLst>
   </p:cSld>
@@ -727,7 +729,7 @@
     </p:spTree>
     <p:extLst>
       <p:ext uri="{BB962C8B-B14F-4D97-AF65-F5344CB8AC3E}">
-        <p14:creationId xmlns:p14="http://schemas.microsoft.com/office/powerpoint/2010/main" val="3128011289"/>
+        <p14:creationId xmlns:p14="http://schemas.microsoft.com/office/powerpoint/2010/main" val="1292418824"/>
       </p:ext>
     </p:extLst>
   </p:cSld>
@@ -811,7 +813,7 @@
     </p:spTree>
     <p:extLst>
       <p:ext uri="{BB962C8B-B14F-4D97-AF65-F5344CB8AC3E}">
-        <p14:creationId xmlns:p14="http://schemas.microsoft.com/office/powerpoint/2010/main" val="4158966156"/>
+        <p14:creationId xmlns:p14="http://schemas.microsoft.com/office/powerpoint/2010/main" val="3367930030"/>
       </p:ext>
     </p:extLst>
   </p:cSld>
@@ -895,7 +897,7 @@
     </p:spTree>
     <p:extLst>
       <p:ext uri="{BB962C8B-B14F-4D97-AF65-F5344CB8AC3E}">
-        <p14:creationId xmlns:p14="http://schemas.microsoft.com/office/powerpoint/2010/main" val="203438188"/>
+        <p14:creationId xmlns:p14="http://schemas.microsoft.com/office/powerpoint/2010/main" val="3128011289"/>
       </p:ext>
     </p:extLst>
   </p:cSld>
@@ -979,7 +981,7 @@
     </p:spTree>
     <p:extLst>
       <p:ext uri="{BB962C8B-B14F-4D97-AF65-F5344CB8AC3E}">
-        <p14:creationId xmlns:p14="http://schemas.microsoft.com/office/powerpoint/2010/main" val="316095354"/>
+        <p14:creationId xmlns:p14="http://schemas.microsoft.com/office/powerpoint/2010/main" val="4158966156"/>
       </p:ext>
     </p:extLst>
   </p:cSld>
@@ -1054,7 +1056,7 @@
           <a:p>
             <a:fld id="{888E3A86-DC57-4CCA-AA0B-A5DE7CB3B517}" type="slidenum">
               <a:rPr lang="cs-CZ" smtClean="0"/>
-              <a:t>20</a:t>
+              <a:t>19</a:t>
             </a:fld>
             <a:endParaRPr lang="cs-CZ"/>
           </a:p>
@@ -1063,7 +1065,7 @@
     </p:spTree>
     <p:extLst>
       <p:ext uri="{BB962C8B-B14F-4D97-AF65-F5344CB8AC3E}">
-        <p14:creationId xmlns:p14="http://schemas.microsoft.com/office/powerpoint/2010/main" val="3784792062"/>
+        <p14:creationId xmlns:p14="http://schemas.microsoft.com/office/powerpoint/2010/main" val="203438188"/>
       </p:ext>
     </p:extLst>
   </p:cSld>
@@ -1138,7 +1140,175 @@
           <a:p>
             <a:fld id="{888E3A86-DC57-4CCA-AA0B-A5DE7CB3B517}" type="slidenum">
               <a:rPr lang="cs-CZ" smtClean="0"/>
+              <a:t>20</a:t>
+            </a:fld>
+            <a:endParaRPr lang="cs-CZ"/>
+          </a:p>
+        </p:txBody>
+      </p:sp>
+    </p:spTree>
+    <p:extLst>
+      <p:ext uri="{BB962C8B-B14F-4D97-AF65-F5344CB8AC3E}">
+        <p14:creationId xmlns:p14="http://schemas.microsoft.com/office/powerpoint/2010/main" val="316095354"/>
+      </p:ext>
+    </p:extLst>
+  </p:cSld>
+  <p:clrMapOvr>
+    <a:masterClrMapping/>
+  </p:clrMapOvr>
+</p:notes>
+</file>
+
+<file path=ppt/notesSlides/notesSlide17.xml><?xml version="1.0" encoding="utf-8"?>
+<p:notes xmlns:a="http://schemas.openxmlformats.org/drawingml/2006/main" xmlns:r="http://schemas.openxmlformats.org/officeDocument/2006/relationships" xmlns:p="http://schemas.openxmlformats.org/presentationml/2006/main">
+  <p:cSld>
+    <p:spTree>
+      <p:nvGrpSpPr>
+        <p:cNvPr id="1" name=""/>
+        <p:cNvGrpSpPr/>
+        <p:nvPr/>
+      </p:nvGrpSpPr>
+      <p:grpSpPr>
+        <a:xfrm>
+          <a:off x="0" y="0"/>
+          <a:ext cx="0" cy="0"/>
+          <a:chOff x="0" y="0"/>
+          <a:chExt cx="0" cy="0"/>
+        </a:xfrm>
+      </p:grpSpPr>
+      <p:sp>
+        <p:nvSpPr>
+          <p:cNvPr id="2" name="Zástupný symbol pro obrázek snímku 1"/>
+          <p:cNvSpPr>
+            <a:spLocks noGrp="1" noRot="1" noChangeAspect="1"/>
+          </p:cNvSpPr>
+          <p:nvPr>
+            <p:ph type="sldImg"/>
+          </p:nvPr>
+        </p:nvSpPr>
+        <p:spPr/>
+      </p:sp>
+      <p:sp>
+        <p:nvSpPr>
+          <p:cNvPr id="3" name="Zástupný symbol pro poznámky 2"/>
+          <p:cNvSpPr>
+            <a:spLocks noGrp="1"/>
+          </p:cNvSpPr>
+          <p:nvPr>
+            <p:ph type="body" idx="1"/>
+          </p:nvPr>
+        </p:nvSpPr>
+        <p:spPr/>
+        <p:txBody>
+          <a:bodyPr/>
+          <a:lstStyle/>
+          <a:p>
+            <a:endParaRPr lang="cs-CZ" dirty="0"/>
+          </a:p>
+        </p:txBody>
+      </p:sp>
+      <p:sp>
+        <p:nvSpPr>
+          <p:cNvPr id="4" name="Zástupný symbol pro číslo snímku 3"/>
+          <p:cNvSpPr>
+            <a:spLocks noGrp="1"/>
+          </p:cNvSpPr>
+          <p:nvPr>
+            <p:ph type="sldNum" sz="quarter" idx="5"/>
+          </p:nvPr>
+        </p:nvSpPr>
+        <p:spPr/>
+        <p:txBody>
+          <a:bodyPr/>
+          <a:lstStyle/>
+          <a:p>
+            <a:fld id="{888E3A86-DC57-4CCA-AA0B-A5DE7CB3B517}" type="slidenum">
+              <a:rPr lang="cs-CZ" smtClean="0"/>
               <a:t>22</a:t>
+            </a:fld>
+            <a:endParaRPr lang="cs-CZ"/>
+          </a:p>
+        </p:txBody>
+      </p:sp>
+    </p:spTree>
+    <p:extLst>
+      <p:ext uri="{BB962C8B-B14F-4D97-AF65-F5344CB8AC3E}">
+        <p14:creationId xmlns:p14="http://schemas.microsoft.com/office/powerpoint/2010/main" val="3784792062"/>
+      </p:ext>
+    </p:extLst>
+  </p:cSld>
+  <p:clrMapOvr>
+    <a:masterClrMapping/>
+  </p:clrMapOvr>
+</p:notes>
+</file>
+
+<file path=ppt/notesSlides/notesSlide18.xml><?xml version="1.0" encoding="utf-8"?>
+<p:notes xmlns:a="http://schemas.openxmlformats.org/drawingml/2006/main" xmlns:r="http://schemas.openxmlformats.org/officeDocument/2006/relationships" xmlns:p="http://schemas.openxmlformats.org/presentationml/2006/main">
+  <p:cSld>
+    <p:spTree>
+      <p:nvGrpSpPr>
+        <p:cNvPr id="1" name=""/>
+        <p:cNvGrpSpPr/>
+        <p:nvPr/>
+      </p:nvGrpSpPr>
+      <p:grpSpPr>
+        <a:xfrm>
+          <a:off x="0" y="0"/>
+          <a:ext cx="0" cy="0"/>
+          <a:chOff x="0" y="0"/>
+          <a:chExt cx="0" cy="0"/>
+        </a:xfrm>
+      </p:grpSpPr>
+      <p:sp>
+        <p:nvSpPr>
+          <p:cNvPr id="2" name="Zástupný symbol pro obrázek snímku 1"/>
+          <p:cNvSpPr>
+            <a:spLocks noGrp="1" noRot="1" noChangeAspect="1"/>
+          </p:cNvSpPr>
+          <p:nvPr>
+            <p:ph type="sldImg"/>
+          </p:nvPr>
+        </p:nvSpPr>
+        <p:spPr/>
+      </p:sp>
+      <p:sp>
+        <p:nvSpPr>
+          <p:cNvPr id="3" name="Zástupný symbol pro poznámky 2"/>
+          <p:cNvSpPr>
+            <a:spLocks noGrp="1"/>
+          </p:cNvSpPr>
+          <p:nvPr>
+            <p:ph type="body" idx="1"/>
+          </p:nvPr>
+        </p:nvSpPr>
+        <p:spPr/>
+        <p:txBody>
+          <a:bodyPr/>
+          <a:lstStyle/>
+          <a:p>
+            <a:endParaRPr lang="cs-CZ" dirty="0"/>
+          </a:p>
+        </p:txBody>
+      </p:sp>
+      <p:sp>
+        <p:nvSpPr>
+          <p:cNvPr id="4" name="Zástupný symbol pro číslo snímku 3"/>
+          <p:cNvSpPr>
+            <a:spLocks noGrp="1"/>
+          </p:cNvSpPr>
+          <p:nvPr>
+            <p:ph type="sldNum" sz="quarter" idx="5"/>
+          </p:nvPr>
+        </p:nvSpPr>
+        <p:spPr/>
+        <p:txBody>
+          <a:bodyPr/>
+          <a:lstStyle/>
+          <a:p>
+            <a:fld id="{888E3A86-DC57-4CCA-AA0B-A5DE7CB3B517}" type="slidenum">
+              <a:rPr lang="cs-CZ" smtClean="0"/>
+              <a:t>24</a:t>
             </a:fld>
             <a:endParaRPr lang="cs-CZ"/>
           </a:p>
@@ -1231,7 +1401,7 @@
     </p:spTree>
     <p:extLst>
       <p:ext uri="{BB962C8B-B14F-4D97-AF65-F5344CB8AC3E}">
-        <p14:creationId xmlns:p14="http://schemas.microsoft.com/office/powerpoint/2010/main" val="763689810"/>
+        <p14:creationId xmlns:p14="http://schemas.microsoft.com/office/powerpoint/2010/main" val="3340902595"/>
       </p:ext>
     </p:extLst>
   </p:cSld>
@@ -1306,7 +1476,7 @@
           <a:p>
             <a:fld id="{888E3A86-DC57-4CCA-AA0B-A5DE7CB3B517}" type="slidenum">
               <a:rPr lang="cs-CZ" smtClean="0"/>
-              <a:t>7</a:t>
+              <a:t>6</a:t>
             </a:fld>
             <a:endParaRPr lang="cs-CZ"/>
           </a:p>
@@ -1315,7 +1485,7 @@
     </p:spTree>
     <p:extLst>
       <p:ext uri="{BB962C8B-B14F-4D97-AF65-F5344CB8AC3E}">
-        <p14:creationId xmlns:p14="http://schemas.microsoft.com/office/powerpoint/2010/main" val="1280053993"/>
+        <p14:creationId xmlns:p14="http://schemas.microsoft.com/office/powerpoint/2010/main" val="763689810"/>
       </p:ext>
     </p:extLst>
   </p:cSld>
@@ -1399,7 +1569,7 @@
     </p:spTree>
     <p:extLst>
       <p:ext uri="{BB962C8B-B14F-4D97-AF65-F5344CB8AC3E}">
-        <p14:creationId xmlns:p14="http://schemas.microsoft.com/office/powerpoint/2010/main" val="300219515"/>
+        <p14:creationId xmlns:p14="http://schemas.microsoft.com/office/powerpoint/2010/main" val="1280053993"/>
       </p:ext>
     </p:extLst>
   </p:cSld>
@@ -1483,7 +1653,7 @@
     </p:spTree>
     <p:extLst>
       <p:ext uri="{BB962C8B-B14F-4D97-AF65-F5344CB8AC3E}">
-        <p14:creationId xmlns:p14="http://schemas.microsoft.com/office/powerpoint/2010/main" val="3436311921"/>
+        <p14:creationId xmlns:p14="http://schemas.microsoft.com/office/powerpoint/2010/main" val="915990675"/>
       </p:ext>
     </p:extLst>
   </p:cSld>
@@ -1567,7 +1737,7 @@
     </p:spTree>
     <p:extLst>
       <p:ext uri="{BB962C8B-B14F-4D97-AF65-F5344CB8AC3E}">
-        <p14:creationId xmlns:p14="http://schemas.microsoft.com/office/powerpoint/2010/main" val="1092438624"/>
+        <p14:creationId xmlns:p14="http://schemas.microsoft.com/office/powerpoint/2010/main" val="300219515"/>
       </p:ext>
     </p:extLst>
   </p:cSld>
@@ -1651,7 +1821,7 @@
     </p:spTree>
     <p:extLst>
       <p:ext uri="{BB962C8B-B14F-4D97-AF65-F5344CB8AC3E}">
-        <p14:creationId xmlns:p14="http://schemas.microsoft.com/office/powerpoint/2010/main" val="1411167505"/>
+        <p14:creationId xmlns:p14="http://schemas.microsoft.com/office/powerpoint/2010/main" val="3436311921"/>
       </p:ext>
     </p:extLst>
   </p:cSld>
@@ -1735,7 +1905,7 @@
     </p:spTree>
     <p:extLst>
       <p:ext uri="{BB962C8B-B14F-4D97-AF65-F5344CB8AC3E}">
-        <p14:creationId xmlns:p14="http://schemas.microsoft.com/office/powerpoint/2010/main" val="3259443989"/>
+        <p14:creationId xmlns:p14="http://schemas.microsoft.com/office/powerpoint/2010/main" val="1092438624"/>
       </p:ext>
     </p:extLst>
   </p:cSld>
@@ -1819,7 +1989,7 @@
     </p:spTree>
     <p:extLst>
       <p:ext uri="{BB962C8B-B14F-4D97-AF65-F5344CB8AC3E}">
-        <p14:creationId xmlns:p14="http://schemas.microsoft.com/office/powerpoint/2010/main" val="1292418824"/>
+        <p14:creationId xmlns:p14="http://schemas.microsoft.com/office/powerpoint/2010/main" val="1411167505"/>
       </p:ext>
     </p:extLst>
   </p:cSld>
@@ -1924,7 +2094,7 @@
           <a:effectLst/>
           <a:extLst>
             <a:ext uri="{91240B29-F687-4f45-9708-019B960494DF}">
-              <a14:hiddenLine xmlns="" xmlns:a14="http://schemas.microsoft.com/office/drawing/2010/main" w="9525">
+              <a14:hiddenLine xmlns:a14="http://schemas.microsoft.com/office/drawing/2010/main" xmlns="" w="9525">
                 <a:solidFill>
                   <a:srgbClr val="000000"/>
                 </a:solidFill>
@@ -2116,7 +2286,7 @@
           <a:p>
             <a:fld id="{A11C64B6-CD6A-4A5E-B290-F2F16533C74E}" type="datetimeFigureOut">
               <a:rPr lang="cs-CZ" smtClean="0"/>
-              <a:t>13.04.2023</a:t>
+              <a:t>24.04.2023</a:t>
             </a:fld>
             <a:endParaRPr lang="cs-CZ"/>
           </a:p>
@@ -2174,13 +2344,13 @@
   <p:clrMapOvr>
     <a:masterClrMapping/>
   </p:clrMapOvr>
-  <mc:AlternateContent xmlns:mc="http://schemas.openxmlformats.org/markup-compatibility/2006">
-    <mc:Choice xmlns:p159="http://schemas.microsoft.com/office/powerpoint/2015/09/main" Requires="p159">
+  <mc:AlternateContent xmlns:mc="http://schemas.openxmlformats.org/markup-compatibility/2006" xmlns:p159="http://schemas.microsoft.com/office/powerpoint/2015/09/main">
+    <mc:Choice Requires="p159">
       <p:transition spd="slow">
         <p159:morph option="byObject"/>
       </p:transition>
     </mc:Choice>
-    <mc:Fallback>
+    <mc:Fallback xmlns="">
       <p:transition spd="slow">
         <p:fade/>
       </p:transition>
@@ -2446,7 +2616,7 @@
           <a:p>
             <a:fld id="{A11C64B6-CD6A-4A5E-B290-F2F16533C74E}" type="datetimeFigureOut">
               <a:rPr lang="cs-CZ" smtClean="0"/>
-              <a:t>13.04.2023</a:t>
+              <a:t>24.04.2023</a:t>
             </a:fld>
             <a:endParaRPr lang="cs-CZ"/>
           </a:p>
@@ -2504,13 +2674,13 @@
   <p:clrMapOvr>
     <a:masterClrMapping/>
   </p:clrMapOvr>
-  <mc:AlternateContent xmlns:mc="http://schemas.openxmlformats.org/markup-compatibility/2006">
-    <mc:Choice xmlns:p159="http://schemas.microsoft.com/office/powerpoint/2015/09/main" Requires="p159">
+  <mc:AlternateContent xmlns:mc="http://schemas.openxmlformats.org/markup-compatibility/2006" xmlns:p159="http://schemas.microsoft.com/office/powerpoint/2015/09/main">
+    <mc:Choice Requires="p159">
       <p:transition spd="slow">
         <p159:morph option="byObject"/>
       </p:transition>
     </mc:Choice>
-    <mc:Fallback>
+    <mc:Fallback xmlns="">
       <p:transition spd="slow">
         <p:fade/>
       </p:transition>
@@ -2946,7 +3116,7 @@
           <a:p>
             <a:fld id="{A11C64B6-CD6A-4A5E-B290-F2F16533C74E}" type="datetimeFigureOut">
               <a:rPr lang="cs-CZ" smtClean="0"/>
-              <a:t>13.04.2023</a:t>
+              <a:t>24.04.2023</a:t>
             </a:fld>
             <a:endParaRPr lang="cs-CZ"/>
           </a:p>
@@ -3004,13 +3174,13 @@
   <p:clrMapOvr>
     <a:masterClrMapping/>
   </p:clrMapOvr>
-  <mc:AlternateContent xmlns:mc="http://schemas.openxmlformats.org/markup-compatibility/2006">
-    <mc:Choice xmlns:p159="http://schemas.microsoft.com/office/powerpoint/2015/09/main" Requires="p159">
+  <mc:AlternateContent xmlns:mc="http://schemas.openxmlformats.org/markup-compatibility/2006" xmlns:p159="http://schemas.microsoft.com/office/powerpoint/2015/09/main">
+    <mc:Choice Requires="p159">
       <p:transition spd="slow">
         <p159:morph option="byObject"/>
       </p:transition>
     </mc:Choice>
-    <mc:Fallback>
+    <mc:Fallback xmlns="">
       <p:transition spd="slow">
         <p:fade/>
       </p:transition>
@@ -3327,7 +3497,7 @@
           <a:p>
             <a:fld id="{A11C64B6-CD6A-4A5E-B290-F2F16533C74E}" type="datetimeFigureOut">
               <a:rPr lang="cs-CZ" smtClean="0"/>
-              <a:t>13.04.2023</a:t>
+              <a:t>24.04.2023</a:t>
             </a:fld>
             <a:endParaRPr lang="cs-CZ"/>
           </a:p>
@@ -3385,13 +3555,13 @@
   <p:clrMapOvr>
     <a:masterClrMapping/>
   </p:clrMapOvr>
-  <mc:AlternateContent xmlns:mc="http://schemas.openxmlformats.org/markup-compatibility/2006">
-    <mc:Choice xmlns:p159="http://schemas.microsoft.com/office/powerpoint/2015/09/main" Requires="p159">
+  <mc:AlternateContent xmlns:mc="http://schemas.openxmlformats.org/markup-compatibility/2006" xmlns:p159="http://schemas.microsoft.com/office/powerpoint/2015/09/main">
+    <mc:Choice Requires="p159">
       <p:transition spd="slow">
         <p159:morph option="byObject"/>
       </p:transition>
     </mc:Choice>
-    <mc:Fallback>
+    <mc:Fallback xmlns="">
       <p:transition spd="slow">
         <p:fade/>
       </p:transition>
@@ -3494,7 +3664,7 @@
           <a:ln/>
           <a:extLst>
             <a:ext uri="{91240B29-F687-4f45-9708-019B960494DF}">
-              <a14:hiddenLine xmlns="" xmlns:a14="http://schemas.microsoft.com/office/drawing/2010/main" w="9525">
+              <a14:hiddenLine xmlns:a14="http://schemas.microsoft.com/office/drawing/2010/main" xmlns="" w="9525">
                 <a:solidFill>
                   <a:srgbClr val="000000"/>
                 </a:solidFill>
@@ -3612,7 +3782,7 @@
           <a:p>
             <a:fld id="{A11C64B6-CD6A-4A5E-B290-F2F16533C74E}" type="datetimeFigureOut">
               <a:rPr lang="cs-CZ" smtClean="0"/>
-              <a:t>13.04.2023</a:t>
+              <a:t>24.04.2023</a:t>
             </a:fld>
             <a:endParaRPr lang="cs-CZ"/>
           </a:p>
@@ -3670,13 +3840,13 @@
   <p:clrMapOvr>
     <a:masterClrMapping/>
   </p:clrMapOvr>
-  <mc:AlternateContent xmlns:mc="http://schemas.openxmlformats.org/markup-compatibility/2006">
-    <mc:Choice xmlns:p159="http://schemas.microsoft.com/office/powerpoint/2015/09/main" Requires="p159">
+  <mc:AlternateContent xmlns:mc="http://schemas.openxmlformats.org/markup-compatibility/2006" xmlns:p159="http://schemas.microsoft.com/office/powerpoint/2015/09/main">
+    <mc:Choice Requires="p159">
       <p:transition spd="slow">
         <p159:morph option="byObject"/>
       </p:transition>
     </mc:Choice>
-    <mc:Fallback>
+    <mc:Fallback xmlns="">
       <p:transition spd="slow">
         <p:fade/>
       </p:transition>
@@ -3781,7 +3951,7 @@
           <a:ln/>
           <a:extLst>
             <a:ext uri="{91240B29-F687-4f45-9708-019B960494DF}">
-              <a14:hiddenLine xmlns="" xmlns:a14="http://schemas.microsoft.com/office/drawing/2010/main" w="9525">
+              <a14:hiddenLine xmlns:a14="http://schemas.microsoft.com/office/drawing/2010/main" xmlns="" w="9525">
                 <a:solidFill>
                   <a:srgbClr val="000000"/>
                 </a:solidFill>
@@ -3909,7 +4079,7 @@
           <a:p>
             <a:fld id="{A11C64B6-CD6A-4A5E-B290-F2F16533C74E}" type="datetimeFigureOut">
               <a:rPr lang="cs-CZ" smtClean="0"/>
-              <a:t>13.04.2023</a:t>
+              <a:t>24.04.2023</a:t>
             </a:fld>
             <a:endParaRPr lang="cs-CZ"/>
           </a:p>
@@ -3967,13 +4137,13 @@
   <p:clrMapOvr>
     <a:masterClrMapping/>
   </p:clrMapOvr>
-  <mc:AlternateContent xmlns:mc="http://schemas.openxmlformats.org/markup-compatibility/2006">
-    <mc:Choice xmlns:p159="http://schemas.microsoft.com/office/powerpoint/2015/09/main" Requires="p159">
+  <mc:AlternateContent xmlns:mc="http://schemas.openxmlformats.org/markup-compatibility/2006" xmlns:p159="http://schemas.microsoft.com/office/powerpoint/2015/09/main">
+    <mc:Choice Requires="p159">
       <p:transition spd="slow">
         <p159:morph option="byObject"/>
       </p:transition>
     </mc:Choice>
-    <mc:Fallback>
+    <mc:Fallback xmlns="">
       <p:transition spd="slow">
         <p:fade/>
       </p:transition>
@@ -4076,7 +4246,7 @@
           <a:ln/>
           <a:extLst>
             <a:ext uri="{91240B29-F687-4f45-9708-019B960494DF}">
-              <a14:hiddenLine xmlns="" xmlns:a14="http://schemas.microsoft.com/office/drawing/2010/main" w="9525">
+              <a14:hiddenLine xmlns:a14="http://schemas.microsoft.com/office/drawing/2010/main" xmlns="" w="9525">
                 <a:solidFill>
                   <a:srgbClr val="000000"/>
                 </a:solidFill>
@@ -4204,7 +4374,7 @@
           <a:p>
             <a:fld id="{A11C64B6-CD6A-4A5E-B290-F2F16533C74E}" type="datetimeFigureOut">
               <a:rPr lang="cs-CZ" smtClean="0"/>
-              <a:t>13.04.2023</a:t>
+              <a:t>24.04.2023</a:t>
             </a:fld>
             <a:endParaRPr lang="cs-CZ"/>
           </a:p>
@@ -4262,13 +4432,13 @@
   <p:clrMapOvr>
     <a:masterClrMapping/>
   </p:clrMapOvr>
-  <mc:AlternateContent xmlns:mc="http://schemas.openxmlformats.org/markup-compatibility/2006">
-    <mc:Choice xmlns:p159="http://schemas.microsoft.com/office/powerpoint/2015/09/main" Requires="p159">
+  <mc:AlternateContent xmlns:mc="http://schemas.openxmlformats.org/markup-compatibility/2006" xmlns:p159="http://schemas.microsoft.com/office/powerpoint/2015/09/main">
+    <mc:Choice Requires="p159">
       <p:transition spd="slow">
         <p159:morph option="byObject"/>
       </p:transition>
     </mc:Choice>
-    <mc:Fallback>
+    <mc:Fallback xmlns="">
       <p:transition spd="slow">
         <p:fade/>
       </p:transition>
@@ -4559,7 +4729,7 @@
           <a:p>
             <a:fld id="{A11C64B6-CD6A-4A5E-B290-F2F16533C74E}" type="datetimeFigureOut">
               <a:rPr lang="cs-CZ" smtClean="0"/>
-              <a:t>13.04.2023</a:t>
+              <a:t>24.04.2023</a:t>
             </a:fld>
             <a:endParaRPr lang="cs-CZ"/>
           </a:p>
@@ -4617,13 +4787,13 @@
   <p:clrMapOvr>
     <a:masterClrMapping/>
   </p:clrMapOvr>
-  <mc:AlternateContent xmlns:mc="http://schemas.openxmlformats.org/markup-compatibility/2006">
-    <mc:Choice xmlns:p159="http://schemas.microsoft.com/office/powerpoint/2015/09/main" Requires="p159">
+  <mc:AlternateContent xmlns:mc="http://schemas.openxmlformats.org/markup-compatibility/2006" xmlns:p159="http://schemas.microsoft.com/office/powerpoint/2015/09/main">
+    <mc:Choice Requires="p159">
       <p:transition spd="slow">
         <p159:morph option="byObject"/>
       </p:transition>
     </mc:Choice>
-    <mc:Fallback>
+    <mc:Fallback xmlns="">
       <p:transition spd="slow">
         <p:fade/>
       </p:transition>
@@ -4726,7 +4896,7 @@
           <a:ln/>
           <a:extLst>
             <a:ext uri="{91240B29-F687-4f45-9708-019B960494DF}">
-              <a14:hiddenLine xmlns="" xmlns:a14="http://schemas.microsoft.com/office/drawing/2010/main" w="9525">
+              <a14:hiddenLine xmlns:a14="http://schemas.microsoft.com/office/drawing/2010/main" xmlns="" w="9525">
                 <a:solidFill>
                   <a:srgbClr val="000000"/>
                 </a:solidFill>
@@ -4910,7 +5080,7 @@
           <a:p>
             <a:fld id="{A11C64B6-CD6A-4A5E-B290-F2F16533C74E}" type="datetimeFigureOut">
               <a:rPr lang="cs-CZ" smtClean="0"/>
-              <a:t>13.04.2023</a:t>
+              <a:t>24.04.2023</a:t>
             </a:fld>
             <a:endParaRPr lang="cs-CZ"/>
           </a:p>
@@ -4968,13 +5138,13 @@
   <p:clrMapOvr>
     <a:masterClrMapping/>
   </p:clrMapOvr>
-  <mc:AlternateContent xmlns:mc="http://schemas.openxmlformats.org/markup-compatibility/2006">
-    <mc:Choice xmlns:p159="http://schemas.microsoft.com/office/powerpoint/2015/09/main" Requires="p159">
+  <mc:AlternateContent xmlns:mc="http://schemas.openxmlformats.org/markup-compatibility/2006" xmlns:p159="http://schemas.microsoft.com/office/powerpoint/2015/09/main">
+    <mc:Choice Requires="p159">
       <p:transition spd="slow">
         <p159:morph option="byObject"/>
       </p:transition>
     </mc:Choice>
-    <mc:Fallback>
+    <mc:Fallback xmlns="">
       <p:transition spd="slow">
         <p:fade/>
       </p:transition>
@@ -5077,7 +5247,7 @@
           <a:ln/>
           <a:extLst>
             <a:ext uri="{91240B29-F687-4f45-9708-019B960494DF}">
-              <a14:hiddenLine xmlns="" xmlns:a14="http://schemas.microsoft.com/office/drawing/2010/main" w="9525">
+              <a14:hiddenLine xmlns:a14="http://schemas.microsoft.com/office/drawing/2010/main" xmlns="" w="9525">
                 <a:solidFill>
                   <a:srgbClr val="000000"/>
                 </a:solidFill>
@@ -5399,7 +5569,7 @@
           <a:p>
             <a:fld id="{A11C64B6-CD6A-4A5E-B290-F2F16533C74E}" type="datetimeFigureOut">
               <a:rPr lang="cs-CZ" smtClean="0"/>
-              <a:t>13.04.2023</a:t>
+              <a:t>24.04.2023</a:t>
             </a:fld>
             <a:endParaRPr lang="cs-CZ"/>
           </a:p>
@@ -5457,13 +5627,13 @@
   <p:clrMapOvr>
     <a:masterClrMapping/>
   </p:clrMapOvr>
-  <mc:AlternateContent xmlns:mc="http://schemas.openxmlformats.org/markup-compatibility/2006">
-    <mc:Choice xmlns:p159="http://schemas.microsoft.com/office/powerpoint/2015/09/main" Requires="p159">
+  <mc:AlternateContent xmlns:mc="http://schemas.openxmlformats.org/markup-compatibility/2006" xmlns:p159="http://schemas.microsoft.com/office/powerpoint/2015/09/main">
+    <mc:Choice Requires="p159">
       <p:transition spd="slow">
         <p159:morph option="byObject"/>
       </p:transition>
     </mc:Choice>
-    <mc:Fallback>
+    <mc:Fallback xmlns="">
       <p:transition spd="slow">
         <p:fade/>
       </p:transition>
@@ -5566,7 +5736,7 @@
           <a:ln/>
           <a:extLst>
             <a:ext uri="{91240B29-F687-4f45-9708-019B960494DF}">
-              <a14:hiddenLine xmlns="" xmlns:a14="http://schemas.microsoft.com/office/drawing/2010/main" w="9525">
+              <a14:hiddenLine xmlns:a14="http://schemas.microsoft.com/office/drawing/2010/main" xmlns="" w="9525">
                 <a:solidFill>
                   <a:srgbClr val="000000"/>
                 </a:solidFill>
@@ -5632,7 +5802,7 @@
           <a:p>
             <a:fld id="{A11C64B6-CD6A-4A5E-B290-F2F16533C74E}" type="datetimeFigureOut">
               <a:rPr lang="cs-CZ" smtClean="0"/>
-              <a:t>13.04.2023</a:t>
+              <a:t>24.04.2023</a:t>
             </a:fld>
             <a:endParaRPr lang="cs-CZ"/>
           </a:p>
@@ -5690,13 +5860,13 @@
   <p:clrMapOvr>
     <a:masterClrMapping/>
   </p:clrMapOvr>
-  <mc:AlternateContent xmlns:mc="http://schemas.openxmlformats.org/markup-compatibility/2006">
-    <mc:Choice xmlns:p159="http://schemas.microsoft.com/office/powerpoint/2015/09/main" Requires="p159">
+  <mc:AlternateContent xmlns:mc="http://schemas.openxmlformats.org/markup-compatibility/2006" xmlns:p159="http://schemas.microsoft.com/office/powerpoint/2015/09/main">
+    <mc:Choice Requires="p159">
       <p:transition spd="slow">
         <p159:morph option="byObject"/>
       </p:transition>
     </mc:Choice>
-    <mc:Fallback>
+    <mc:Fallback xmlns="">
       <p:transition spd="slow">
         <p:fade/>
       </p:transition>
@@ -5739,7 +5909,7 @@
           <a:p>
             <a:fld id="{A11C64B6-CD6A-4A5E-B290-F2F16533C74E}" type="datetimeFigureOut">
               <a:rPr lang="cs-CZ" smtClean="0"/>
-              <a:t>13.04.2023</a:t>
+              <a:t>24.04.2023</a:t>
             </a:fld>
             <a:endParaRPr lang="cs-CZ"/>
           </a:p>
@@ -5797,13 +5967,13 @@
   <p:clrMapOvr>
     <a:masterClrMapping/>
   </p:clrMapOvr>
-  <mc:AlternateContent xmlns:mc="http://schemas.openxmlformats.org/markup-compatibility/2006">
-    <mc:Choice xmlns:p159="http://schemas.microsoft.com/office/powerpoint/2015/09/main" Requires="p159">
+  <mc:AlternateContent xmlns:mc="http://schemas.openxmlformats.org/markup-compatibility/2006" xmlns:p159="http://schemas.microsoft.com/office/powerpoint/2015/09/main">
+    <mc:Choice Requires="p159">
       <p:transition spd="slow">
         <p159:morph option="byObject"/>
       </p:transition>
     </mc:Choice>
-    <mc:Fallback>
+    <mc:Fallback xmlns="">
       <p:transition spd="slow">
         <p:fade/>
       </p:transition>
@@ -6019,7 +6189,7 @@
           <a:ln/>
           <a:extLst>
             <a:ext uri="{91240B29-F687-4f45-9708-019B960494DF}">
-              <a14:hiddenLine xmlns="" xmlns:a14="http://schemas.microsoft.com/office/drawing/2010/main" w="9525">
+              <a14:hiddenLine xmlns:a14="http://schemas.microsoft.com/office/drawing/2010/main" xmlns="" w="9525">
                 <a:solidFill>
                   <a:srgbClr val="000000"/>
                 </a:solidFill>
@@ -6218,7 +6388,7 @@
           <a:p>
             <a:fld id="{A11C64B6-CD6A-4A5E-B290-F2F16533C74E}" type="datetimeFigureOut">
               <a:rPr lang="cs-CZ" smtClean="0"/>
-              <a:t>13.04.2023</a:t>
+              <a:t>24.04.2023</a:t>
             </a:fld>
             <a:endParaRPr lang="cs-CZ"/>
           </a:p>
@@ -6276,13 +6446,13 @@
   <p:clrMapOvr>
     <a:masterClrMapping/>
   </p:clrMapOvr>
-  <mc:AlternateContent xmlns:mc="http://schemas.openxmlformats.org/markup-compatibility/2006">
-    <mc:Choice xmlns:p159="http://schemas.microsoft.com/office/powerpoint/2015/09/main" Requires="p159">
+  <mc:AlternateContent xmlns:mc="http://schemas.openxmlformats.org/markup-compatibility/2006" xmlns:p159="http://schemas.microsoft.com/office/powerpoint/2015/09/main">
+    <mc:Choice Requires="p159">
       <p:transition spd="slow">
         <p159:morph option="byObject"/>
       </p:transition>
     </mc:Choice>
-    <mc:Fallback>
+    <mc:Fallback xmlns="">
       <p:transition spd="slow">
         <p:fade/>
       </p:transition>
@@ -6543,7 +6713,7 @@
           <a:p>
             <a:fld id="{A11C64B6-CD6A-4A5E-B290-F2F16533C74E}" type="datetimeFigureOut">
               <a:rPr lang="cs-CZ" smtClean="0"/>
-              <a:t>13.04.2023</a:t>
+              <a:t>24.04.2023</a:t>
             </a:fld>
             <a:endParaRPr lang="cs-CZ"/>
           </a:p>
@@ -6611,13 +6781,13 @@
   <p:clrMapOvr>
     <a:masterClrMapping/>
   </p:clrMapOvr>
-  <mc:AlternateContent xmlns:mc="http://schemas.openxmlformats.org/markup-compatibility/2006">
-    <mc:Choice xmlns:p159="http://schemas.microsoft.com/office/powerpoint/2015/09/main" Requires="p159">
+  <mc:AlternateContent xmlns:mc="http://schemas.openxmlformats.org/markup-compatibility/2006" xmlns:p159="http://schemas.microsoft.com/office/powerpoint/2015/09/main">
+    <mc:Choice Requires="p159">
       <p:transition spd="slow">
         <p159:morph option="byObject"/>
       </p:transition>
     </mc:Choice>
-    <mc:Fallback>
+    <mc:Fallback xmlns="">
       <p:transition spd="slow">
         <p:fade/>
       </p:transition>
@@ -6825,7 +6995,7 @@
           <a:p>
             <a:fld id="{A11C64B6-CD6A-4A5E-B290-F2F16533C74E}" type="datetimeFigureOut">
               <a:rPr lang="cs-CZ" smtClean="0"/>
-              <a:t>13.04.2023</a:t>
+              <a:t>24.04.2023</a:t>
             </a:fld>
             <a:endParaRPr lang="cs-CZ"/>
           </a:p>
@@ -6894,13 +7064,13 @@
     <p:sldLayoutId id="2147483774" r:id="rId13"/>
     <p:sldLayoutId id="2147483775" r:id="rId14"/>
   </p:sldLayoutIdLst>
-  <mc:AlternateContent xmlns:mc="http://schemas.openxmlformats.org/markup-compatibility/2006">
-    <mc:Choice xmlns:p159="http://schemas.microsoft.com/office/powerpoint/2015/09/main" Requires="p159">
+  <mc:AlternateContent xmlns:mc="http://schemas.openxmlformats.org/markup-compatibility/2006" xmlns:p159="http://schemas.microsoft.com/office/powerpoint/2015/09/main">
+    <mc:Choice Requires="p159">
       <p:transition spd="slow">
         <p159:morph option="byObject"/>
       </p:transition>
     </mc:Choice>
-    <mc:Fallback>
+    <mc:Fallback xmlns="">
       <p:transition spd="slow">
         <p:fade/>
       </p:transition>
@@ -7372,13 +7542,13 @@
   <p:clrMapOvr>
     <a:masterClrMapping/>
   </p:clrMapOvr>
-  <mc:AlternateContent xmlns:mc="http://schemas.openxmlformats.org/markup-compatibility/2006">
-    <mc:Choice xmlns:p159="http://schemas.microsoft.com/office/powerpoint/2015/09/main" Requires="p159">
+  <mc:AlternateContent xmlns:mc="http://schemas.openxmlformats.org/markup-compatibility/2006" xmlns:p159="http://schemas.microsoft.com/office/powerpoint/2015/09/main">
+    <mc:Choice Requires="p159">
       <p:transition spd="slow">
         <p159:morph option="byObject"/>
       </p:transition>
     </mc:Choice>
-    <mc:Fallback>
+    <mc:Fallback xmlns="">
       <p:transition spd="slow">
         <p:fade/>
       </p:transition>
@@ -7388,6 +7558,304 @@
 </file>
 
 <file path=ppt/slides/slide10.xml><?xml version="1.0" encoding="utf-8"?>
+<p:sld xmlns:a="http://schemas.openxmlformats.org/drawingml/2006/main" xmlns:r="http://schemas.openxmlformats.org/officeDocument/2006/relationships" xmlns:p="http://schemas.openxmlformats.org/presentationml/2006/main">
+  <p:cSld>
+    <p:spTree>
+      <p:nvGrpSpPr>
+        <p:cNvPr id="1" name=""/>
+        <p:cNvGrpSpPr/>
+        <p:nvPr/>
+      </p:nvGrpSpPr>
+      <p:grpSpPr>
+        <a:xfrm>
+          <a:off x="0" y="0"/>
+          <a:ext cx="0" cy="0"/>
+          <a:chOff x="0" y="0"/>
+          <a:chExt cx="0" cy="0"/>
+        </a:xfrm>
+      </p:grpSpPr>
+      <p:sp>
+        <p:nvSpPr>
+          <p:cNvPr id="2" name="Nadpis 1">
+            <a:extLst>
+              <a:ext uri="{FF2B5EF4-FFF2-40B4-BE49-F238E27FC236}">
+                <a16:creationId xmlns:a16="http://schemas.microsoft.com/office/drawing/2014/main" id="{69750CBC-247B-C052-407A-51083D43B0D2}"/>
+              </a:ext>
+            </a:extLst>
+          </p:cNvPr>
+          <p:cNvSpPr>
+            <a:spLocks noGrp="1"/>
+          </p:cNvSpPr>
+          <p:nvPr>
+            <p:ph type="title"/>
+          </p:nvPr>
+        </p:nvSpPr>
+        <p:spPr>
+          <a:xfrm>
+            <a:off x="810000" y="447188"/>
+            <a:ext cx="10571998" cy="970450"/>
+          </a:xfrm>
+        </p:spPr>
+        <p:txBody>
+          <a:bodyPr>
+            <a:normAutofit/>
+          </a:bodyPr>
+          <a:lstStyle/>
+          <a:p>
+            <a:r>
+              <a:rPr lang="cs-CZ" dirty="0"/>
+              <a:t>Jarníkův algoritmus</a:t>
+            </a:r>
+          </a:p>
+        </p:txBody>
+      </p:sp>
+      <p:sp>
+        <p:nvSpPr>
+          <p:cNvPr id="10" name="Zástupný obsah 9">
+            <a:extLst>
+              <a:ext uri="{FF2B5EF4-FFF2-40B4-BE49-F238E27FC236}">
+                <a16:creationId xmlns:a16="http://schemas.microsoft.com/office/drawing/2014/main" id="{4F42F304-CE65-6256-62C6-A22658DF79D3}"/>
+              </a:ext>
+            </a:extLst>
+          </p:cNvPr>
+          <p:cNvSpPr>
+            <a:spLocks noGrp="1"/>
+          </p:cNvSpPr>
+          <p:nvPr>
+            <p:ph idx="1"/>
+          </p:nvPr>
+        </p:nvSpPr>
+        <p:spPr/>
+        <p:txBody>
+          <a:bodyPr/>
+          <a:lstStyle/>
+          <a:p>
+            <a:endParaRPr lang="cs-CZ"/>
+          </a:p>
+        </p:txBody>
+      </p:sp>
+      <p:pic>
+        <p:nvPicPr>
+          <p:cNvPr id="5122" name="Picture 2" descr="Example of a graph">
+            <a:extLst>
+              <a:ext uri="{FF2B5EF4-FFF2-40B4-BE49-F238E27FC236}">
+                <a16:creationId xmlns:a16="http://schemas.microsoft.com/office/drawing/2014/main" id="{B0F4900D-47F1-3E76-C310-91D9309D620D}"/>
+              </a:ext>
+            </a:extLst>
+          </p:cNvPr>
+          <p:cNvPicPr>
+            <a:picLocks noChangeAspect="1" noChangeArrowheads="1"/>
+          </p:cNvPicPr>
+          <p:nvPr/>
+        </p:nvPicPr>
+        <p:blipFill>
+          <a:blip r:embed="rId3">
+            <a:extLst>
+              <a:ext uri="{28A0092B-C50C-407E-A947-70E740481C1C}">
+                <a14:useLocalDpi xmlns:a14="http://schemas.microsoft.com/office/drawing/2010/main" val="0"/>
+              </a:ext>
+            </a:extLst>
+          </a:blip>
+          <a:srcRect/>
+          <a:stretch>
+            <a:fillRect/>
+          </a:stretch>
+        </p:blipFill>
+        <p:spPr bwMode="auto">
+          <a:xfrm>
+            <a:off x="2100057" y="2222287"/>
+            <a:ext cx="7991885" cy="4635713"/>
+          </a:xfrm>
+          <a:prstGeom prst="rect">
+            <a:avLst/>
+          </a:prstGeom>
+          <a:noFill/>
+          <a:extLst>
+            <a:ext uri="{909E8E84-426E-40DD-AFC4-6F175D3DCCD1}">
+              <a14:hiddenFill xmlns:a14="http://schemas.microsoft.com/office/drawing/2010/main">
+                <a:solidFill>
+                  <a:srgbClr val="FFFFFF"/>
+                </a:solidFill>
+              </a14:hiddenFill>
+            </a:ext>
+          </a:extLst>
+        </p:spPr>
+      </p:pic>
+    </p:spTree>
+    <p:extLst>
+      <p:ext uri="{BB962C8B-B14F-4D97-AF65-F5344CB8AC3E}">
+        <p14:creationId xmlns:p14="http://schemas.microsoft.com/office/powerpoint/2010/main" val="3559235156"/>
+      </p:ext>
+    </p:extLst>
+  </p:cSld>
+  <p:clrMapOvr>
+    <a:masterClrMapping/>
+  </p:clrMapOvr>
+  <mc:AlternateContent xmlns:mc="http://schemas.openxmlformats.org/markup-compatibility/2006" xmlns:p159="http://schemas.microsoft.com/office/powerpoint/2015/09/main">
+    <mc:Choice Requires="p159">
+      <p:transition spd="slow">
+        <p159:morph option="byObject"/>
+      </p:transition>
+    </mc:Choice>
+    <mc:Fallback xmlns="">
+      <p:transition spd="slow">
+        <p:fade/>
+      </p:transition>
+    </mc:Fallback>
+  </mc:AlternateContent>
+</p:sld>
+</file>
+
+<file path=ppt/slides/slide11.xml><?xml version="1.0" encoding="utf-8"?>
+<p:sld xmlns:a="http://schemas.openxmlformats.org/drawingml/2006/main" xmlns:r="http://schemas.openxmlformats.org/officeDocument/2006/relationships" xmlns:p="http://schemas.openxmlformats.org/presentationml/2006/main">
+  <p:cSld>
+    <p:spTree>
+      <p:nvGrpSpPr>
+        <p:cNvPr id="1" name=""/>
+        <p:cNvGrpSpPr/>
+        <p:nvPr/>
+      </p:nvGrpSpPr>
+      <p:grpSpPr>
+        <a:xfrm>
+          <a:off x="0" y="0"/>
+          <a:ext cx="0" cy="0"/>
+          <a:chOff x="0" y="0"/>
+          <a:chExt cx="0" cy="0"/>
+        </a:xfrm>
+      </p:grpSpPr>
+      <p:sp>
+        <p:nvSpPr>
+          <p:cNvPr id="2" name="Nadpis 1">
+            <a:extLst>
+              <a:ext uri="{FF2B5EF4-FFF2-40B4-BE49-F238E27FC236}">
+                <a16:creationId xmlns:a16="http://schemas.microsoft.com/office/drawing/2014/main" id="{69750CBC-247B-C052-407A-51083D43B0D2}"/>
+              </a:ext>
+            </a:extLst>
+          </p:cNvPr>
+          <p:cNvSpPr>
+            <a:spLocks noGrp="1"/>
+          </p:cNvSpPr>
+          <p:nvPr>
+            <p:ph type="title"/>
+          </p:nvPr>
+        </p:nvSpPr>
+        <p:spPr>
+          <a:xfrm>
+            <a:off x="810000" y="447188"/>
+            <a:ext cx="10571998" cy="970450"/>
+          </a:xfrm>
+        </p:spPr>
+        <p:txBody>
+          <a:bodyPr>
+            <a:normAutofit/>
+          </a:bodyPr>
+          <a:lstStyle/>
+          <a:p>
+            <a:r>
+              <a:rPr lang="cs-CZ" dirty="0"/>
+              <a:t>Jarníkův algoritmus</a:t>
+            </a:r>
+          </a:p>
+        </p:txBody>
+      </p:sp>
+      <p:sp>
+        <p:nvSpPr>
+          <p:cNvPr id="10" name="Zástupný obsah 9">
+            <a:extLst>
+              <a:ext uri="{FF2B5EF4-FFF2-40B4-BE49-F238E27FC236}">
+                <a16:creationId xmlns:a16="http://schemas.microsoft.com/office/drawing/2014/main" id="{4F42F304-CE65-6256-62C6-A22658DF79D3}"/>
+              </a:ext>
+            </a:extLst>
+          </p:cNvPr>
+          <p:cNvSpPr>
+            <a:spLocks noGrp="1"/>
+          </p:cNvSpPr>
+          <p:nvPr>
+            <p:ph idx="1"/>
+          </p:nvPr>
+        </p:nvSpPr>
+        <p:spPr/>
+        <p:txBody>
+          <a:bodyPr/>
+          <a:lstStyle/>
+          <a:p>
+            <a:endParaRPr lang="cs-CZ"/>
+          </a:p>
+        </p:txBody>
+      </p:sp>
+      <p:pic>
+        <p:nvPicPr>
+          <p:cNvPr id="6146" name="Picture 2" descr="0 is selected as starting vertex">
+            <a:extLst>
+              <a:ext uri="{FF2B5EF4-FFF2-40B4-BE49-F238E27FC236}">
+                <a16:creationId xmlns:a16="http://schemas.microsoft.com/office/drawing/2014/main" id="{6A33E9A0-0FA5-8C8C-B0C5-3AD7AAB23BAE}"/>
+              </a:ext>
+            </a:extLst>
+          </p:cNvPr>
+          <p:cNvPicPr>
+            <a:picLocks noChangeAspect="1" noChangeArrowheads="1"/>
+          </p:cNvPicPr>
+          <p:nvPr/>
+        </p:nvPicPr>
+        <p:blipFill>
+          <a:blip r:embed="rId3">
+            <a:extLst>
+              <a:ext uri="{28A0092B-C50C-407E-A947-70E740481C1C}">
+                <a14:useLocalDpi xmlns:a14="http://schemas.microsoft.com/office/drawing/2010/main" val="0"/>
+              </a:ext>
+            </a:extLst>
+          </a:blip>
+          <a:srcRect/>
+          <a:stretch>
+            <a:fillRect/>
+          </a:stretch>
+        </p:blipFill>
+        <p:spPr bwMode="auto">
+          <a:xfrm>
+            <a:off x="2095013" y="2222287"/>
+            <a:ext cx="8001973" cy="4641564"/>
+          </a:xfrm>
+          <a:prstGeom prst="rect">
+            <a:avLst/>
+          </a:prstGeom>
+          <a:noFill/>
+          <a:extLst>
+            <a:ext uri="{909E8E84-426E-40DD-AFC4-6F175D3DCCD1}">
+              <a14:hiddenFill xmlns:a14="http://schemas.microsoft.com/office/drawing/2010/main">
+                <a:solidFill>
+                  <a:srgbClr val="FFFFFF"/>
+                </a:solidFill>
+              </a14:hiddenFill>
+            </a:ext>
+          </a:extLst>
+        </p:spPr>
+      </p:pic>
+    </p:spTree>
+    <p:extLst>
+      <p:ext uri="{BB962C8B-B14F-4D97-AF65-F5344CB8AC3E}">
+        <p14:creationId xmlns:p14="http://schemas.microsoft.com/office/powerpoint/2010/main" val="2752603806"/>
+      </p:ext>
+    </p:extLst>
+  </p:cSld>
+  <p:clrMapOvr>
+    <a:masterClrMapping/>
+  </p:clrMapOvr>
+  <mc:AlternateContent xmlns:mc="http://schemas.openxmlformats.org/markup-compatibility/2006" xmlns:p159="http://schemas.microsoft.com/office/powerpoint/2015/09/main">
+    <mc:Choice Requires="p159">
+      <p:transition spd="slow">
+        <p159:morph option="byObject"/>
+      </p:transition>
+    </mc:Choice>
+    <mc:Fallback xmlns="">
+      <p:transition spd="slow">
+        <p:fade/>
+      </p:transition>
+    </mc:Fallback>
+  </mc:AlternateContent>
+</p:sld>
+</file>
+
+<file path=ppt/slides/slide12.xml><?xml version="1.0" encoding="utf-8"?>
 <p:sld xmlns:a="http://schemas.openxmlformats.org/drawingml/2006/main" xmlns:r="http://schemas.openxmlformats.org/officeDocument/2006/relationships" xmlns:p="http://schemas.openxmlformats.org/presentationml/2006/main">
   <p:cSld>
     <p:spTree>
@@ -7521,13 +7989,13 @@
   <p:clrMapOvr>
     <a:masterClrMapping/>
   </p:clrMapOvr>
-  <mc:AlternateContent xmlns:mc="http://schemas.openxmlformats.org/markup-compatibility/2006">
-    <mc:Choice xmlns:p159="http://schemas.microsoft.com/office/powerpoint/2015/09/main" Requires="p159">
+  <mc:AlternateContent xmlns:mc="http://schemas.openxmlformats.org/markup-compatibility/2006" xmlns:p159="http://schemas.microsoft.com/office/powerpoint/2015/09/main">
+    <mc:Choice Requires="p159">
       <p:transition spd="slow">
         <p159:morph option="byObject"/>
       </p:transition>
     </mc:Choice>
-    <mc:Fallback>
+    <mc:Fallback xmlns="">
       <p:transition spd="slow">
         <p:fade/>
       </p:transition>
@@ -7536,7 +8004,7 @@
 </p:sld>
 </file>
 
-<file path=ppt/slides/slide11.xml><?xml version="1.0" encoding="utf-8"?>
+<file path=ppt/slides/slide13.xml><?xml version="1.0" encoding="utf-8"?>
 <p:sld xmlns:a="http://schemas.openxmlformats.org/drawingml/2006/main" xmlns:r="http://schemas.openxmlformats.org/officeDocument/2006/relationships" xmlns:p="http://schemas.openxmlformats.org/presentationml/2006/main">
   <p:cSld>
     <p:spTree>
@@ -7670,13 +8138,13 @@
   <p:clrMapOvr>
     <a:masterClrMapping/>
   </p:clrMapOvr>
-  <mc:AlternateContent xmlns:mc="http://schemas.openxmlformats.org/markup-compatibility/2006">
-    <mc:Choice xmlns:p159="http://schemas.microsoft.com/office/powerpoint/2015/09/main" Requires="p159">
+  <mc:AlternateContent xmlns:mc="http://schemas.openxmlformats.org/markup-compatibility/2006" xmlns:p159="http://schemas.microsoft.com/office/powerpoint/2015/09/main">
+    <mc:Choice Requires="p159">
       <p:transition spd="slow">
         <p159:morph option="byObject"/>
       </p:transition>
     </mc:Choice>
-    <mc:Fallback>
+    <mc:Fallback xmlns="">
       <p:transition spd="slow">
         <p:fade/>
       </p:transition>
@@ -7685,7 +8153,7 @@
 </p:sld>
 </file>
 
-<file path=ppt/slides/slide12.xml><?xml version="1.0" encoding="utf-8"?>
+<file path=ppt/slides/slide14.xml><?xml version="1.0" encoding="utf-8"?>
 <p:sld xmlns:a="http://schemas.openxmlformats.org/drawingml/2006/main" xmlns:r="http://schemas.openxmlformats.org/officeDocument/2006/relationships" xmlns:p="http://schemas.openxmlformats.org/presentationml/2006/main">
   <p:cSld>
     <p:spTree>
@@ -7819,13 +8287,13 @@
   <p:clrMapOvr>
     <a:masterClrMapping/>
   </p:clrMapOvr>
-  <mc:AlternateContent xmlns:mc="http://schemas.openxmlformats.org/markup-compatibility/2006">
-    <mc:Choice xmlns:p159="http://schemas.microsoft.com/office/powerpoint/2015/09/main" Requires="p159">
+  <mc:AlternateContent xmlns:mc="http://schemas.openxmlformats.org/markup-compatibility/2006" xmlns:p159="http://schemas.microsoft.com/office/powerpoint/2015/09/main">
+    <mc:Choice Requires="p159">
       <p:transition spd="slow">
         <p159:morph option="byObject"/>
       </p:transition>
     </mc:Choice>
-    <mc:Fallback>
+    <mc:Fallback xmlns="">
       <p:transition spd="slow">
         <p:fade/>
       </p:transition>
@@ -7834,7 +8302,7 @@
 </p:sld>
 </file>
 
-<file path=ppt/slides/slide13.xml><?xml version="1.0" encoding="utf-8"?>
+<file path=ppt/slides/slide15.xml><?xml version="1.0" encoding="utf-8"?>
 <p:sld xmlns:a="http://schemas.openxmlformats.org/drawingml/2006/main" xmlns:r="http://schemas.openxmlformats.org/officeDocument/2006/relationships" xmlns:p="http://schemas.openxmlformats.org/presentationml/2006/main">
   <p:cSld>
     <p:spTree>
@@ -7968,13 +8436,13 @@
   <p:clrMapOvr>
     <a:masterClrMapping/>
   </p:clrMapOvr>
-  <mc:AlternateContent xmlns:mc="http://schemas.openxmlformats.org/markup-compatibility/2006">
-    <mc:Choice xmlns:p159="http://schemas.microsoft.com/office/powerpoint/2015/09/main" Requires="p159">
+  <mc:AlternateContent xmlns:mc="http://schemas.openxmlformats.org/markup-compatibility/2006" xmlns:p159="http://schemas.microsoft.com/office/powerpoint/2015/09/main">
+    <mc:Choice Requires="p159">
       <p:transition spd="slow">
         <p159:morph option="byObject"/>
       </p:transition>
     </mc:Choice>
-    <mc:Fallback>
+    <mc:Fallback xmlns="">
       <p:transition spd="slow">
         <p:fade/>
       </p:transition>
@@ -7983,7 +8451,7 @@
 </p:sld>
 </file>
 
-<file path=ppt/slides/slide14.xml><?xml version="1.0" encoding="utf-8"?>
+<file path=ppt/slides/slide16.xml><?xml version="1.0" encoding="utf-8"?>
 <p:sld xmlns:a="http://schemas.openxmlformats.org/drawingml/2006/main" xmlns:r="http://schemas.openxmlformats.org/officeDocument/2006/relationships" xmlns:p="http://schemas.openxmlformats.org/presentationml/2006/main">
   <p:cSld>
     <p:spTree>
@@ -8117,13 +8585,13 @@
   <p:clrMapOvr>
     <a:masterClrMapping/>
   </p:clrMapOvr>
-  <mc:AlternateContent xmlns:mc="http://schemas.openxmlformats.org/markup-compatibility/2006">
-    <mc:Choice xmlns:p159="http://schemas.microsoft.com/office/powerpoint/2015/09/main" Requires="p159">
+  <mc:AlternateContent xmlns:mc="http://schemas.openxmlformats.org/markup-compatibility/2006" xmlns:p159="http://schemas.microsoft.com/office/powerpoint/2015/09/main">
+    <mc:Choice Requires="p159">
       <p:transition spd="slow">
         <p159:morph option="byObject"/>
       </p:transition>
     </mc:Choice>
-    <mc:Fallback>
+    <mc:Fallback xmlns="">
       <p:transition spd="slow">
         <p:fade/>
       </p:transition>
@@ -8132,7 +8600,7 @@
 </p:sld>
 </file>
 
-<file path=ppt/slides/slide15.xml><?xml version="1.0" encoding="utf-8"?>
+<file path=ppt/slides/slide17.xml><?xml version="1.0" encoding="utf-8"?>
 <p:sld xmlns:a="http://schemas.openxmlformats.org/drawingml/2006/main" xmlns:r="http://schemas.openxmlformats.org/officeDocument/2006/relationships" xmlns:p="http://schemas.openxmlformats.org/presentationml/2006/main">
   <p:cSld>
     <p:spTree>
@@ -8266,13 +8734,13 @@
   <p:clrMapOvr>
     <a:masterClrMapping/>
   </p:clrMapOvr>
-  <mc:AlternateContent xmlns:mc="http://schemas.openxmlformats.org/markup-compatibility/2006">
-    <mc:Choice xmlns:p159="http://schemas.microsoft.com/office/powerpoint/2015/09/main" Requires="p159">
+  <mc:AlternateContent xmlns:mc="http://schemas.openxmlformats.org/markup-compatibility/2006" xmlns:p159="http://schemas.microsoft.com/office/powerpoint/2015/09/main">
+    <mc:Choice Requires="p159">
       <p:transition spd="slow">
         <p159:morph option="byObject"/>
       </p:transition>
     </mc:Choice>
-    <mc:Fallback>
+    <mc:Fallback xmlns="">
       <p:transition spd="slow">
         <p:fade/>
       </p:transition>
@@ -8281,7 +8749,7 @@
 </p:sld>
 </file>
 
-<file path=ppt/slides/slide16.xml><?xml version="1.0" encoding="utf-8"?>
+<file path=ppt/slides/slide18.xml><?xml version="1.0" encoding="utf-8"?>
 <p:sld xmlns:a="http://schemas.openxmlformats.org/drawingml/2006/main" xmlns:r="http://schemas.openxmlformats.org/officeDocument/2006/relationships" xmlns:p="http://schemas.openxmlformats.org/presentationml/2006/main">
   <p:cSld>
     <p:spTree>
@@ -8415,13 +8883,13 @@
   <p:clrMapOvr>
     <a:masterClrMapping/>
   </p:clrMapOvr>
-  <mc:AlternateContent xmlns:mc="http://schemas.openxmlformats.org/markup-compatibility/2006">
-    <mc:Choice xmlns:p159="http://schemas.microsoft.com/office/powerpoint/2015/09/main" Requires="p159">
+  <mc:AlternateContent xmlns:mc="http://schemas.openxmlformats.org/markup-compatibility/2006" xmlns:p159="http://schemas.microsoft.com/office/powerpoint/2015/09/main">
+    <mc:Choice Requires="p159">
       <p:transition spd="slow">
         <p159:morph option="byObject"/>
       </p:transition>
     </mc:Choice>
-    <mc:Fallback>
+    <mc:Fallback xmlns="">
       <p:transition spd="slow">
         <p:fade/>
       </p:transition>
@@ -8430,7 +8898,7 @@
 </p:sld>
 </file>
 
-<file path=ppt/slides/slide17.xml><?xml version="1.0" encoding="utf-8"?>
+<file path=ppt/slides/slide19.xml><?xml version="1.0" encoding="utf-8"?>
 <p:sld xmlns:a="http://schemas.openxmlformats.org/drawingml/2006/main" xmlns:r="http://schemas.openxmlformats.org/officeDocument/2006/relationships" xmlns:p="http://schemas.openxmlformats.org/presentationml/2006/main">
   <p:cSld>
     <p:spTree>
@@ -8564,13 +9032,13 @@
   <p:clrMapOvr>
     <a:masterClrMapping/>
   </p:clrMapOvr>
-  <mc:AlternateContent xmlns:mc="http://schemas.openxmlformats.org/markup-compatibility/2006">
-    <mc:Choice xmlns:p159="http://schemas.microsoft.com/office/powerpoint/2015/09/main" Requires="p159">
+  <mc:AlternateContent xmlns:mc="http://schemas.openxmlformats.org/markup-compatibility/2006" xmlns:p159="http://schemas.microsoft.com/office/powerpoint/2015/09/main">
+    <mc:Choice Requires="p159">
       <p:transition spd="slow">
         <p159:morph option="byObject"/>
       </p:transition>
     </mc:Choice>
-    <mc:Fallback>
+    <mc:Fallback xmlns="">
       <p:transition spd="slow">
         <p:fade/>
       </p:transition>
@@ -8579,7 +9047,128 @@
 </p:sld>
 </file>
 
-<file path=ppt/slides/slide18.xml><?xml version="1.0" encoding="utf-8"?>
+<file path=ppt/slides/slide2.xml><?xml version="1.0" encoding="utf-8"?>
+<p:sld xmlns:a="http://schemas.openxmlformats.org/drawingml/2006/main" xmlns:r="http://schemas.openxmlformats.org/officeDocument/2006/relationships" xmlns:p="http://schemas.openxmlformats.org/presentationml/2006/main">
+  <p:cSld>
+    <p:spTree>
+      <p:nvGrpSpPr>
+        <p:cNvPr id="1" name=""/>
+        <p:cNvGrpSpPr/>
+        <p:nvPr/>
+      </p:nvGrpSpPr>
+      <p:grpSpPr>
+        <a:xfrm>
+          <a:off x="0" y="0"/>
+          <a:ext cx="0" cy="0"/>
+          <a:chOff x="0" y="0"/>
+          <a:chExt cx="0" cy="0"/>
+        </a:xfrm>
+      </p:grpSpPr>
+      <p:sp>
+        <p:nvSpPr>
+          <p:cNvPr id="2" name="Nadpis 1">
+            <a:extLst>
+              <a:ext uri="{FF2B5EF4-FFF2-40B4-BE49-F238E27FC236}">
+                <a16:creationId xmlns:a16="http://schemas.microsoft.com/office/drawing/2014/main" id="{69750CBC-247B-C052-407A-51083D43B0D2}"/>
+              </a:ext>
+            </a:extLst>
+          </p:cNvPr>
+          <p:cNvSpPr>
+            <a:spLocks noGrp="1"/>
+          </p:cNvSpPr>
+          <p:nvPr>
+            <p:ph type="title"/>
+          </p:nvPr>
+        </p:nvSpPr>
+        <p:spPr/>
+        <p:txBody>
+          <a:bodyPr/>
+          <a:lstStyle/>
+          <a:p>
+            <a:r>
+              <a:rPr lang="cs-CZ" dirty="0"/>
+              <a:t>K čemu slouží?</a:t>
+            </a:r>
+          </a:p>
+        </p:txBody>
+      </p:sp>
+      <p:sp>
+        <p:nvSpPr>
+          <p:cNvPr id="3" name="Zástupný obsah 2">
+            <a:extLst>
+              <a:ext uri="{FF2B5EF4-FFF2-40B4-BE49-F238E27FC236}">
+                <a16:creationId xmlns:a16="http://schemas.microsoft.com/office/drawing/2014/main" id="{7A502CCF-42F5-FF07-BCFB-923EFEFD30B7}"/>
+              </a:ext>
+            </a:extLst>
+          </p:cNvPr>
+          <p:cNvSpPr>
+            <a:spLocks noGrp="1"/>
+          </p:cNvSpPr>
+          <p:nvPr>
+            <p:ph idx="1"/>
+          </p:nvPr>
+        </p:nvSpPr>
+        <p:spPr/>
+        <p:txBody>
+          <a:bodyPr>
+            <a:normAutofit/>
+          </a:bodyPr>
+          <a:lstStyle/>
+          <a:p>
+            <a:r>
+              <a:rPr lang="cs-CZ" sz="3600" dirty="0"/>
+              <a:t> Hledání minimální kostry grafu</a:t>
+            </a:r>
+          </a:p>
+          <a:p>
+            <a:pPr lvl="1"/>
+            <a:r>
+              <a:rPr lang="cs-CZ" sz="3400" dirty="0"/>
+              <a:t>Navigace</a:t>
+            </a:r>
+          </a:p>
+          <a:p>
+            <a:pPr lvl="1"/>
+            <a:r>
+              <a:rPr lang="cs-CZ" sz="3400" dirty="0"/>
+              <a:t>Zavádění telekomunikačních sítí</a:t>
+            </a:r>
+          </a:p>
+          <a:p>
+            <a:pPr lvl="1"/>
+            <a:r>
+              <a:rPr lang="cs-CZ" sz="3400" dirty="0"/>
+              <a:t>Elektrifikace Moravy :)</a:t>
+            </a:r>
+          </a:p>
+        </p:txBody>
+      </p:sp>
+    </p:spTree>
+    <p:extLst>
+      <p:ext uri="{BB962C8B-B14F-4D97-AF65-F5344CB8AC3E}">
+        <p14:creationId xmlns:p14="http://schemas.microsoft.com/office/powerpoint/2010/main" val="2688987692"/>
+      </p:ext>
+    </p:extLst>
+  </p:cSld>
+  <p:clrMapOvr>
+    <a:masterClrMapping/>
+  </p:clrMapOvr>
+  <mc:AlternateContent xmlns:mc="http://schemas.openxmlformats.org/markup-compatibility/2006" xmlns:p159="http://schemas.microsoft.com/office/powerpoint/2015/09/main">
+    <mc:Choice Requires="p159">
+      <p:transition spd="slow">
+        <p159:morph option="byObject"/>
+      </p:transition>
+    </mc:Choice>
+    <mc:Fallback xmlns="">
+      <p:transition spd="slow">
+        <p:fade/>
+      </p:transition>
+    </mc:Fallback>
+  </mc:AlternateContent>
+</p:sld>
+</file>
+
+<file path=ppt/slides/slide20.xml><?xml version="1.0" encoding="utf-8"?>
 <p:sld xmlns:a="http://schemas.openxmlformats.org/drawingml/2006/main" xmlns:r="http://schemas.openxmlformats.org/officeDocument/2006/relationships" xmlns:p="http://schemas.openxmlformats.org/presentationml/2006/main">
   <p:cSld>
     <p:spTree>
@@ -8713,13 +9302,13 @@
   <p:clrMapOvr>
     <a:masterClrMapping/>
   </p:clrMapOvr>
-  <mc:AlternateContent xmlns:mc="http://schemas.openxmlformats.org/markup-compatibility/2006">
-    <mc:Choice xmlns:p159="http://schemas.microsoft.com/office/powerpoint/2015/09/main" Requires="p159">
+  <mc:AlternateContent xmlns:mc="http://schemas.openxmlformats.org/markup-compatibility/2006" xmlns:p159="http://schemas.microsoft.com/office/powerpoint/2015/09/main">
+    <mc:Choice Requires="p159">
       <p:transition spd="slow">
         <p159:morph option="byObject"/>
       </p:transition>
     </mc:Choice>
-    <mc:Fallback>
+    <mc:Fallback xmlns="">
       <p:transition spd="slow">
         <p:fade/>
       </p:transition>
@@ -8728,7 +9317,7 @@
 </p:sld>
 </file>
 
-<file path=ppt/slides/slide19.xml><?xml version="1.0" encoding="utf-8"?>
+<file path=ppt/slides/slide21.xml><?xml version="1.0" encoding="utf-8"?>
 <p:sld xmlns:a="http://schemas.openxmlformats.org/drawingml/2006/main" xmlns:r="http://schemas.openxmlformats.org/officeDocument/2006/relationships" xmlns:p="http://schemas.openxmlformats.org/presentationml/2006/main">
   <p:cSld>
     <p:spTree>
@@ -8813,13 +9402,13 @@
   <p:clrMapOvr>
     <a:masterClrMapping/>
   </p:clrMapOvr>
-  <mc:AlternateContent xmlns:mc="http://schemas.openxmlformats.org/markup-compatibility/2006">
-    <mc:Choice xmlns:p159="http://schemas.microsoft.com/office/powerpoint/2015/09/main" Requires="p159">
+  <mc:AlternateContent xmlns:mc="http://schemas.openxmlformats.org/markup-compatibility/2006" xmlns:p159="http://schemas.microsoft.com/office/powerpoint/2015/09/main">
+    <mc:Choice Requires="p159">
       <p:transition spd="slow">
         <p159:morph option="byObject"/>
       </p:transition>
     </mc:Choice>
-    <mc:Fallback>
+    <mc:Fallback xmlns="">
       <p:transition spd="slow">
         <p:fade/>
       </p:transition>
@@ -8828,114 +9417,7 @@
 </p:sld>
 </file>
 
-<file path=ppt/slides/slide2.xml><?xml version="1.0" encoding="utf-8"?>
-<p:sld xmlns:a="http://schemas.openxmlformats.org/drawingml/2006/main" xmlns:r="http://schemas.openxmlformats.org/officeDocument/2006/relationships" xmlns:p="http://schemas.openxmlformats.org/presentationml/2006/main">
-  <p:cSld>
-    <p:spTree>
-      <p:nvGrpSpPr>
-        <p:cNvPr id="1" name=""/>
-        <p:cNvGrpSpPr/>
-        <p:nvPr/>
-      </p:nvGrpSpPr>
-      <p:grpSpPr>
-        <a:xfrm>
-          <a:off x="0" y="0"/>
-          <a:ext cx="0" cy="0"/>
-          <a:chOff x="0" y="0"/>
-          <a:chExt cx="0" cy="0"/>
-        </a:xfrm>
-      </p:grpSpPr>
-      <p:sp>
-        <p:nvSpPr>
-          <p:cNvPr id="2" name="Nadpis 1">
-            <a:extLst>
-              <a:ext uri="{FF2B5EF4-FFF2-40B4-BE49-F238E27FC236}">
-                <a16:creationId xmlns:a16="http://schemas.microsoft.com/office/drawing/2014/main" id="{69750CBC-247B-C052-407A-51083D43B0D2}"/>
-              </a:ext>
-            </a:extLst>
-          </p:cNvPr>
-          <p:cNvSpPr>
-            <a:spLocks noGrp="1"/>
-          </p:cNvSpPr>
-          <p:nvPr>
-            <p:ph type="title"/>
-          </p:nvPr>
-        </p:nvSpPr>
-        <p:spPr/>
-        <p:txBody>
-          <a:bodyPr/>
-          <a:lstStyle/>
-          <a:p>
-            <a:r>
-              <a:rPr lang="cs-CZ" dirty="0"/>
-              <a:t>K čemu slouží?</a:t>
-            </a:r>
-          </a:p>
-        </p:txBody>
-      </p:sp>
-      <p:sp>
-        <p:nvSpPr>
-          <p:cNvPr id="3" name="Zástupný obsah 2">
-            <a:extLst>
-              <a:ext uri="{FF2B5EF4-FFF2-40B4-BE49-F238E27FC236}">
-                <a16:creationId xmlns:a16="http://schemas.microsoft.com/office/drawing/2014/main" id="{7A502CCF-42F5-FF07-BCFB-923EFEFD30B7}"/>
-              </a:ext>
-            </a:extLst>
-          </p:cNvPr>
-          <p:cNvSpPr>
-            <a:spLocks noGrp="1"/>
-          </p:cNvSpPr>
-          <p:nvPr>
-            <p:ph idx="1"/>
-          </p:nvPr>
-        </p:nvSpPr>
-        <p:spPr/>
-        <p:txBody>
-          <a:bodyPr>
-            <a:normAutofit/>
-          </a:bodyPr>
-          <a:lstStyle/>
-          <a:p>
-            <a:r>
-              <a:rPr lang="cs-CZ" sz="3600" dirty="0"/>
-              <a:t> Hledání minimální kostry grafu</a:t>
-            </a:r>
-          </a:p>
-          <a:p>
-            <a:pPr lvl="1"/>
-            <a:r>
-              <a:rPr lang="cs-CZ" sz="3400" dirty="0"/>
-              <a:t>Navigace, labyrinty,…</a:t>
-            </a:r>
-          </a:p>
-        </p:txBody>
-      </p:sp>
-    </p:spTree>
-    <p:extLst>
-      <p:ext uri="{BB962C8B-B14F-4D97-AF65-F5344CB8AC3E}">
-        <p14:creationId xmlns:p14="http://schemas.microsoft.com/office/powerpoint/2010/main" val="2688987692"/>
-      </p:ext>
-    </p:extLst>
-  </p:cSld>
-  <p:clrMapOvr>
-    <a:masterClrMapping/>
-  </p:clrMapOvr>
-  <mc:AlternateContent xmlns:mc="http://schemas.openxmlformats.org/markup-compatibility/2006">
-    <mc:Choice xmlns:p159="http://schemas.microsoft.com/office/powerpoint/2015/09/main" Requires="p159">
-      <p:transition spd="slow">
-        <p159:morph option="byObject"/>
-      </p:transition>
-    </mc:Choice>
-    <mc:Fallback>
-      <p:transition spd="slow">
-        <p:fade/>
-      </p:transition>
-    </mc:Fallback>
-  </mc:AlternateContent>
-</p:sld>
-</file>
-
-<file path=ppt/slides/slide20.xml><?xml version="1.0" encoding="utf-8"?>
+<file path=ppt/slides/slide22.xml><?xml version="1.0" encoding="utf-8"?>
 <p:sld xmlns:a="http://schemas.openxmlformats.org/drawingml/2006/main" xmlns:r="http://schemas.openxmlformats.org/officeDocument/2006/relationships" xmlns:p="http://schemas.openxmlformats.org/presentationml/2006/main">
   <p:cSld>
     <p:bg>
@@ -9111,13 +9593,13 @@
   <p:clrMapOvr>
     <a:masterClrMapping/>
   </p:clrMapOvr>
-  <mc:AlternateContent xmlns:mc="http://schemas.openxmlformats.org/markup-compatibility/2006">
-    <mc:Choice xmlns:p159="http://schemas.microsoft.com/office/powerpoint/2015/09/main" Requires="p159">
+  <mc:AlternateContent xmlns:mc="http://schemas.openxmlformats.org/markup-compatibility/2006" xmlns:p159="http://schemas.microsoft.com/office/powerpoint/2015/09/main">
+    <mc:Choice Requires="p159">
       <p:transition spd="slow">
         <p159:morph option="byObject"/>
       </p:transition>
     </mc:Choice>
-    <mc:Fallback>
+    <mc:Fallback xmlns="">
       <p:transition spd="slow">
         <p:fade/>
       </p:transition>
@@ -9126,7 +9608,7 @@
 </p:sld>
 </file>
 
-<file path=ppt/slides/slide21.xml><?xml version="1.0" encoding="utf-8"?>
+<file path=ppt/slides/slide23.xml><?xml version="1.0" encoding="utf-8"?>
 <p:sld xmlns:a="http://schemas.openxmlformats.org/drawingml/2006/main" xmlns:r="http://schemas.openxmlformats.org/officeDocument/2006/relationships" xmlns:p="http://schemas.openxmlformats.org/presentationml/2006/main">
   <p:cSld>
     <p:spTree>
@@ -9211,13 +9693,13 @@
   <p:clrMapOvr>
     <a:masterClrMapping/>
   </p:clrMapOvr>
-  <mc:AlternateContent xmlns:mc="http://schemas.openxmlformats.org/markup-compatibility/2006">
-    <mc:Choice xmlns:p159="http://schemas.microsoft.com/office/powerpoint/2015/09/main" Requires="p159">
+  <mc:AlternateContent xmlns:mc="http://schemas.openxmlformats.org/markup-compatibility/2006" xmlns:p159="http://schemas.microsoft.com/office/powerpoint/2015/09/main">
+    <mc:Choice Requires="p159">
       <p:transition spd="slow">
         <p159:morph option="byObject"/>
       </p:transition>
     </mc:Choice>
-    <mc:Fallback>
+    <mc:Fallback xmlns="">
       <p:transition spd="slow">
         <p:fade/>
       </p:transition>
@@ -9226,7 +9708,7 @@
 </p:sld>
 </file>
 
-<file path=ppt/slides/slide22.xml><?xml version="1.0" encoding="utf-8"?>
+<file path=ppt/slides/slide24.xml><?xml version="1.0" encoding="utf-8"?>
 <p:sld xmlns:a="http://schemas.openxmlformats.org/drawingml/2006/main" xmlns:r="http://schemas.openxmlformats.org/officeDocument/2006/relationships" xmlns:p="http://schemas.openxmlformats.org/presentationml/2006/main">
   <p:cSld>
     <p:spTree>
@@ -9390,13 +9872,13 @@
   <p:clrMapOvr>
     <a:masterClrMapping/>
   </p:clrMapOvr>
-  <mc:AlternateContent xmlns:mc="http://schemas.openxmlformats.org/markup-compatibility/2006">
-    <mc:Choice xmlns:p159="http://schemas.microsoft.com/office/powerpoint/2015/09/main" Requires="p159">
+  <mc:AlternateContent xmlns:mc="http://schemas.openxmlformats.org/markup-compatibility/2006" xmlns:p159="http://schemas.microsoft.com/office/powerpoint/2015/09/main">
+    <mc:Choice Requires="p159">
       <p:transition spd="slow">
         <p159:morph option="byObject"/>
       </p:transition>
     </mc:Choice>
-    <mc:Fallback>
+    <mc:Fallback xmlns="">
       <p:transition spd="slow">
         <p:fade/>
       </p:transition>
@@ -9490,13 +9972,13 @@
   <p:clrMapOvr>
     <a:masterClrMapping/>
   </p:clrMapOvr>
-  <mc:AlternateContent xmlns:mc="http://schemas.openxmlformats.org/markup-compatibility/2006">
-    <mc:Choice xmlns:p159="http://schemas.microsoft.com/office/powerpoint/2015/09/main" Requires="p159">
+  <mc:AlternateContent xmlns:mc="http://schemas.openxmlformats.org/markup-compatibility/2006" xmlns:p159="http://schemas.microsoft.com/office/powerpoint/2015/09/main">
+    <mc:Choice Requires="p159">
       <p:transition spd="slow">
         <p159:morph option="byObject"/>
       </p:transition>
     </mc:Choice>
-    <mc:Fallback>
+    <mc:Fallback xmlns="">
       <p:transition spd="slow">
         <p:fade/>
       </p:transition>
@@ -9682,13 +10164,13 @@
   <p:clrMapOvr>
     <a:masterClrMapping/>
   </p:clrMapOvr>
-  <mc:AlternateContent xmlns:mc="http://schemas.openxmlformats.org/markup-compatibility/2006">
-    <mc:Choice xmlns:p159="http://schemas.microsoft.com/office/powerpoint/2015/09/main" Requires="p159">
+  <mc:AlternateContent xmlns:mc="http://schemas.openxmlformats.org/markup-compatibility/2006" xmlns:p159="http://schemas.microsoft.com/office/powerpoint/2015/09/main">
+    <mc:Choice Requires="p159">
       <p:transition spd="slow">
         <p159:morph option="byObject"/>
       </p:transition>
     </mc:Choice>
-    <mc:Fallback>
+    <mc:Fallback xmlns="">
       <p:transition spd="slow">
         <p:fade/>
       </p:transition>
@@ -9698,6 +10180,118 @@
 </file>
 
 <file path=ppt/slides/slide5.xml><?xml version="1.0" encoding="utf-8"?>
+<p:sld xmlns:a="http://schemas.openxmlformats.org/drawingml/2006/main" xmlns:r="http://schemas.openxmlformats.org/officeDocument/2006/relationships" xmlns:p="http://schemas.openxmlformats.org/presentationml/2006/main">
+  <p:cSld>
+    <p:spTree>
+      <p:nvGrpSpPr>
+        <p:cNvPr id="1" name=""/>
+        <p:cNvGrpSpPr/>
+        <p:nvPr/>
+      </p:nvGrpSpPr>
+      <p:grpSpPr>
+        <a:xfrm>
+          <a:off x="0" y="0"/>
+          <a:ext cx="0" cy="0"/>
+          <a:chOff x="0" y="0"/>
+          <a:chExt cx="0" cy="0"/>
+        </a:xfrm>
+      </p:grpSpPr>
+      <p:sp>
+        <p:nvSpPr>
+          <p:cNvPr id="2" name="Nadpis 1">
+            <a:extLst>
+              <a:ext uri="{FF2B5EF4-FFF2-40B4-BE49-F238E27FC236}">
+                <a16:creationId xmlns:a16="http://schemas.microsoft.com/office/drawing/2014/main" id="{69750CBC-247B-C052-407A-51083D43B0D2}"/>
+              </a:ext>
+            </a:extLst>
+          </p:cNvPr>
+          <p:cNvSpPr>
+            <a:spLocks noGrp="1"/>
+          </p:cNvSpPr>
+          <p:nvPr>
+            <p:ph type="title"/>
+          </p:nvPr>
+        </p:nvSpPr>
+        <p:spPr>
+          <a:xfrm>
+            <a:off x="810000" y="447188"/>
+            <a:ext cx="10571998" cy="970450"/>
+          </a:xfrm>
+        </p:spPr>
+        <p:txBody>
+          <a:bodyPr>
+            <a:normAutofit/>
+          </a:bodyPr>
+          <a:lstStyle/>
+          <a:p>
+            <a:r>
+              <a:rPr lang="cs-CZ" dirty="0"/>
+              <a:t>Borůvkův algoritmus</a:t>
+            </a:r>
+          </a:p>
+        </p:txBody>
+      </p:sp>
+      <p:sp>
+        <p:nvSpPr>
+          <p:cNvPr id="3" name="Zástupný obsah 2">
+            <a:extLst>
+              <a:ext uri="{FF2B5EF4-FFF2-40B4-BE49-F238E27FC236}">
+                <a16:creationId xmlns:a16="http://schemas.microsoft.com/office/drawing/2014/main" id="{7A502CCF-42F5-FF07-BCFB-923EFEFD30B7}"/>
+              </a:ext>
+            </a:extLst>
+          </p:cNvPr>
+          <p:cNvSpPr>
+            <a:spLocks noGrp="1"/>
+          </p:cNvSpPr>
+          <p:nvPr>
+            <p:ph idx="1"/>
+          </p:nvPr>
+        </p:nvSpPr>
+        <p:spPr>
+          <a:xfrm>
+            <a:off x="818713" y="2413000"/>
+            <a:ext cx="10563285" cy="3632200"/>
+          </a:xfrm>
+        </p:spPr>
+        <p:txBody>
+          <a:bodyPr>
+            <a:noAutofit/>
+          </a:bodyPr>
+          <a:lstStyle/>
+          <a:p>
+            <a:r>
+              <a:rPr lang="cs-CZ" sz="3200" dirty="0"/>
+              <a:t>Princip</a:t>
+            </a:r>
+          </a:p>
+        </p:txBody>
+      </p:sp>
+    </p:spTree>
+    <p:extLst>
+      <p:ext uri="{BB962C8B-B14F-4D97-AF65-F5344CB8AC3E}">
+        <p14:creationId xmlns:p14="http://schemas.microsoft.com/office/powerpoint/2010/main" val="3311957147"/>
+      </p:ext>
+    </p:extLst>
+  </p:cSld>
+  <p:clrMapOvr>
+    <a:masterClrMapping/>
+  </p:clrMapOvr>
+  <mc:AlternateContent xmlns:mc="http://schemas.openxmlformats.org/markup-compatibility/2006" xmlns:p159="http://schemas.microsoft.com/office/powerpoint/2015/09/main">
+    <mc:Choice Requires="p159">
+      <p:transition spd="slow">
+        <p159:morph option="byObject"/>
+      </p:transition>
+    </mc:Choice>
+    <mc:Fallback xmlns="">
+      <p:transition spd="slow">
+        <p:fade/>
+      </p:transition>
+    </mc:Fallback>
+  </mc:AlternateContent>
+</p:sld>
+</file>
+
+<file path=ppt/slides/slide6.xml><?xml version="1.0" encoding="utf-8"?>
 <p:sld xmlns:a="http://schemas.openxmlformats.org/drawingml/2006/main" xmlns:r="http://schemas.openxmlformats.org/officeDocument/2006/relationships" xmlns:p="http://schemas.openxmlformats.org/presentationml/2006/main">
   <p:cSld>
     <p:spTree>
@@ -9794,13 +10388,13 @@
   <p:clrMapOvr>
     <a:masterClrMapping/>
   </p:clrMapOvr>
-  <mc:AlternateContent xmlns:mc="http://schemas.openxmlformats.org/markup-compatibility/2006">
-    <mc:Choice xmlns:p159="http://schemas.microsoft.com/office/powerpoint/2015/09/main" Requires="p159">
+  <mc:AlternateContent xmlns:mc="http://schemas.openxmlformats.org/markup-compatibility/2006" xmlns:p159="http://schemas.microsoft.com/office/powerpoint/2015/09/main">
+    <mc:Choice Requires="p159">
       <p:transition spd="slow">
         <p159:morph option="byObject"/>
       </p:transition>
     </mc:Choice>
-    <mc:Fallback>
+    <mc:Fallback xmlns="">
       <p:transition spd="slow">
         <p:fade/>
       </p:transition>
@@ -9809,7 +10403,7 @@
 </p:sld>
 </file>
 
-<file path=ppt/slides/slide6.xml><?xml version="1.0" encoding="utf-8"?>
+<file path=ppt/slides/slide7.xml><?xml version="1.0" encoding="utf-8"?>
 <p:sld xmlns:a="http://schemas.openxmlformats.org/drawingml/2006/main" xmlns:r="http://schemas.openxmlformats.org/officeDocument/2006/relationships" xmlns:p="http://schemas.openxmlformats.org/presentationml/2006/main">
   <p:cSld>
     <p:spTree>
@@ -9894,13 +10488,13 @@
   <p:clrMapOvr>
     <a:masterClrMapping/>
   </p:clrMapOvr>
-  <mc:AlternateContent xmlns:mc="http://schemas.openxmlformats.org/markup-compatibility/2006">
-    <mc:Choice xmlns:p159="http://schemas.microsoft.com/office/powerpoint/2015/09/main" Requires="p159">
+  <mc:AlternateContent xmlns:mc="http://schemas.openxmlformats.org/markup-compatibility/2006" xmlns:p159="http://schemas.microsoft.com/office/powerpoint/2015/09/main">
+    <mc:Choice Requires="p159">
       <p:transition spd="slow">
         <p159:morph option="byObject"/>
       </p:transition>
     </mc:Choice>
-    <mc:Fallback>
+    <mc:Fallback xmlns="">
       <p:transition spd="slow">
         <p:fade/>
       </p:transition>
@@ -9909,7 +10503,7 @@
 </p:sld>
 </file>
 
-<file path=ppt/slides/slide7.xml><?xml version="1.0" encoding="utf-8"?>
+<file path=ppt/slides/slide8.xml><?xml version="1.0" encoding="utf-8"?>
 <p:sld xmlns:a="http://schemas.openxmlformats.org/drawingml/2006/main" xmlns:r="http://schemas.openxmlformats.org/officeDocument/2006/relationships" xmlns:p="http://schemas.openxmlformats.org/presentationml/2006/main">
   <p:cSld>
     <p:bg>
@@ -10076,162 +10670,13 @@
   <p:clrMapOvr>
     <a:masterClrMapping/>
   </p:clrMapOvr>
-  <mc:AlternateContent xmlns:mc="http://schemas.openxmlformats.org/markup-compatibility/2006">
-    <mc:Choice xmlns:p159="http://schemas.microsoft.com/office/powerpoint/2015/09/main" Requires="p159">
+  <mc:AlternateContent xmlns:mc="http://schemas.openxmlformats.org/markup-compatibility/2006" xmlns:p159="http://schemas.microsoft.com/office/powerpoint/2015/09/main">
+    <mc:Choice Requires="p159">
       <p:transition spd="slow">
         <p159:morph option="byObject"/>
       </p:transition>
     </mc:Choice>
-    <mc:Fallback>
-      <p:transition spd="slow">
-        <p:fade/>
-      </p:transition>
-    </mc:Fallback>
-  </mc:AlternateContent>
-</p:sld>
-</file>
-
-<file path=ppt/slides/slide8.xml><?xml version="1.0" encoding="utf-8"?>
-<p:sld xmlns:a="http://schemas.openxmlformats.org/drawingml/2006/main" xmlns:r="http://schemas.openxmlformats.org/officeDocument/2006/relationships" xmlns:p="http://schemas.openxmlformats.org/presentationml/2006/main">
-  <p:cSld>
-    <p:spTree>
-      <p:nvGrpSpPr>
-        <p:cNvPr id="1" name=""/>
-        <p:cNvGrpSpPr/>
-        <p:nvPr/>
-      </p:nvGrpSpPr>
-      <p:grpSpPr>
-        <a:xfrm>
-          <a:off x="0" y="0"/>
-          <a:ext cx="0" cy="0"/>
-          <a:chOff x="0" y="0"/>
-          <a:chExt cx="0" cy="0"/>
-        </a:xfrm>
-      </p:grpSpPr>
-      <p:sp>
-        <p:nvSpPr>
-          <p:cNvPr id="2" name="Nadpis 1">
-            <a:extLst>
-              <a:ext uri="{FF2B5EF4-FFF2-40B4-BE49-F238E27FC236}">
-                <a16:creationId xmlns:a16="http://schemas.microsoft.com/office/drawing/2014/main" id="{69750CBC-247B-C052-407A-51083D43B0D2}"/>
-              </a:ext>
-            </a:extLst>
-          </p:cNvPr>
-          <p:cNvSpPr>
-            <a:spLocks noGrp="1"/>
-          </p:cNvSpPr>
-          <p:nvPr>
-            <p:ph type="title"/>
-          </p:nvPr>
-        </p:nvSpPr>
-        <p:spPr>
-          <a:xfrm>
-            <a:off x="810000" y="447188"/>
-            <a:ext cx="10571998" cy="970450"/>
-          </a:xfrm>
-        </p:spPr>
-        <p:txBody>
-          <a:bodyPr>
-            <a:normAutofit/>
-          </a:bodyPr>
-          <a:lstStyle/>
-          <a:p>
-            <a:r>
-              <a:rPr lang="cs-CZ" dirty="0"/>
-              <a:t>Jarníkův algoritmus</a:t>
-            </a:r>
-          </a:p>
-        </p:txBody>
-      </p:sp>
-      <p:sp>
-        <p:nvSpPr>
-          <p:cNvPr id="10" name="Zástupný obsah 9">
-            <a:extLst>
-              <a:ext uri="{FF2B5EF4-FFF2-40B4-BE49-F238E27FC236}">
-                <a16:creationId xmlns:a16="http://schemas.microsoft.com/office/drawing/2014/main" id="{4F42F304-CE65-6256-62C6-A22658DF79D3}"/>
-              </a:ext>
-            </a:extLst>
-          </p:cNvPr>
-          <p:cNvSpPr>
-            <a:spLocks noGrp="1"/>
-          </p:cNvSpPr>
-          <p:nvPr>
-            <p:ph idx="1"/>
-          </p:nvPr>
-        </p:nvSpPr>
-        <p:spPr/>
-        <p:txBody>
-          <a:bodyPr/>
-          <a:lstStyle/>
-          <a:p>
-            <a:endParaRPr lang="cs-CZ"/>
-          </a:p>
-        </p:txBody>
-      </p:sp>
-      <p:pic>
-        <p:nvPicPr>
-          <p:cNvPr id="5122" name="Picture 2" descr="Example of a graph">
-            <a:extLst>
-              <a:ext uri="{FF2B5EF4-FFF2-40B4-BE49-F238E27FC236}">
-                <a16:creationId xmlns:a16="http://schemas.microsoft.com/office/drawing/2014/main" id="{B0F4900D-47F1-3E76-C310-91D9309D620D}"/>
-              </a:ext>
-            </a:extLst>
-          </p:cNvPr>
-          <p:cNvPicPr>
-            <a:picLocks noChangeAspect="1" noChangeArrowheads="1"/>
-          </p:cNvPicPr>
-          <p:nvPr/>
-        </p:nvPicPr>
-        <p:blipFill>
-          <a:blip r:embed="rId3">
-            <a:extLst>
-              <a:ext uri="{28A0092B-C50C-407E-A947-70E740481C1C}">
-                <a14:useLocalDpi xmlns:a14="http://schemas.microsoft.com/office/drawing/2010/main" val="0"/>
-              </a:ext>
-            </a:extLst>
-          </a:blip>
-          <a:srcRect/>
-          <a:stretch>
-            <a:fillRect/>
-          </a:stretch>
-        </p:blipFill>
-        <p:spPr bwMode="auto">
-          <a:xfrm>
-            <a:off x="2100057" y="2222287"/>
-            <a:ext cx="7991885" cy="4635713"/>
-          </a:xfrm>
-          <a:prstGeom prst="rect">
-            <a:avLst/>
-          </a:prstGeom>
-          <a:noFill/>
-          <a:extLst>
-            <a:ext uri="{909E8E84-426E-40DD-AFC4-6F175D3DCCD1}">
-              <a14:hiddenFill xmlns:a14="http://schemas.microsoft.com/office/drawing/2010/main">
-                <a:solidFill>
-                  <a:srgbClr val="FFFFFF"/>
-                </a:solidFill>
-              </a14:hiddenFill>
-            </a:ext>
-          </a:extLst>
-        </p:spPr>
-      </p:pic>
-    </p:spTree>
-    <p:extLst>
-      <p:ext uri="{BB962C8B-B14F-4D97-AF65-F5344CB8AC3E}">
-        <p14:creationId xmlns:p14="http://schemas.microsoft.com/office/powerpoint/2010/main" val="3559235156"/>
-      </p:ext>
-    </p:extLst>
-  </p:cSld>
-  <p:clrMapOvr>
-    <a:masterClrMapping/>
-  </p:clrMapOvr>
-  <mc:AlternateContent xmlns:mc="http://schemas.openxmlformats.org/markup-compatibility/2006">
-    <mc:Choice xmlns:p159="http://schemas.microsoft.com/office/powerpoint/2015/09/main" Requires="p159">
-      <p:transition spd="slow">
-        <p159:morph option="byObject"/>
-      </p:transition>
-    </mc:Choice>
-    <mc:Fallback>
+    <mc:Fallback xmlns="">
       <p:transition spd="slow">
         <p:fade/>
       </p:transition>
@@ -10294,10 +10739,10 @@
       </p:sp>
       <p:sp>
         <p:nvSpPr>
-          <p:cNvPr id="10" name="Zástupný obsah 9">
+          <p:cNvPr id="3" name="Zástupný obsah 2">
             <a:extLst>
               <a:ext uri="{FF2B5EF4-FFF2-40B4-BE49-F238E27FC236}">
-                <a16:creationId xmlns:a16="http://schemas.microsoft.com/office/drawing/2014/main" id="{4F42F304-CE65-6256-62C6-A22658DF79D3}"/>
+                <a16:creationId xmlns:a16="http://schemas.microsoft.com/office/drawing/2014/main" id="{7A502CCF-42F5-FF07-BCFB-923EFEFD30B7}"/>
               </a:ext>
             </a:extLst>
           </p:cNvPr>
@@ -10308,79 +10753,67 @@
             <p:ph idx="1"/>
           </p:nvPr>
         </p:nvSpPr>
-        <p:spPr/>
-        <p:txBody>
-          <a:bodyPr/>
-          <a:lstStyle/>
-          <a:p>
-            <a:endParaRPr lang="cs-CZ"/>
-          </a:p>
-        </p:txBody>
-      </p:sp>
-      <p:pic>
-        <p:nvPicPr>
-          <p:cNvPr id="6146" name="Picture 2" descr="0 is selected as starting vertex">
-            <a:extLst>
-              <a:ext uri="{FF2B5EF4-FFF2-40B4-BE49-F238E27FC236}">
-                <a16:creationId xmlns:a16="http://schemas.microsoft.com/office/drawing/2014/main" id="{6A33E9A0-0FA5-8C8C-B0C5-3AD7AAB23BAE}"/>
-              </a:ext>
-            </a:extLst>
-          </p:cNvPr>
-          <p:cNvPicPr>
-            <a:picLocks noChangeAspect="1" noChangeArrowheads="1"/>
-          </p:cNvPicPr>
-          <p:nvPr/>
-        </p:nvPicPr>
-        <p:blipFill>
-          <a:blip r:embed="rId3">
-            <a:extLst>
-              <a:ext uri="{28A0092B-C50C-407E-A947-70E740481C1C}">
-                <a14:useLocalDpi xmlns:a14="http://schemas.microsoft.com/office/drawing/2010/main" val="0"/>
-              </a:ext>
-            </a:extLst>
-          </a:blip>
-          <a:srcRect/>
-          <a:stretch>
-            <a:fillRect/>
-          </a:stretch>
-        </p:blipFill>
-        <p:spPr bwMode="auto">
+        <p:spPr>
           <a:xfrm>
-            <a:off x="2095013" y="2222287"/>
-            <a:ext cx="8001973" cy="4641564"/>
+            <a:off x="818713" y="2413000"/>
+            <a:ext cx="10563285" cy="3632200"/>
           </a:xfrm>
-          <a:prstGeom prst="rect">
-            <a:avLst/>
-          </a:prstGeom>
-          <a:noFill/>
-          <a:extLst>
-            <a:ext uri="{909E8E84-426E-40DD-AFC4-6F175D3DCCD1}">
-              <a14:hiddenFill xmlns:a14="http://schemas.microsoft.com/office/drawing/2010/main">
-                <a:solidFill>
-                  <a:srgbClr val="FFFFFF"/>
-                </a:solidFill>
-              </a14:hiddenFill>
-            </a:ext>
-          </a:extLst>
         </p:spPr>
-      </p:pic>
+        <p:txBody>
+          <a:bodyPr>
+            <a:noAutofit/>
+          </a:bodyPr>
+          <a:lstStyle/>
+          <a:p>
+            <a:r>
+              <a:rPr lang="cs-CZ" sz="3200" dirty="0"/>
+              <a:t>Princip:</a:t>
+            </a:r>
+          </a:p>
+          <a:p>
+            <a:pPr lvl="1"/>
+            <a:r>
+              <a:rPr lang="cs-CZ" sz="3000" dirty="0"/>
+              <a:t>Najdi nejlevnější nenavštívenou cestu a označ počátek i konec za navštívené</a:t>
+            </a:r>
+          </a:p>
+          <a:p>
+            <a:pPr lvl="1"/>
+            <a:r>
+              <a:rPr lang="cs-CZ" sz="3000" dirty="0"/>
+              <a:t>Přidej nejlevnější nalezenou cestu do minimální kostry</a:t>
+            </a:r>
+          </a:p>
+          <a:p>
+            <a:pPr lvl="1"/>
+            <a:r>
+              <a:rPr lang="cs-CZ" sz="3000" dirty="0"/>
+              <a:t>Opakuj dokud nenavštívíš všechny body</a:t>
+            </a:r>
+          </a:p>
+          <a:p>
+            <a:pPr lvl="1"/>
+            <a:endParaRPr lang="cs-CZ" sz="3000" dirty="0"/>
+          </a:p>
+        </p:txBody>
+      </p:sp>
     </p:spTree>
     <p:extLst>
       <p:ext uri="{BB962C8B-B14F-4D97-AF65-F5344CB8AC3E}">
-        <p14:creationId xmlns:p14="http://schemas.microsoft.com/office/powerpoint/2010/main" val="2752603806"/>
+        <p14:creationId xmlns:p14="http://schemas.microsoft.com/office/powerpoint/2010/main" val="3670569241"/>
       </p:ext>
     </p:extLst>
   </p:cSld>
   <p:clrMapOvr>
     <a:masterClrMapping/>
   </p:clrMapOvr>
-  <mc:AlternateContent xmlns:mc="http://schemas.openxmlformats.org/markup-compatibility/2006">
-    <mc:Choice xmlns:p159="http://schemas.microsoft.com/office/powerpoint/2015/09/main" Requires="p159">
+  <mc:AlternateContent xmlns:mc="http://schemas.openxmlformats.org/markup-compatibility/2006" xmlns:p159="http://schemas.microsoft.com/office/powerpoint/2015/09/main">
+    <mc:Choice Requires="p159">
       <p:transition spd="slow">
         <p159:morph option="byObject"/>
       </p:transition>
     </mc:Choice>
-    <mc:Fallback>
+    <mc:Fallback xmlns="">
       <p:transition spd="slow">
         <p:fade/>
       </p:transition>

</xml_diff>

<commit_message>
[Feature] Add Boruvka ALG principle to presentation
</commit_message>
<xml_diff>
--- a/output-presentation.pptx
+++ b/output-presentation.pptx
@@ -5,7 +5,7 @@
     <p:sldMasterId id="2147483761" r:id="rId1"/>
   </p:sldMasterIdLst>
   <p:notesMasterIdLst>
-    <p:notesMasterId r:id="rId26"/>
+    <p:notesMasterId r:id="rId29"/>
   </p:notesMasterIdLst>
   <p:sldIdLst>
     <p:sldId id="256" r:id="rId2"/>
@@ -13,25 +13,28 @@
     <p:sldId id="258" r:id="rId4"/>
     <p:sldId id="259" r:id="rId5"/>
     <p:sldId id="282" r:id="rId6"/>
-    <p:sldId id="260" r:id="rId7"/>
-    <p:sldId id="261" r:id="rId8"/>
-    <p:sldId id="262" r:id="rId9"/>
-    <p:sldId id="283" r:id="rId10"/>
-    <p:sldId id="264" r:id="rId11"/>
-    <p:sldId id="265" r:id="rId12"/>
-    <p:sldId id="267" r:id="rId13"/>
-    <p:sldId id="268" r:id="rId14"/>
-    <p:sldId id="269" r:id="rId15"/>
-    <p:sldId id="271" r:id="rId16"/>
-    <p:sldId id="273" r:id="rId17"/>
-    <p:sldId id="274" r:id="rId18"/>
-    <p:sldId id="275" r:id="rId19"/>
-    <p:sldId id="276" r:id="rId20"/>
-    <p:sldId id="277" r:id="rId21"/>
-    <p:sldId id="278" r:id="rId22"/>
-    <p:sldId id="279" r:id="rId23"/>
-    <p:sldId id="280" r:id="rId24"/>
-    <p:sldId id="281" r:id="rId25"/>
+    <p:sldId id="284" r:id="rId7"/>
+    <p:sldId id="285" r:id="rId8"/>
+    <p:sldId id="286" r:id="rId9"/>
+    <p:sldId id="260" r:id="rId10"/>
+    <p:sldId id="261" r:id="rId11"/>
+    <p:sldId id="262" r:id="rId12"/>
+    <p:sldId id="283" r:id="rId13"/>
+    <p:sldId id="264" r:id="rId14"/>
+    <p:sldId id="265" r:id="rId15"/>
+    <p:sldId id="267" r:id="rId16"/>
+    <p:sldId id="268" r:id="rId17"/>
+    <p:sldId id="269" r:id="rId18"/>
+    <p:sldId id="271" r:id="rId19"/>
+    <p:sldId id="273" r:id="rId20"/>
+    <p:sldId id="274" r:id="rId21"/>
+    <p:sldId id="275" r:id="rId22"/>
+    <p:sldId id="276" r:id="rId23"/>
+    <p:sldId id="277" r:id="rId24"/>
+    <p:sldId id="278" r:id="rId25"/>
+    <p:sldId id="279" r:id="rId26"/>
+    <p:sldId id="280" r:id="rId27"/>
+    <p:sldId id="281" r:id="rId28"/>
   </p:sldIdLst>
   <p:sldSz cx="12192000" cy="6858000"/>
   <p:notesSz cx="6858000" cy="9144000"/>
@@ -645,7 +648,7 @@
     </p:spTree>
     <p:extLst>
       <p:ext uri="{BB962C8B-B14F-4D97-AF65-F5344CB8AC3E}">
-        <p14:creationId xmlns:p14="http://schemas.microsoft.com/office/powerpoint/2010/main" val="3259443989"/>
+        <p14:creationId xmlns:p14="http://schemas.microsoft.com/office/powerpoint/2010/main" val="3436311921"/>
       </p:ext>
     </p:extLst>
   </p:cSld>
@@ -729,7 +732,7 @@
     </p:spTree>
     <p:extLst>
       <p:ext uri="{BB962C8B-B14F-4D97-AF65-F5344CB8AC3E}">
-        <p14:creationId xmlns:p14="http://schemas.microsoft.com/office/powerpoint/2010/main" val="1292418824"/>
+        <p14:creationId xmlns:p14="http://schemas.microsoft.com/office/powerpoint/2010/main" val="1092438624"/>
       </p:ext>
     </p:extLst>
   </p:cSld>
@@ -813,7 +816,7 @@
     </p:spTree>
     <p:extLst>
       <p:ext uri="{BB962C8B-B14F-4D97-AF65-F5344CB8AC3E}">
-        <p14:creationId xmlns:p14="http://schemas.microsoft.com/office/powerpoint/2010/main" val="3367930030"/>
+        <p14:creationId xmlns:p14="http://schemas.microsoft.com/office/powerpoint/2010/main" val="1411167505"/>
       </p:ext>
     </p:extLst>
   </p:cSld>
@@ -897,7 +900,7 @@
     </p:spTree>
     <p:extLst>
       <p:ext uri="{BB962C8B-B14F-4D97-AF65-F5344CB8AC3E}">
-        <p14:creationId xmlns:p14="http://schemas.microsoft.com/office/powerpoint/2010/main" val="3128011289"/>
+        <p14:creationId xmlns:p14="http://schemas.microsoft.com/office/powerpoint/2010/main" val="3259443989"/>
       </p:ext>
     </p:extLst>
   </p:cSld>
@@ -981,7 +984,7 @@
     </p:spTree>
     <p:extLst>
       <p:ext uri="{BB962C8B-B14F-4D97-AF65-F5344CB8AC3E}">
-        <p14:creationId xmlns:p14="http://schemas.microsoft.com/office/powerpoint/2010/main" val="4158966156"/>
+        <p14:creationId xmlns:p14="http://schemas.microsoft.com/office/powerpoint/2010/main" val="1292418824"/>
       </p:ext>
     </p:extLst>
   </p:cSld>
@@ -1065,7 +1068,7 @@
     </p:spTree>
     <p:extLst>
       <p:ext uri="{BB962C8B-B14F-4D97-AF65-F5344CB8AC3E}">
-        <p14:creationId xmlns:p14="http://schemas.microsoft.com/office/powerpoint/2010/main" val="203438188"/>
+        <p14:creationId xmlns:p14="http://schemas.microsoft.com/office/powerpoint/2010/main" val="3367930030"/>
       </p:ext>
     </p:extLst>
   </p:cSld>
@@ -1149,7 +1152,7 @@
     </p:spTree>
     <p:extLst>
       <p:ext uri="{BB962C8B-B14F-4D97-AF65-F5344CB8AC3E}">
-        <p14:creationId xmlns:p14="http://schemas.microsoft.com/office/powerpoint/2010/main" val="316095354"/>
+        <p14:creationId xmlns:p14="http://schemas.microsoft.com/office/powerpoint/2010/main" val="3128011289"/>
       </p:ext>
     </p:extLst>
   </p:cSld>
@@ -1224,7 +1227,7 @@
           <a:p>
             <a:fld id="{888E3A86-DC57-4CCA-AA0B-A5DE7CB3B517}" type="slidenum">
               <a:rPr lang="cs-CZ" smtClean="0"/>
-              <a:t>22</a:t>
+              <a:t>21</a:t>
             </a:fld>
             <a:endParaRPr lang="cs-CZ"/>
           </a:p>
@@ -1233,7 +1236,7 @@
     </p:spTree>
     <p:extLst>
       <p:ext uri="{BB962C8B-B14F-4D97-AF65-F5344CB8AC3E}">
-        <p14:creationId xmlns:p14="http://schemas.microsoft.com/office/powerpoint/2010/main" val="3784792062"/>
+        <p14:creationId xmlns:p14="http://schemas.microsoft.com/office/powerpoint/2010/main" val="4158966156"/>
       </p:ext>
     </p:extLst>
   </p:cSld>
@@ -1308,7 +1311,7 @@
           <a:p>
             <a:fld id="{888E3A86-DC57-4CCA-AA0B-A5DE7CB3B517}" type="slidenum">
               <a:rPr lang="cs-CZ" smtClean="0"/>
-              <a:t>24</a:t>
+              <a:t>22</a:t>
             </a:fld>
             <a:endParaRPr lang="cs-CZ"/>
           </a:p>
@@ -1317,7 +1320,91 @@
     </p:spTree>
     <p:extLst>
       <p:ext uri="{BB962C8B-B14F-4D97-AF65-F5344CB8AC3E}">
-        <p14:creationId xmlns:p14="http://schemas.microsoft.com/office/powerpoint/2010/main" val="4057757832"/>
+        <p14:creationId xmlns:p14="http://schemas.microsoft.com/office/powerpoint/2010/main" val="203438188"/>
+      </p:ext>
+    </p:extLst>
+  </p:cSld>
+  <p:clrMapOvr>
+    <a:masterClrMapping/>
+  </p:clrMapOvr>
+</p:notes>
+</file>
+
+<file path=ppt/notesSlides/notesSlide19.xml><?xml version="1.0" encoding="utf-8"?>
+<p:notes xmlns:a="http://schemas.openxmlformats.org/drawingml/2006/main" xmlns:r="http://schemas.openxmlformats.org/officeDocument/2006/relationships" xmlns:p="http://schemas.openxmlformats.org/presentationml/2006/main">
+  <p:cSld>
+    <p:spTree>
+      <p:nvGrpSpPr>
+        <p:cNvPr id="1" name=""/>
+        <p:cNvGrpSpPr/>
+        <p:nvPr/>
+      </p:nvGrpSpPr>
+      <p:grpSpPr>
+        <a:xfrm>
+          <a:off x="0" y="0"/>
+          <a:ext cx="0" cy="0"/>
+          <a:chOff x="0" y="0"/>
+          <a:chExt cx="0" cy="0"/>
+        </a:xfrm>
+      </p:grpSpPr>
+      <p:sp>
+        <p:nvSpPr>
+          <p:cNvPr id="2" name="Zástupný symbol pro obrázek snímku 1"/>
+          <p:cNvSpPr>
+            <a:spLocks noGrp="1" noRot="1" noChangeAspect="1"/>
+          </p:cNvSpPr>
+          <p:nvPr>
+            <p:ph type="sldImg"/>
+          </p:nvPr>
+        </p:nvSpPr>
+        <p:spPr/>
+      </p:sp>
+      <p:sp>
+        <p:nvSpPr>
+          <p:cNvPr id="3" name="Zástupný symbol pro poznámky 2"/>
+          <p:cNvSpPr>
+            <a:spLocks noGrp="1"/>
+          </p:cNvSpPr>
+          <p:nvPr>
+            <p:ph type="body" idx="1"/>
+          </p:nvPr>
+        </p:nvSpPr>
+        <p:spPr/>
+        <p:txBody>
+          <a:bodyPr/>
+          <a:lstStyle/>
+          <a:p>
+            <a:endParaRPr lang="cs-CZ" dirty="0"/>
+          </a:p>
+        </p:txBody>
+      </p:sp>
+      <p:sp>
+        <p:nvSpPr>
+          <p:cNvPr id="4" name="Zástupný symbol pro číslo snímku 3"/>
+          <p:cNvSpPr>
+            <a:spLocks noGrp="1"/>
+          </p:cNvSpPr>
+          <p:nvPr>
+            <p:ph type="sldNum" sz="quarter" idx="5"/>
+          </p:nvPr>
+        </p:nvSpPr>
+        <p:spPr/>
+        <p:txBody>
+          <a:bodyPr/>
+          <a:lstStyle/>
+          <a:p>
+            <a:fld id="{888E3A86-DC57-4CCA-AA0B-A5DE7CB3B517}" type="slidenum">
+              <a:rPr lang="cs-CZ" smtClean="0"/>
+              <a:t>23</a:t>
+            </a:fld>
+            <a:endParaRPr lang="cs-CZ"/>
+          </a:p>
+        </p:txBody>
+      </p:sp>
+    </p:spTree>
+    <p:extLst>
+      <p:ext uri="{BB962C8B-B14F-4D97-AF65-F5344CB8AC3E}">
+        <p14:creationId xmlns:p14="http://schemas.microsoft.com/office/powerpoint/2010/main" val="316095354"/>
       </p:ext>
     </p:extLst>
   </p:cSld>
@@ -1411,6 +1498,174 @@
 </p:notes>
 </file>
 
+<file path=ppt/notesSlides/notesSlide20.xml><?xml version="1.0" encoding="utf-8"?>
+<p:notes xmlns:a="http://schemas.openxmlformats.org/drawingml/2006/main" xmlns:r="http://schemas.openxmlformats.org/officeDocument/2006/relationships" xmlns:p="http://schemas.openxmlformats.org/presentationml/2006/main">
+  <p:cSld>
+    <p:spTree>
+      <p:nvGrpSpPr>
+        <p:cNvPr id="1" name=""/>
+        <p:cNvGrpSpPr/>
+        <p:nvPr/>
+      </p:nvGrpSpPr>
+      <p:grpSpPr>
+        <a:xfrm>
+          <a:off x="0" y="0"/>
+          <a:ext cx="0" cy="0"/>
+          <a:chOff x="0" y="0"/>
+          <a:chExt cx="0" cy="0"/>
+        </a:xfrm>
+      </p:grpSpPr>
+      <p:sp>
+        <p:nvSpPr>
+          <p:cNvPr id="2" name="Zástupný symbol pro obrázek snímku 1"/>
+          <p:cNvSpPr>
+            <a:spLocks noGrp="1" noRot="1" noChangeAspect="1"/>
+          </p:cNvSpPr>
+          <p:nvPr>
+            <p:ph type="sldImg"/>
+          </p:nvPr>
+        </p:nvSpPr>
+        <p:spPr/>
+      </p:sp>
+      <p:sp>
+        <p:nvSpPr>
+          <p:cNvPr id="3" name="Zástupný symbol pro poznámky 2"/>
+          <p:cNvSpPr>
+            <a:spLocks noGrp="1"/>
+          </p:cNvSpPr>
+          <p:nvPr>
+            <p:ph type="body" idx="1"/>
+          </p:nvPr>
+        </p:nvSpPr>
+        <p:spPr/>
+        <p:txBody>
+          <a:bodyPr/>
+          <a:lstStyle/>
+          <a:p>
+            <a:endParaRPr lang="cs-CZ" dirty="0"/>
+          </a:p>
+        </p:txBody>
+      </p:sp>
+      <p:sp>
+        <p:nvSpPr>
+          <p:cNvPr id="4" name="Zástupný symbol pro číslo snímku 3"/>
+          <p:cNvSpPr>
+            <a:spLocks noGrp="1"/>
+          </p:cNvSpPr>
+          <p:nvPr>
+            <p:ph type="sldNum" sz="quarter" idx="5"/>
+          </p:nvPr>
+        </p:nvSpPr>
+        <p:spPr/>
+        <p:txBody>
+          <a:bodyPr/>
+          <a:lstStyle/>
+          <a:p>
+            <a:fld id="{888E3A86-DC57-4CCA-AA0B-A5DE7CB3B517}" type="slidenum">
+              <a:rPr lang="cs-CZ" smtClean="0"/>
+              <a:t>25</a:t>
+            </a:fld>
+            <a:endParaRPr lang="cs-CZ"/>
+          </a:p>
+        </p:txBody>
+      </p:sp>
+    </p:spTree>
+    <p:extLst>
+      <p:ext uri="{BB962C8B-B14F-4D97-AF65-F5344CB8AC3E}">
+        <p14:creationId xmlns:p14="http://schemas.microsoft.com/office/powerpoint/2010/main" val="3784792062"/>
+      </p:ext>
+    </p:extLst>
+  </p:cSld>
+  <p:clrMapOvr>
+    <a:masterClrMapping/>
+  </p:clrMapOvr>
+</p:notes>
+</file>
+
+<file path=ppt/notesSlides/notesSlide21.xml><?xml version="1.0" encoding="utf-8"?>
+<p:notes xmlns:a="http://schemas.openxmlformats.org/drawingml/2006/main" xmlns:r="http://schemas.openxmlformats.org/officeDocument/2006/relationships" xmlns:p="http://schemas.openxmlformats.org/presentationml/2006/main">
+  <p:cSld>
+    <p:spTree>
+      <p:nvGrpSpPr>
+        <p:cNvPr id="1" name=""/>
+        <p:cNvGrpSpPr/>
+        <p:nvPr/>
+      </p:nvGrpSpPr>
+      <p:grpSpPr>
+        <a:xfrm>
+          <a:off x="0" y="0"/>
+          <a:ext cx="0" cy="0"/>
+          <a:chOff x="0" y="0"/>
+          <a:chExt cx="0" cy="0"/>
+        </a:xfrm>
+      </p:grpSpPr>
+      <p:sp>
+        <p:nvSpPr>
+          <p:cNvPr id="2" name="Zástupný symbol pro obrázek snímku 1"/>
+          <p:cNvSpPr>
+            <a:spLocks noGrp="1" noRot="1" noChangeAspect="1"/>
+          </p:cNvSpPr>
+          <p:nvPr>
+            <p:ph type="sldImg"/>
+          </p:nvPr>
+        </p:nvSpPr>
+        <p:spPr/>
+      </p:sp>
+      <p:sp>
+        <p:nvSpPr>
+          <p:cNvPr id="3" name="Zástupný symbol pro poznámky 2"/>
+          <p:cNvSpPr>
+            <a:spLocks noGrp="1"/>
+          </p:cNvSpPr>
+          <p:nvPr>
+            <p:ph type="body" idx="1"/>
+          </p:nvPr>
+        </p:nvSpPr>
+        <p:spPr/>
+        <p:txBody>
+          <a:bodyPr/>
+          <a:lstStyle/>
+          <a:p>
+            <a:endParaRPr lang="cs-CZ" dirty="0"/>
+          </a:p>
+        </p:txBody>
+      </p:sp>
+      <p:sp>
+        <p:nvSpPr>
+          <p:cNvPr id="4" name="Zástupný symbol pro číslo snímku 3"/>
+          <p:cNvSpPr>
+            <a:spLocks noGrp="1"/>
+          </p:cNvSpPr>
+          <p:nvPr>
+            <p:ph type="sldNum" sz="quarter" idx="5"/>
+          </p:nvPr>
+        </p:nvSpPr>
+        <p:spPr/>
+        <p:txBody>
+          <a:bodyPr/>
+          <a:lstStyle/>
+          <a:p>
+            <a:fld id="{888E3A86-DC57-4CCA-AA0B-A5DE7CB3B517}" type="slidenum">
+              <a:rPr lang="cs-CZ" smtClean="0"/>
+              <a:t>27</a:t>
+            </a:fld>
+            <a:endParaRPr lang="cs-CZ"/>
+          </a:p>
+        </p:txBody>
+      </p:sp>
+    </p:spTree>
+    <p:extLst>
+      <p:ext uri="{BB962C8B-B14F-4D97-AF65-F5344CB8AC3E}">
+        <p14:creationId xmlns:p14="http://schemas.microsoft.com/office/powerpoint/2010/main" val="4057757832"/>
+      </p:ext>
+    </p:extLst>
+  </p:cSld>
+  <p:clrMapOvr>
+    <a:masterClrMapping/>
+  </p:clrMapOvr>
+</p:notes>
+</file>
+
 <file path=ppt/notesSlides/notesSlide3.xml><?xml version="1.0" encoding="utf-8"?>
 <p:notes xmlns:a="http://schemas.openxmlformats.org/drawingml/2006/main" xmlns:r="http://schemas.openxmlformats.org/officeDocument/2006/relationships" xmlns:p="http://schemas.openxmlformats.org/presentationml/2006/main">
   <p:cSld>
@@ -1485,7 +1740,7 @@
     </p:spTree>
     <p:extLst>
       <p:ext uri="{BB962C8B-B14F-4D97-AF65-F5344CB8AC3E}">
-        <p14:creationId xmlns:p14="http://schemas.microsoft.com/office/powerpoint/2010/main" val="763689810"/>
+        <p14:creationId xmlns:p14="http://schemas.microsoft.com/office/powerpoint/2010/main" val="3064600558"/>
       </p:ext>
     </p:extLst>
   </p:cSld>
@@ -1560,7 +1815,7 @@
           <a:p>
             <a:fld id="{888E3A86-DC57-4CCA-AA0B-A5DE7CB3B517}" type="slidenum">
               <a:rPr lang="cs-CZ" smtClean="0"/>
-              <a:t>8</a:t>
+              <a:t>7</a:t>
             </a:fld>
             <a:endParaRPr lang="cs-CZ"/>
           </a:p>
@@ -1569,7 +1824,7 @@
     </p:spTree>
     <p:extLst>
       <p:ext uri="{BB962C8B-B14F-4D97-AF65-F5344CB8AC3E}">
-        <p14:creationId xmlns:p14="http://schemas.microsoft.com/office/powerpoint/2010/main" val="1280053993"/>
+        <p14:creationId xmlns:p14="http://schemas.microsoft.com/office/powerpoint/2010/main" val="3575580506"/>
       </p:ext>
     </p:extLst>
   </p:cSld>
@@ -1644,7 +1899,7 @@
           <a:p>
             <a:fld id="{888E3A86-DC57-4CCA-AA0B-A5DE7CB3B517}" type="slidenum">
               <a:rPr lang="cs-CZ" smtClean="0"/>
-              <a:t>9</a:t>
+              <a:t>8</a:t>
             </a:fld>
             <a:endParaRPr lang="cs-CZ"/>
           </a:p>
@@ -1653,7 +1908,7 @@
     </p:spTree>
     <p:extLst>
       <p:ext uri="{BB962C8B-B14F-4D97-AF65-F5344CB8AC3E}">
-        <p14:creationId xmlns:p14="http://schemas.microsoft.com/office/powerpoint/2010/main" val="915990675"/>
+        <p14:creationId xmlns:p14="http://schemas.microsoft.com/office/powerpoint/2010/main" val="86031465"/>
       </p:ext>
     </p:extLst>
   </p:cSld>
@@ -1728,7 +1983,7 @@
           <a:p>
             <a:fld id="{888E3A86-DC57-4CCA-AA0B-A5DE7CB3B517}" type="slidenum">
               <a:rPr lang="cs-CZ" smtClean="0"/>
-              <a:t>10</a:t>
+              <a:t>9</a:t>
             </a:fld>
             <a:endParaRPr lang="cs-CZ"/>
           </a:p>
@@ -1737,7 +1992,7 @@
     </p:spTree>
     <p:extLst>
       <p:ext uri="{BB962C8B-B14F-4D97-AF65-F5344CB8AC3E}">
-        <p14:creationId xmlns:p14="http://schemas.microsoft.com/office/powerpoint/2010/main" val="300219515"/>
+        <p14:creationId xmlns:p14="http://schemas.microsoft.com/office/powerpoint/2010/main" val="763689810"/>
       </p:ext>
     </p:extLst>
   </p:cSld>
@@ -1821,7 +2076,7 @@
     </p:spTree>
     <p:extLst>
       <p:ext uri="{BB962C8B-B14F-4D97-AF65-F5344CB8AC3E}">
-        <p14:creationId xmlns:p14="http://schemas.microsoft.com/office/powerpoint/2010/main" val="3436311921"/>
+        <p14:creationId xmlns:p14="http://schemas.microsoft.com/office/powerpoint/2010/main" val="1280053993"/>
       </p:ext>
     </p:extLst>
   </p:cSld>
@@ -1905,7 +2160,7 @@
     </p:spTree>
     <p:extLst>
       <p:ext uri="{BB962C8B-B14F-4D97-AF65-F5344CB8AC3E}">
-        <p14:creationId xmlns:p14="http://schemas.microsoft.com/office/powerpoint/2010/main" val="1092438624"/>
+        <p14:creationId xmlns:p14="http://schemas.microsoft.com/office/powerpoint/2010/main" val="915990675"/>
       </p:ext>
     </p:extLst>
   </p:cSld>
@@ -1989,7 +2244,7 @@
     </p:spTree>
     <p:extLst>
       <p:ext uri="{BB962C8B-B14F-4D97-AF65-F5344CB8AC3E}">
-        <p14:creationId xmlns:p14="http://schemas.microsoft.com/office/powerpoint/2010/main" val="1411167505"/>
+        <p14:creationId xmlns:p14="http://schemas.microsoft.com/office/powerpoint/2010/main" val="300219515"/>
       </p:ext>
     </p:extLst>
   </p:cSld>
@@ -2094,7 +2349,7 @@
           <a:effectLst/>
           <a:extLst>
             <a:ext uri="{91240B29-F687-4f45-9708-019B960494DF}">
-              <a14:hiddenLine xmlns:a14="http://schemas.microsoft.com/office/drawing/2010/main" xmlns="" w="9525">
+              <a14:hiddenLine xmlns="" xmlns:a14="http://schemas.microsoft.com/office/drawing/2010/main" w="9525">
                 <a:solidFill>
                   <a:srgbClr val="000000"/>
                 </a:solidFill>
@@ -3664,7 +3919,7 @@
           <a:ln/>
           <a:extLst>
             <a:ext uri="{91240B29-F687-4f45-9708-019B960494DF}">
-              <a14:hiddenLine xmlns:a14="http://schemas.microsoft.com/office/drawing/2010/main" xmlns="" w="9525">
+              <a14:hiddenLine xmlns="" xmlns:a14="http://schemas.microsoft.com/office/drawing/2010/main" w="9525">
                 <a:solidFill>
                   <a:srgbClr val="000000"/>
                 </a:solidFill>
@@ -3951,7 +4206,7 @@
           <a:ln/>
           <a:extLst>
             <a:ext uri="{91240B29-F687-4f45-9708-019B960494DF}">
-              <a14:hiddenLine xmlns:a14="http://schemas.microsoft.com/office/drawing/2010/main" xmlns="" w="9525">
+              <a14:hiddenLine xmlns="" xmlns:a14="http://schemas.microsoft.com/office/drawing/2010/main" w="9525">
                 <a:solidFill>
                   <a:srgbClr val="000000"/>
                 </a:solidFill>
@@ -4246,7 +4501,7 @@
           <a:ln/>
           <a:extLst>
             <a:ext uri="{91240B29-F687-4f45-9708-019B960494DF}">
-              <a14:hiddenLine xmlns:a14="http://schemas.microsoft.com/office/drawing/2010/main" xmlns="" w="9525">
+              <a14:hiddenLine xmlns="" xmlns:a14="http://schemas.microsoft.com/office/drawing/2010/main" w="9525">
                 <a:solidFill>
                   <a:srgbClr val="000000"/>
                 </a:solidFill>
@@ -4896,7 +5151,7 @@
           <a:ln/>
           <a:extLst>
             <a:ext uri="{91240B29-F687-4f45-9708-019B960494DF}">
-              <a14:hiddenLine xmlns:a14="http://schemas.microsoft.com/office/drawing/2010/main" xmlns="" w="9525">
+              <a14:hiddenLine xmlns="" xmlns:a14="http://schemas.microsoft.com/office/drawing/2010/main" w="9525">
                 <a:solidFill>
                   <a:srgbClr val="000000"/>
                 </a:solidFill>
@@ -5247,7 +5502,7 @@
           <a:ln/>
           <a:extLst>
             <a:ext uri="{91240B29-F687-4f45-9708-019B960494DF}">
-              <a14:hiddenLine xmlns:a14="http://schemas.microsoft.com/office/drawing/2010/main" xmlns="" w="9525">
+              <a14:hiddenLine xmlns="" xmlns:a14="http://schemas.microsoft.com/office/drawing/2010/main" w="9525">
                 <a:solidFill>
                   <a:srgbClr val="000000"/>
                 </a:solidFill>
@@ -5736,7 +5991,7 @@
           <a:ln/>
           <a:extLst>
             <a:ext uri="{91240B29-F687-4f45-9708-019B960494DF}">
-              <a14:hiddenLine xmlns:a14="http://schemas.microsoft.com/office/drawing/2010/main" xmlns="" w="9525">
+              <a14:hiddenLine xmlns="" xmlns:a14="http://schemas.microsoft.com/office/drawing/2010/main" w="9525">
                 <a:solidFill>
                   <a:srgbClr val="000000"/>
                 </a:solidFill>
@@ -6189,7 +6444,7 @@
           <a:ln/>
           <a:extLst>
             <a:ext uri="{91240B29-F687-4f45-9708-019B960494DF}">
-              <a14:hiddenLine xmlns:a14="http://schemas.microsoft.com/office/drawing/2010/main" xmlns="" w="9525">
+              <a14:hiddenLine xmlns="" xmlns:a14="http://schemas.microsoft.com/office/drawing/2010/main" w="9525">
                 <a:solidFill>
                   <a:srgbClr val="000000"/>
                 </a:solidFill>
@@ -7579,6 +7834,425 @@
           <p:cNvPr id="2" name="Nadpis 1">
             <a:extLst>
               <a:ext uri="{FF2B5EF4-FFF2-40B4-BE49-F238E27FC236}">
+                <a16:creationId xmlns:a16="http://schemas.microsoft.com/office/drawing/2014/main" id="{8A777927-F74D-CE2D-0D6E-EF61CF58A342}"/>
+              </a:ext>
+            </a:extLst>
+          </p:cNvPr>
+          <p:cNvSpPr>
+            <a:spLocks noGrp="1"/>
+          </p:cNvSpPr>
+          <p:nvPr>
+            <p:ph type="ctrTitle"/>
+          </p:nvPr>
+        </p:nvSpPr>
+        <p:spPr>
+          <a:xfrm>
+            <a:off x="0" y="1122363"/>
+            <a:ext cx="12192000" cy="2387600"/>
+          </a:xfrm>
+        </p:spPr>
+        <p:txBody>
+          <a:bodyPr/>
+          <a:lstStyle/>
+          <a:p>
+            <a:r>
+              <a:rPr lang="cs-CZ" sz="4800" dirty="0"/>
+              <a:t>Jarníkův algoritmus</a:t>
+            </a:r>
+          </a:p>
+        </p:txBody>
+      </p:sp>
+      <p:sp>
+        <p:nvSpPr>
+          <p:cNvPr id="5" name="Podnadpis 4">
+            <a:extLst>
+              <a:ext uri="{FF2B5EF4-FFF2-40B4-BE49-F238E27FC236}">
+                <a16:creationId xmlns:a16="http://schemas.microsoft.com/office/drawing/2014/main" id="{B4FDD6F6-D4D0-237E-EEB7-9CF90407BFAC}"/>
+              </a:ext>
+            </a:extLst>
+          </p:cNvPr>
+          <p:cNvSpPr>
+            <a:spLocks noGrp="1"/>
+          </p:cNvSpPr>
+          <p:nvPr>
+            <p:ph type="subTitle" idx="1"/>
+          </p:nvPr>
+        </p:nvSpPr>
+        <p:spPr/>
+        <p:txBody>
+          <a:bodyPr/>
+          <a:lstStyle/>
+          <a:p>
+            <a:endParaRPr lang="cs-CZ"/>
+          </a:p>
+        </p:txBody>
+      </p:sp>
+    </p:spTree>
+    <p:extLst>
+      <p:ext uri="{BB962C8B-B14F-4D97-AF65-F5344CB8AC3E}">
+        <p14:creationId xmlns:p14="http://schemas.microsoft.com/office/powerpoint/2010/main" val="2367948420"/>
+      </p:ext>
+    </p:extLst>
+  </p:cSld>
+  <p:clrMapOvr>
+    <a:masterClrMapping/>
+  </p:clrMapOvr>
+  <mc:AlternateContent xmlns:mc="http://schemas.openxmlformats.org/markup-compatibility/2006" xmlns:p159="http://schemas.microsoft.com/office/powerpoint/2015/09/main">
+    <mc:Choice Requires="p159">
+      <p:transition spd="slow">
+        <p159:morph option="byObject"/>
+      </p:transition>
+    </mc:Choice>
+    <mc:Fallback xmlns="">
+      <p:transition spd="slow">
+        <p:fade/>
+      </p:transition>
+    </mc:Fallback>
+  </mc:AlternateContent>
+</p:sld>
+</file>
+
+<file path=ppt/slides/slide11.xml><?xml version="1.0" encoding="utf-8"?>
+<p:sld xmlns:a="http://schemas.openxmlformats.org/drawingml/2006/main" xmlns:r="http://schemas.openxmlformats.org/officeDocument/2006/relationships" xmlns:p="http://schemas.openxmlformats.org/presentationml/2006/main">
+  <p:cSld>
+    <p:bg>
+      <p:bgPr>
+        <a:solidFill>
+          <a:schemeClr val="bg2"/>
+        </a:solidFill>
+        <a:effectLst/>
+      </p:bgPr>
+    </p:bg>
+    <p:spTree>
+      <p:nvGrpSpPr>
+        <p:cNvPr id="1" name=""/>
+        <p:cNvGrpSpPr/>
+        <p:nvPr/>
+      </p:nvGrpSpPr>
+      <p:grpSpPr>
+        <a:xfrm>
+          <a:off x="0" y="0"/>
+          <a:ext cx="0" cy="0"/>
+          <a:chOff x="0" y="0"/>
+          <a:chExt cx="0" cy="0"/>
+        </a:xfrm>
+      </p:grpSpPr>
+      <p:sp>
+        <p:nvSpPr>
+          <p:cNvPr id="2" name="Nadpis 1">
+            <a:extLst>
+              <a:ext uri="{FF2B5EF4-FFF2-40B4-BE49-F238E27FC236}">
+                <a16:creationId xmlns:a16="http://schemas.microsoft.com/office/drawing/2014/main" id="{69750CBC-247B-C052-407A-51083D43B0D2}"/>
+              </a:ext>
+            </a:extLst>
+          </p:cNvPr>
+          <p:cNvSpPr>
+            <a:spLocks noGrp="1"/>
+          </p:cNvSpPr>
+          <p:nvPr>
+            <p:ph type="title"/>
+          </p:nvPr>
+        </p:nvSpPr>
+        <p:spPr>
+          <a:xfrm>
+            <a:off x="810000" y="447188"/>
+            <a:ext cx="10571998" cy="970450"/>
+          </a:xfrm>
+        </p:spPr>
+        <p:txBody>
+          <a:bodyPr>
+            <a:normAutofit/>
+          </a:bodyPr>
+          <a:lstStyle/>
+          <a:p>
+            <a:r>
+              <a:rPr lang="cs-CZ" dirty="0"/>
+              <a:t>Jarníkův algoritmus</a:t>
+            </a:r>
+          </a:p>
+        </p:txBody>
+      </p:sp>
+      <p:sp>
+        <p:nvSpPr>
+          <p:cNvPr id="3" name="Zástupný obsah 2">
+            <a:extLst>
+              <a:ext uri="{FF2B5EF4-FFF2-40B4-BE49-F238E27FC236}">
+                <a16:creationId xmlns:a16="http://schemas.microsoft.com/office/drawing/2014/main" id="{7A502CCF-42F5-FF07-BCFB-923EFEFD30B7}"/>
+              </a:ext>
+            </a:extLst>
+          </p:cNvPr>
+          <p:cNvSpPr>
+            <a:spLocks noGrp="1"/>
+          </p:cNvSpPr>
+          <p:nvPr>
+            <p:ph idx="1"/>
+          </p:nvPr>
+        </p:nvSpPr>
+        <p:spPr>
+          <a:xfrm>
+            <a:off x="818713" y="2413000"/>
+            <a:ext cx="6487434" cy="3632200"/>
+          </a:xfrm>
+        </p:spPr>
+        <p:txBody>
+          <a:bodyPr>
+            <a:normAutofit fontScale="85000" lnSpcReduction="10000"/>
+          </a:bodyPr>
+          <a:lstStyle/>
+          <a:p>
+            <a:r>
+              <a:rPr lang="cs-CZ" sz="3200" dirty="0"/>
+              <a:t> Poprvé popsán roku 1930 v dopisu O. Borůvkovi</a:t>
+            </a:r>
+          </a:p>
+          <a:p>
+            <a:endParaRPr lang="cs-CZ" sz="3200" dirty="0"/>
+          </a:p>
+          <a:p>
+            <a:r>
+              <a:rPr lang="cs-CZ" sz="3200" dirty="0"/>
+              <a:t>Zjednodušená verze Borůvkova algoritmu</a:t>
+            </a:r>
+          </a:p>
+          <a:p>
+            <a:endParaRPr lang="cs-CZ" sz="3200" dirty="0"/>
+          </a:p>
+          <a:p>
+            <a:r>
+              <a:rPr lang="cs-CZ" sz="3200" dirty="0"/>
+              <a:t>V zahraničí prakticky zapomenut</a:t>
+            </a:r>
+          </a:p>
+        </p:txBody>
+      </p:sp>
+      <p:pic>
+        <p:nvPicPr>
+          <p:cNvPr id="5" name="Obrázek 4" descr="Obsah obrázku osoba, klobouk&#10;&#10;Popis byl vytvořen automaticky">
+            <a:extLst>
+              <a:ext uri="{FF2B5EF4-FFF2-40B4-BE49-F238E27FC236}">
+                <a16:creationId xmlns:a16="http://schemas.microsoft.com/office/drawing/2014/main" id="{3F302B17-6E69-67D8-0EEB-C377CCE9A48B}"/>
+              </a:ext>
+            </a:extLst>
+          </p:cNvPr>
+          <p:cNvPicPr>
+            <a:picLocks noChangeAspect="1"/>
+          </p:cNvPicPr>
+          <p:nvPr/>
+        </p:nvPicPr>
+        <p:blipFill>
+          <a:blip r:embed="rId3">
+            <a:extLst>
+              <a:ext uri="{28A0092B-C50C-407E-A947-70E740481C1C}">
+                <a14:useLocalDpi xmlns:a14="http://schemas.microsoft.com/office/drawing/2010/main" val="0"/>
+              </a:ext>
+            </a:extLst>
+          </a:blip>
+          <a:stretch>
+            <a:fillRect/>
+          </a:stretch>
+        </p:blipFill>
+        <p:spPr>
+          <a:xfrm>
+            <a:off x="8120958" y="2123967"/>
+            <a:ext cx="3261039" cy="4602374"/>
+          </a:xfrm>
+          <a:prstGeom prst="roundRect">
+            <a:avLst>
+              <a:gd name="adj" fmla="val 3876"/>
+            </a:avLst>
+          </a:prstGeom>
+          <a:ln>
+            <a:solidFill>
+              <a:schemeClr val="accent1"/>
+            </a:solidFill>
+          </a:ln>
+          <a:effectLst/>
+        </p:spPr>
+      </p:pic>
+    </p:spTree>
+    <p:extLst>
+      <p:ext uri="{BB962C8B-B14F-4D97-AF65-F5344CB8AC3E}">
+        <p14:creationId xmlns:p14="http://schemas.microsoft.com/office/powerpoint/2010/main" val="2405836106"/>
+      </p:ext>
+    </p:extLst>
+  </p:cSld>
+  <p:clrMapOvr>
+    <a:masterClrMapping/>
+  </p:clrMapOvr>
+  <mc:AlternateContent xmlns:mc="http://schemas.openxmlformats.org/markup-compatibility/2006" xmlns:p159="http://schemas.microsoft.com/office/powerpoint/2015/09/main">
+    <mc:Choice Requires="p159">
+      <p:transition spd="slow">
+        <p159:morph option="byObject"/>
+      </p:transition>
+    </mc:Choice>
+    <mc:Fallback xmlns="">
+      <p:transition spd="slow">
+        <p:fade/>
+      </p:transition>
+    </mc:Fallback>
+  </mc:AlternateContent>
+</p:sld>
+</file>
+
+<file path=ppt/slides/slide12.xml><?xml version="1.0" encoding="utf-8"?>
+<p:sld xmlns:a="http://schemas.openxmlformats.org/drawingml/2006/main" xmlns:r="http://schemas.openxmlformats.org/officeDocument/2006/relationships" xmlns:p="http://schemas.openxmlformats.org/presentationml/2006/main">
+  <p:cSld>
+    <p:spTree>
+      <p:nvGrpSpPr>
+        <p:cNvPr id="1" name=""/>
+        <p:cNvGrpSpPr/>
+        <p:nvPr/>
+      </p:nvGrpSpPr>
+      <p:grpSpPr>
+        <a:xfrm>
+          <a:off x="0" y="0"/>
+          <a:ext cx="0" cy="0"/>
+          <a:chOff x="0" y="0"/>
+          <a:chExt cx="0" cy="0"/>
+        </a:xfrm>
+      </p:grpSpPr>
+      <p:sp>
+        <p:nvSpPr>
+          <p:cNvPr id="2" name="Nadpis 1">
+            <a:extLst>
+              <a:ext uri="{FF2B5EF4-FFF2-40B4-BE49-F238E27FC236}">
+                <a16:creationId xmlns:a16="http://schemas.microsoft.com/office/drawing/2014/main" id="{69750CBC-247B-C052-407A-51083D43B0D2}"/>
+              </a:ext>
+            </a:extLst>
+          </p:cNvPr>
+          <p:cNvSpPr>
+            <a:spLocks noGrp="1"/>
+          </p:cNvSpPr>
+          <p:nvPr>
+            <p:ph type="title"/>
+          </p:nvPr>
+        </p:nvSpPr>
+        <p:spPr>
+          <a:xfrm>
+            <a:off x="810000" y="447188"/>
+            <a:ext cx="10571998" cy="970450"/>
+          </a:xfrm>
+        </p:spPr>
+        <p:txBody>
+          <a:bodyPr>
+            <a:normAutofit/>
+          </a:bodyPr>
+          <a:lstStyle/>
+          <a:p>
+            <a:r>
+              <a:rPr lang="cs-CZ" dirty="0"/>
+              <a:t>Jarníkův algoritmus</a:t>
+            </a:r>
+          </a:p>
+        </p:txBody>
+      </p:sp>
+      <p:sp>
+        <p:nvSpPr>
+          <p:cNvPr id="3" name="Zástupný obsah 2">
+            <a:extLst>
+              <a:ext uri="{FF2B5EF4-FFF2-40B4-BE49-F238E27FC236}">
+                <a16:creationId xmlns:a16="http://schemas.microsoft.com/office/drawing/2014/main" id="{7A502CCF-42F5-FF07-BCFB-923EFEFD30B7}"/>
+              </a:ext>
+            </a:extLst>
+          </p:cNvPr>
+          <p:cNvSpPr>
+            <a:spLocks noGrp="1"/>
+          </p:cNvSpPr>
+          <p:nvPr>
+            <p:ph idx="1"/>
+          </p:nvPr>
+        </p:nvSpPr>
+        <p:spPr>
+          <a:xfrm>
+            <a:off x="818713" y="2413000"/>
+            <a:ext cx="10563285" cy="3632200"/>
+          </a:xfrm>
+        </p:spPr>
+        <p:txBody>
+          <a:bodyPr>
+            <a:noAutofit/>
+          </a:bodyPr>
+          <a:lstStyle/>
+          <a:p>
+            <a:r>
+              <a:rPr lang="cs-CZ" sz="3200" dirty="0"/>
+              <a:t>Princip:</a:t>
+            </a:r>
+          </a:p>
+          <a:p>
+            <a:pPr lvl="1"/>
+            <a:r>
+              <a:rPr lang="cs-CZ" sz="3000" dirty="0"/>
+              <a:t>Najdi nejlevnější nenavštívenou cestu a označ počátek i konec za navštívené</a:t>
+            </a:r>
+          </a:p>
+          <a:p>
+            <a:pPr lvl="1"/>
+            <a:r>
+              <a:rPr lang="cs-CZ" sz="3000" dirty="0"/>
+              <a:t>Přidej nejlevnější nalezenou cestu do minimální kostry</a:t>
+            </a:r>
+          </a:p>
+          <a:p>
+            <a:pPr lvl="1"/>
+            <a:r>
+              <a:rPr lang="cs-CZ" sz="3000" dirty="0"/>
+              <a:t>Opakuj dokud nenavštívíš všechny body</a:t>
+            </a:r>
+          </a:p>
+          <a:p>
+            <a:pPr lvl="1"/>
+            <a:endParaRPr lang="cs-CZ" sz="3000" dirty="0"/>
+          </a:p>
+        </p:txBody>
+      </p:sp>
+    </p:spTree>
+    <p:extLst>
+      <p:ext uri="{BB962C8B-B14F-4D97-AF65-F5344CB8AC3E}">
+        <p14:creationId xmlns:p14="http://schemas.microsoft.com/office/powerpoint/2010/main" val="3670569241"/>
+      </p:ext>
+    </p:extLst>
+  </p:cSld>
+  <p:clrMapOvr>
+    <a:masterClrMapping/>
+  </p:clrMapOvr>
+  <mc:AlternateContent xmlns:mc="http://schemas.openxmlformats.org/markup-compatibility/2006" xmlns:p159="http://schemas.microsoft.com/office/powerpoint/2015/09/main">
+    <mc:Choice Requires="p159">
+      <p:transition spd="slow">
+        <p159:morph option="byObject"/>
+      </p:transition>
+    </mc:Choice>
+    <mc:Fallback xmlns="">
+      <p:transition spd="slow">
+        <p:fade/>
+      </p:transition>
+    </mc:Fallback>
+  </mc:AlternateContent>
+</p:sld>
+</file>
+
+<file path=ppt/slides/slide13.xml><?xml version="1.0" encoding="utf-8"?>
+<p:sld xmlns:a="http://schemas.openxmlformats.org/drawingml/2006/main" xmlns:r="http://schemas.openxmlformats.org/officeDocument/2006/relationships" xmlns:p="http://schemas.openxmlformats.org/presentationml/2006/main">
+  <p:cSld>
+    <p:spTree>
+      <p:nvGrpSpPr>
+        <p:cNvPr id="1" name=""/>
+        <p:cNvGrpSpPr/>
+        <p:nvPr/>
+      </p:nvGrpSpPr>
+      <p:grpSpPr>
+        <a:xfrm>
+          <a:off x="0" y="0"/>
+          <a:ext cx="0" cy="0"/>
+          <a:chOff x="0" y="0"/>
+          <a:chExt cx="0" cy="0"/>
+        </a:xfrm>
+      </p:grpSpPr>
+      <p:sp>
+        <p:nvSpPr>
+          <p:cNvPr id="2" name="Nadpis 1">
+            <a:extLst>
+              <a:ext uri="{FF2B5EF4-FFF2-40B4-BE49-F238E27FC236}">
                 <a16:creationId xmlns:a16="http://schemas.microsoft.com/office/drawing/2014/main" id="{69750CBC-247B-C052-407A-51083D43B0D2}"/>
               </a:ext>
             </a:extLst>
@@ -7706,7 +8380,7 @@
 </p:sld>
 </file>
 
-<file path=ppt/slides/slide11.xml><?xml version="1.0" encoding="utf-8"?>
+<file path=ppt/slides/slide14.xml><?xml version="1.0" encoding="utf-8"?>
 <p:sld xmlns:a="http://schemas.openxmlformats.org/drawingml/2006/main" xmlns:r="http://schemas.openxmlformats.org/officeDocument/2006/relationships" xmlns:p="http://schemas.openxmlformats.org/presentationml/2006/main">
   <p:cSld>
     <p:spTree>
@@ -7855,7 +8529,7 @@
 </p:sld>
 </file>
 
-<file path=ppt/slides/slide12.xml><?xml version="1.0" encoding="utf-8"?>
+<file path=ppt/slides/slide15.xml><?xml version="1.0" encoding="utf-8"?>
 <p:sld xmlns:a="http://schemas.openxmlformats.org/drawingml/2006/main" xmlns:r="http://schemas.openxmlformats.org/officeDocument/2006/relationships" xmlns:p="http://schemas.openxmlformats.org/presentationml/2006/main">
   <p:cSld>
     <p:spTree>
@@ -8004,7 +8678,7 @@
 </p:sld>
 </file>
 
-<file path=ppt/slides/slide13.xml><?xml version="1.0" encoding="utf-8"?>
+<file path=ppt/slides/slide16.xml><?xml version="1.0" encoding="utf-8"?>
 <p:sld xmlns:a="http://schemas.openxmlformats.org/drawingml/2006/main" xmlns:r="http://schemas.openxmlformats.org/officeDocument/2006/relationships" xmlns:p="http://schemas.openxmlformats.org/presentationml/2006/main">
   <p:cSld>
     <p:spTree>
@@ -8153,7 +8827,7 @@
 </p:sld>
 </file>
 
-<file path=ppt/slides/slide14.xml><?xml version="1.0" encoding="utf-8"?>
+<file path=ppt/slides/slide17.xml><?xml version="1.0" encoding="utf-8"?>
 <p:sld xmlns:a="http://schemas.openxmlformats.org/drawingml/2006/main" xmlns:r="http://schemas.openxmlformats.org/officeDocument/2006/relationships" xmlns:p="http://schemas.openxmlformats.org/presentationml/2006/main">
   <p:cSld>
     <p:spTree>
@@ -8302,7 +8976,7 @@
 </p:sld>
 </file>
 
-<file path=ppt/slides/slide15.xml><?xml version="1.0" encoding="utf-8"?>
+<file path=ppt/slides/slide18.xml><?xml version="1.0" encoding="utf-8"?>
 <p:sld xmlns:a="http://schemas.openxmlformats.org/drawingml/2006/main" xmlns:r="http://schemas.openxmlformats.org/officeDocument/2006/relationships" xmlns:p="http://schemas.openxmlformats.org/presentationml/2006/main">
   <p:cSld>
     <p:spTree>
@@ -8451,7 +9125,7 @@
 </p:sld>
 </file>
 
-<file path=ppt/slides/slide16.xml><?xml version="1.0" encoding="utf-8"?>
+<file path=ppt/slides/slide19.xml><?xml version="1.0" encoding="utf-8"?>
 <p:sld xmlns:a="http://schemas.openxmlformats.org/drawingml/2006/main" xmlns:r="http://schemas.openxmlformats.org/officeDocument/2006/relationships" xmlns:p="http://schemas.openxmlformats.org/presentationml/2006/main">
   <p:cSld>
     <p:spTree>
@@ -8600,7 +9274,128 @@
 </p:sld>
 </file>
 
-<file path=ppt/slides/slide17.xml><?xml version="1.0" encoding="utf-8"?>
+<file path=ppt/slides/slide2.xml><?xml version="1.0" encoding="utf-8"?>
+<p:sld xmlns:a="http://schemas.openxmlformats.org/drawingml/2006/main" xmlns:r="http://schemas.openxmlformats.org/officeDocument/2006/relationships" xmlns:p="http://schemas.openxmlformats.org/presentationml/2006/main">
+  <p:cSld>
+    <p:spTree>
+      <p:nvGrpSpPr>
+        <p:cNvPr id="1" name=""/>
+        <p:cNvGrpSpPr/>
+        <p:nvPr/>
+      </p:nvGrpSpPr>
+      <p:grpSpPr>
+        <a:xfrm>
+          <a:off x="0" y="0"/>
+          <a:ext cx="0" cy="0"/>
+          <a:chOff x="0" y="0"/>
+          <a:chExt cx="0" cy="0"/>
+        </a:xfrm>
+      </p:grpSpPr>
+      <p:sp>
+        <p:nvSpPr>
+          <p:cNvPr id="2" name="Nadpis 1">
+            <a:extLst>
+              <a:ext uri="{FF2B5EF4-FFF2-40B4-BE49-F238E27FC236}">
+                <a16:creationId xmlns:a16="http://schemas.microsoft.com/office/drawing/2014/main" id="{69750CBC-247B-C052-407A-51083D43B0D2}"/>
+              </a:ext>
+            </a:extLst>
+          </p:cNvPr>
+          <p:cNvSpPr>
+            <a:spLocks noGrp="1"/>
+          </p:cNvSpPr>
+          <p:nvPr>
+            <p:ph type="title"/>
+          </p:nvPr>
+        </p:nvSpPr>
+        <p:spPr/>
+        <p:txBody>
+          <a:bodyPr/>
+          <a:lstStyle/>
+          <a:p>
+            <a:r>
+              <a:rPr lang="cs-CZ" dirty="0"/>
+              <a:t>K čemu slouží?</a:t>
+            </a:r>
+          </a:p>
+        </p:txBody>
+      </p:sp>
+      <p:sp>
+        <p:nvSpPr>
+          <p:cNvPr id="3" name="Zástupný obsah 2">
+            <a:extLst>
+              <a:ext uri="{FF2B5EF4-FFF2-40B4-BE49-F238E27FC236}">
+                <a16:creationId xmlns:a16="http://schemas.microsoft.com/office/drawing/2014/main" id="{7A502CCF-42F5-FF07-BCFB-923EFEFD30B7}"/>
+              </a:ext>
+            </a:extLst>
+          </p:cNvPr>
+          <p:cNvSpPr>
+            <a:spLocks noGrp="1"/>
+          </p:cNvSpPr>
+          <p:nvPr>
+            <p:ph idx="1"/>
+          </p:nvPr>
+        </p:nvSpPr>
+        <p:spPr/>
+        <p:txBody>
+          <a:bodyPr>
+            <a:normAutofit/>
+          </a:bodyPr>
+          <a:lstStyle/>
+          <a:p>
+            <a:r>
+              <a:rPr lang="cs-CZ" sz="3600" dirty="0"/>
+              <a:t> Hledání minimální kostry grafu</a:t>
+            </a:r>
+          </a:p>
+          <a:p>
+            <a:pPr lvl="1"/>
+            <a:r>
+              <a:rPr lang="cs-CZ" sz="3400" dirty="0"/>
+              <a:t>Navigace</a:t>
+            </a:r>
+          </a:p>
+          <a:p>
+            <a:pPr lvl="1"/>
+            <a:r>
+              <a:rPr lang="cs-CZ" sz="3400" dirty="0"/>
+              <a:t>Zavádění telekomunikačních sítí</a:t>
+            </a:r>
+          </a:p>
+          <a:p>
+            <a:pPr lvl="1"/>
+            <a:r>
+              <a:rPr lang="cs-CZ" sz="3400" dirty="0"/>
+              <a:t>Elektrifikace Moravy :)</a:t>
+            </a:r>
+          </a:p>
+        </p:txBody>
+      </p:sp>
+    </p:spTree>
+    <p:extLst>
+      <p:ext uri="{BB962C8B-B14F-4D97-AF65-F5344CB8AC3E}">
+        <p14:creationId xmlns:p14="http://schemas.microsoft.com/office/powerpoint/2010/main" val="2688987692"/>
+      </p:ext>
+    </p:extLst>
+  </p:cSld>
+  <p:clrMapOvr>
+    <a:masterClrMapping/>
+  </p:clrMapOvr>
+  <mc:AlternateContent xmlns:mc="http://schemas.openxmlformats.org/markup-compatibility/2006" xmlns:p159="http://schemas.microsoft.com/office/powerpoint/2015/09/main">
+    <mc:Choice Requires="p159">
+      <p:transition spd="slow">
+        <p159:morph option="byObject"/>
+      </p:transition>
+    </mc:Choice>
+    <mc:Fallback xmlns="">
+      <p:transition spd="slow">
+        <p:fade/>
+      </p:transition>
+    </mc:Fallback>
+  </mc:AlternateContent>
+</p:sld>
+</file>
+
+<file path=ppt/slides/slide20.xml><?xml version="1.0" encoding="utf-8"?>
 <p:sld xmlns:a="http://schemas.openxmlformats.org/drawingml/2006/main" xmlns:r="http://schemas.openxmlformats.org/officeDocument/2006/relationships" xmlns:p="http://schemas.openxmlformats.org/presentationml/2006/main">
   <p:cSld>
     <p:spTree>
@@ -8749,7 +9544,7 @@
 </p:sld>
 </file>
 
-<file path=ppt/slides/slide18.xml><?xml version="1.0" encoding="utf-8"?>
+<file path=ppt/slides/slide21.xml><?xml version="1.0" encoding="utf-8"?>
 <p:sld xmlns:a="http://schemas.openxmlformats.org/drawingml/2006/main" xmlns:r="http://schemas.openxmlformats.org/officeDocument/2006/relationships" xmlns:p="http://schemas.openxmlformats.org/presentationml/2006/main">
   <p:cSld>
     <p:spTree>
@@ -8898,7 +9693,7 @@
 </p:sld>
 </file>
 
-<file path=ppt/slides/slide19.xml><?xml version="1.0" encoding="utf-8"?>
+<file path=ppt/slides/slide22.xml><?xml version="1.0" encoding="utf-8"?>
 <p:sld xmlns:a="http://schemas.openxmlformats.org/drawingml/2006/main" xmlns:r="http://schemas.openxmlformats.org/officeDocument/2006/relationships" xmlns:p="http://schemas.openxmlformats.org/presentationml/2006/main">
   <p:cSld>
     <p:spTree>
@@ -9047,128 +9842,7 @@
 </p:sld>
 </file>
 
-<file path=ppt/slides/slide2.xml><?xml version="1.0" encoding="utf-8"?>
-<p:sld xmlns:a="http://schemas.openxmlformats.org/drawingml/2006/main" xmlns:r="http://schemas.openxmlformats.org/officeDocument/2006/relationships" xmlns:p="http://schemas.openxmlformats.org/presentationml/2006/main">
-  <p:cSld>
-    <p:spTree>
-      <p:nvGrpSpPr>
-        <p:cNvPr id="1" name=""/>
-        <p:cNvGrpSpPr/>
-        <p:nvPr/>
-      </p:nvGrpSpPr>
-      <p:grpSpPr>
-        <a:xfrm>
-          <a:off x="0" y="0"/>
-          <a:ext cx="0" cy="0"/>
-          <a:chOff x="0" y="0"/>
-          <a:chExt cx="0" cy="0"/>
-        </a:xfrm>
-      </p:grpSpPr>
-      <p:sp>
-        <p:nvSpPr>
-          <p:cNvPr id="2" name="Nadpis 1">
-            <a:extLst>
-              <a:ext uri="{FF2B5EF4-FFF2-40B4-BE49-F238E27FC236}">
-                <a16:creationId xmlns:a16="http://schemas.microsoft.com/office/drawing/2014/main" id="{69750CBC-247B-C052-407A-51083D43B0D2}"/>
-              </a:ext>
-            </a:extLst>
-          </p:cNvPr>
-          <p:cNvSpPr>
-            <a:spLocks noGrp="1"/>
-          </p:cNvSpPr>
-          <p:nvPr>
-            <p:ph type="title"/>
-          </p:nvPr>
-        </p:nvSpPr>
-        <p:spPr/>
-        <p:txBody>
-          <a:bodyPr/>
-          <a:lstStyle/>
-          <a:p>
-            <a:r>
-              <a:rPr lang="cs-CZ" dirty="0"/>
-              <a:t>K čemu slouží?</a:t>
-            </a:r>
-          </a:p>
-        </p:txBody>
-      </p:sp>
-      <p:sp>
-        <p:nvSpPr>
-          <p:cNvPr id="3" name="Zástupný obsah 2">
-            <a:extLst>
-              <a:ext uri="{FF2B5EF4-FFF2-40B4-BE49-F238E27FC236}">
-                <a16:creationId xmlns:a16="http://schemas.microsoft.com/office/drawing/2014/main" id="{7A502CCF-42F5-FF07-BCFB-923EFEFD30B7}"/>
-              </a:ext>
-            </a:extLst>
-          </p:cNvPr>
-          <p:cNvSpPr>
-            <a:spLocks noGrp="1"/>
-          </p:cNvSpPr>
-          <p:nvPr>
-            <p:ph idx="1"/>
-          </p:nvPr>
-        </p:nvSpPr>
-        <p:spPr/>
-        <p:txBody>
-          <a:bodyPr>
-            <a:normAutofit/>
-          </a:bodyPr>
-          <a:lstStyle/>
-          <a:p>
-            <a:r>
-              <a:rPr lang="cs-CZ" sz="3600" dirty="0"/>
-              <a:t> Hledání minimální kostry grafu</a:t>
-            </a:r>
-          </a:p>
-          <a:p>
-            <a:pPr lvl="1"/>
-            <a:r>
-              <a:rPr lang="cs-CZ" sz="3400" dirty="0"/>
-              <a:t>Navigace</a:t>
-            </a:r>
-          </a:p>
-          <a:p>
-            <a:pPr lvl="1"/>
-            <a:r>
-              <a:rPr lang="cs-CZ" sz="3400" dirty="0"/>
-              <a:t>Zavádění telekomunikačních sítí</a:t>
-            </a:r>
-          </a:p>
-          <a:p>
-            <a:pPr lvl="1"/>
-            <a:r>
-              <a:rPr lang="cs-CZ" sz="3400" dirty="0"/>
-              <a:t>Elektrifikace Moravy :)</a:t>
-            </a:r>
-          </a:p>
-        </p:txBody>
-      </p:sp>
-    </p:spTree>
-    <p:extLst>
-      <p:ext uri="{BB962C8B-B14F-4D97-AF65-F5344CB8AC3E}">
-        <p14:creationId xmlns:p14="http://schemas.microsoft.com/office/powerpoint/2010/main" val="2688987692"/>
-      </p:ext>
-    </p:extLst>
-  </p:cSld>
-  <p:clrMapOvr>
-    <a:masterClrMapping/>
-  </p:clrMapOvr>
-  <mc:AlternateContent xmlns:mc="http://schemas.openxmlformats.org/markup-compatibility/2006" xmlns:p159="http://schemas.microsoft.com/office/powerpoint/2015/09/main">
-    <mc:Choice Requires="p159">
-      <p:transition spd="slow">
-        <p159:morph option="byObject"/>
-      </p:transition>
-    </mc:Choice>
-    <mc:Fallback xmlns="">
-      <p:transition spd="slow">
-        <p:fade/>
-      </p:transition>
-    </mc:Fallback>
-  </mc:AlternateContent>
-</p:sld>
-</file>
-
-<file path=ppt/slides/slide20.xml><?xml version="1.0" encoding="utf-8"?>
+<file path=ppt/slides/slide23.xml><?xml version="1.0" encoding="utf-8"?>
 <p:sld xmlns:a="http://schemas.openxmlformats.org/drawingml/2006/main" xmlns:r="http://schemas.openxmlformats.org/officeDocument/2006/relationships" xmlns:p="http://schemas.openxmlformats.org/presentationml/2006/main">
   <p:cSld>
     <p:spTree>
@@ -9317,7 +9991,7 @@
 </p:sld>
 </file>
 
-<file path=ppt/slides/slide21.xml><?xml version="1.0" encoding="utf-8"?>
+<file path=ppt/slides/slide24.xml><?xml version="1.0" encoding="utf-8"?>
 <p:sld xmlns:a="http://schemas.openxmlformats.org/drawingml/2006/main" xmlns:r="http://schemas.openxmlformats.org/officeDocument/2006/relationships" xmlns:p="http://schemas.openxmlformats.org/presentationml/2006/main">
   <p:cSld>
     <p:spTree>
@@ -9417,7 +10091,7 @@
 </p:sld>
 </file>
 
-<file path=ppt/slides/slide22.xml><?xml version="1.0" encoding="utf-8"?>
+<file path=ppt/slides/slide25.xml><?xml version="1.0" encoding="utf-8"?>
 <p:sld xmlns:a="http://schemas.openxmlformats.org/drawingml/2006/main" xmlns:r="http://schemas.openxmlformats.org/officeDocument/2006/relationships" xmlns:p="http://schemas.openxmlformats.org/presentationml/2006/main">
   <p:cSld>
     <p:bg>
@@ -9608,7 +10282,7 @@
 </p:sld>
 </file>
 
-<file path=ppt/slides/slide23.xml><?xml version="1.0" encoding="utf-8"?>
+<file path=ppt/slides/slide26.xml><?xml version="1.0" encoding="utf-8"?>
 <p:sld xmlns:a="http://schemas.openxmlformats.org/drawingml/2006/main" xmlns:r="http://schemas.openxmlformats.org/officeDocument/2006/relationships" xmlns:p="http://schemas.openxmlformats.org/presentationml/2006/main">
   <p:cSld>
     <p:spTree>
@@ -9708,7 +10382,7 @@
 </p:sld>
 </file>
 
-<file path=ppt/slides/slide24.xml><?xml version="1.0" encoding="utf-8"?>
+<file path=ppt/slides/slide27.xml><?xml version="1.0" encoding="utf-8"?>
 <p:sld xmlns:a="http://schemas.openxmlformats.org/drawingml/2006/main" xmlns:r="http://schemas.openxmlformats.org/officeDocument/2006/relationships" xmlns:p="http://schemas.openxmlformats.org/presentationml/2006/main">
   <p:cSld>
     <p:spTree>
@@ -10228,6 +10902,15 @@
               <a:rPr lang="cs-CZ" dirty="0"/>
               <a:t>Borůvkův algoritmus</a:t>
             </a:r>
+            <a:r>
+              <a:rPr lang="en-US" dirty="0"/>
+              <a:t> - </a:t>
+            </a:r>
+            <a:r>
+              <a:rPr lang="en-US" dirty="0" err="1"/>
+              <a:t>myšlenka</a:t>
+            </a:r>
+            <a:endParaRPr lang="cs-CZ" dirty="0"/>
           </a:p>
         </p:txBody>
       </p:sp>
@@ -10260,9 +10943,213 @@
           <a:lstStyle/>
           <a:p>
             <a:r>
-              <a:rPr lang="cs-CZ" sz="3200" dirty="0"/>
-              <a:t>Princip</a:t>
-            </a:r>
+              <a:rPr lang="en-US" sz="3200" dirty="0"/>
+              <a:t> </a:t>
+            </a:r>
+            <a:r>
+              <a:rPr lang="en-US" sz="3200" dirty="0" err="1"/>
+              <a:t>Hlavní</a:t>
+            </a:r>
+            <a:r>
+              <a:rPr lang="en-US" sz="3200" dirty="0"/>
+              <a:t> </a:t>
+            </a:r>
+            <a:r>
+              <a:rPr lang="en-US" sz="3200" dirty="0" err="1"/>
+              <a:t>myšlenkou</a:t>
+            </a:r>
+            <a:r>
+              <a:rPr lang="en-US" sz="3200" dirty="0"/>
+              <a:t> je </a:t>
+            </a:r>
+            <a:r>
+              <a:rPr lang="en-US" sz="3200" dirty="0" err="1"/>
+              <a:t>opakovaně</a:t>
+            </a:r>
+            <a:r>
+              <a:rPr lang="en-US" sz="3200" dirty="0"/>
+              <a:t> </a:t>
+            </a:r>
+            <a:r>
+              <a:rPr lang="en-US" sz="3200" dirty="0" err="1"/>
+              <a:t>přidávat</a:t>
+            </a:r>
+            <a:r>
+              <a:rPr lang="en-US" sz="3200" dirty="0"/>
+              <a:t> </a:t>
+            </a:r>
+            <a:r>
+              <a:rPr lang="en-US" sz="3200" dirty="0" err="1"/>
+              <a:t>nejlevnější</a:t>
+            </a:r>
+            <a:r>
+              <a:rPr lang="en-US" sz="3200" dirty="0"/>
+              <a:t> edge (</a:t>
+            </a:r>
+            <a:r>
+              <a:rPr lang="en-US" sz="3200" dirty="0" err="1"/>
+              <a:t>hranu</a:t>
+            </a:r>
+            <a:r>
+              <a:rPr lang="en-US" sz="3200" dirty="0"/>
+              <a:t>), která </a:t>
+            </a:r>
+            <a:r>
+              <a:rPr lang="en-US" sz="3200" dirty="0" err="1"/>
+              <a:t>spojuje</a:t>
+            </a:r>
+            <a:r>
+              <a:rPr lang="en-US" sz="3200" dirty="0"/>
+              <a:t> </a:t>
+            </a:r>
+            <a:r>
+              <a:rPr lang="en-US" sz="3200" dirty="0" err="1"/>
+              <a:t>dva</a:t>
+            </a:r>
+            <a:r>
+              <a:rPr lang="en-US" sz="3200" dirty="0"/>
+              <a:t> </a:t>
+            </a:r>
+            <a:r>
+              <a:rPr lang="en-US" sz="3200" dirty="0" err="1"/>
+              <a:t>různé</a:t>
+            </a:r>
+            <a:r>
+              <a:rPr lang="en-US" sz="3200" dirty="0"/>
+              <a:t> </a:t>
+            </a:r>
+            <a:r>
+              <a:rPr lang="en-US" sz="3200" dirty="0" err="1"/>
+              <a:t>stromy</a:t>
+            </a:r>
+            <a:r>
+              <a:rPr lang="en-US" sz="3200" dirty="0"/>
+              <a:t> </a:t>
+            </a:r>
+            <a:r>
+              <a:rPr lang="en-US" sz="3200" dirty="0" err="1"/>
+              <a:t>grafu</a:t>
+            </a:r>
+            <a:r>
+              <a:rPr lang="en-US" sz="3200" dirty="0"/>
+              <a:t> (</a:t>
+            </a:r>
+            <a:r>
+              <a:rPr lang="en-US" sz="3200" dirty="0" err="1"/>
+              <a:t>lesu</a:t>
+            </a:r>
+            <a:r>
+              <a:rPr lang="en-US" sz="3200" dirty="0"/>
+              <a:t>) </a:t>
+            </a:r>
+            <a:r>
+              <a:rPr lang="en-US" sz="3200" dirty="0" err="1"/>
+              <a:t>dokud</a:t>
+            </a:r>
+            <a:r>
+              <a:rPr lang="en-US" sz="3200" dirty="0"/>
+              <a:t> </a:t>
+            </a:r>
+            <a:r>
+              <a:rPr lang="en-US" sz="3200" dirty="0" err="1"/>
+              <a:t>nezůstane</a:t>
+            </a:r>
+            <a:r>
+              <a:rPr lang="en-US" sz="3200" dirty="0"/>
+              <a:t> </a:t>
+            </a:r>
+            <a:r>
+              <a:rPr lang="en-US" sz="3200" dirty="0" err="1"/>
+              <a:t>pouze</a:t>
+            </a:r>
+            <a:r>
+              <a:rPr lang="en-US" sz="3200" dirty="0"/>
+              <a:t> </a:t>
+            </a:r>
+            <a:r>
+              <a:rPr lang="en-US" sz="3200" dirty="0" err="1"/>
+              <a:t>jeden</a:t>
+            </a:r>
+            <a:r>
+              <a:rPr lang="en-US" sz="3200" dirty="0"/>
+              <a:t> </a:t>
+            </a:r>
+            <a:r>
+              <a:rPr lang="en-US" sz="3200" dirty="0" err="1"/>
+              <a:t>strom</a:t>
+            </a:r>
+            <a:endParaRPr lang="en-US" sz="3200" dirty="0"/>
+          </a:p>
+          <a:p>
+            <a:r>
+              <a:rPr lang="en-US" sz="3200" dirty="0"/>
+              <a:t> </a:t>
+            </a:r>
+            <a:r>
+              <a:rPr lang="en-US" sz="3200" dirty="0" err="1"/>
+              <a:t>Může</a:t>
+            </a:r>
+            <a:r>
+              <a:rPr lang="en-US" sz="3200" dirty="0"/>
+              <a:t> </a:t>
+            </a:r>
+            <a:r>
+              <a:rPr lang="en-US" sz="3200" dirty="0" err="1"/>
+              <a:t>fungovat</a:t>
+            </a:r>
+            <a:r>
+              <a:rPr lang="en-US" sz="3200" dirty="0"/>
+              <a:t> </a:t>
+            </a:r>
+            <a:r>
+              <a:rPr lang="en-US" sz="3200" dirty="0" err="1"/>
+              <a:t>na</a:t>
+            </a:r>
+            <a:r>
+              <a:rPr lang="en-US" sz="3200" dirty="0"/>
+              <a:t> </a:t>
+            </a:r>
+            <a:r>
+              <a:rPr lang="en-US" sz="3200" dirty="0" err="1"/>
+              <a:t>neusměrněném</a:t>
+            </a:r>
+            <a:r>
+              <a:rPr lang="en-US" sz="3200" dirty="0"/>
+              <a:t> </a:t>
+            </a:r>
+            <a:r>
+              <a:rPr lang="en-US" sz="3200" dirty="0" err="1"/>
+              <a:t>grafu</a:t>
+            </a:r>
+            <a:r>
+              <a:rPr lang="en-US" sz="3200" dirty="0"/>
+              <a:t> (</a:t>
+            </a:r>
+            <a:r>
+              <a:rPr lang="en-US" sz="3200" dirty="0" err="1"/>
+              <a:t>ikdyž</a:t>
+            </a:r>
+            <a:r>
+              <a:rPr lang="en-US" sz="3200" dirty="0"/>
+              <a:t> se </a:t>
+            </a:r>
+            <a:r>
+              <a:rPr lang="en-US" sz="3200" dirty="0" err="1"/>
+              <a:t>tak</a:t>
+            </a:r>
+            <a:r>
+              <a:rPr lang="en-US" sz="3200" dirty="0"/>
+              <a:t> </a:t>
+            </a:r>
+            <a:r>
+              <a:rPr lang="en-US" sz="3200" dirty="0" err="1"/>
+              <a:t>nepoužívá</a:t>
+            </a:r>
+            <a:r>
+              <a:rPr lang="en-US" sz="3200" dirty="0"/>
+              <a:t>)</a:t>
+            </a:r>
+            <a:endParaRPr lang="cs-CZ" sz="3200" dirty="0"/>
           </a:p>
         </p:txBody>
       </p:sp>
@@ -10340,61 +11227,181 @@
               <a:rPr lang="cs-CZ" dirty="0"/>
               <a:t>Borůvkův algoritmus</a:t>
             </a:r>
-          </a:p>
-        </p:txBody>
-      </p:sp>
-      <p:pic>
-        <p:nvPicPr>
-          <p:cNvPr id="7" name="Zástupný obsah 6" descr="Obsah obrázku diagram&#10;&#10;Popis byl vytvořen automaticky">
+            <a:r>
+              <a:rPr lang="en-US" dirty="0"/>
+              <a:t> – </a:t>
+            </a:r>
+            <a:r>
+              <a:rPr lang="en-US" dirty="0" err="1"/>
+              <a:t>pojmy</a:t>
+            </a:r>
+            <a:r>
+              <a:rPr lang="en-US" dirty="0"/>
+              <a:t> les, </a:t>
+            </a:r>
+            <a:r>
+              <a:rPr lang="en-US" dirty="0" err="1"/>
+              <a:t>strom</a:t>
+            </a:r>
+            <a:endParaRPr lang="cs-CZ" dirty="0"/>
+          </a:p>
+        </p:txBody>
+      </p:sp>
+      <p:sp>
+        <p:nvSpPr>
+          <p:cNvPr id="3" name="Zástupný obsah 2">
             <a:extLst>
               <a:ext uri="{FF2B5EF4-FFF2-40B4-BE49-F238E27FC236}">
-                <a16:creationId xmlns:a16="http://schemas.microsoft.com/office/drawing/2014/main" id="{FCC2BF2B-43AD-011D-28D9-310B52EC9377}"/>
+                <a16:creationId xmlns:a16="http://schemas.microsoft.com/office/drawing/2014/main" id="{7A502CCF-42F5-FF07-BCFB-923EFEFD30B7}"/>
               </a:ext>
             </a:extLst>
           </p:cNvPr>
-          <p:cNvPicPr>
-            <a:picLocks noGrp="1" noChangeAspect="1"/>
-          </p:cNvPicPr>
+          <p:cNvSpPr>
+            <a:spLocks noGrp="1"/>
+          </p:cNvSpPr>
           <p:nvPr>
             <p:ph idx="1"/>
           </p:nvPr>
-        </p:nvPicPr>
-        <p:blipFill>
-          <a:blip r:embed="rId3">
-            <a:extLst>
-              <a:ext uri="{28A0092B-C50C-407E-A947-70E740481C1C}">
-                <a14:useLocalDpi xmlns:a14="http://schemas.microsoft.com/office/drawing/2010/main" val="0"/>
-              </a:ext>
-            </a:extLst>
-          </a:blip>
-          <a:stretch>
-            <a:fillRect/>
-          </a:stretch>
-        </p:blipFill>
+        </p:nvSpPr>
         <p:spPr>
           <a:xfrm>
-            <a:off x="1678535" y="2227152"/>
-            <a:ext cx="8834929" cy="4630848"/>
+            <a:off x="818713" y="2413000"/>
+            <a:ext cx="10563285" cy="3632200"/>
           </a:xfrm>
         </p:spPr>
-      </p:pic>
+        <p:txBody>
+          <a:bodyPr>
+            <a:noAutofit/>
+          </a:bodyPr>
+          <a:lstStyle/>
+          <a:p>
+            <a:r>
+              <a:rPr lang="en-US" sz="3200" dirty="0"/>
+              <a:t> Les == </a:t>
+            </a:r>
+            <a:r>
+              <a:rPr lang="en-US" sz="3200" dirty="0" err="1"/>
+              <a:t>jiný</a:t>
+            </a:r>
+            <a:r>
+              <a:rPr lang="en-US" sz="3200" dirty="0"/>
+              <a:t> </a:t>
+            </a:r>
+            <a:r>
+              <a:rPr lang="en-US" sz="3200" dirty="0" err="1"/>
+              <a:t>název</a:t>
+            </a:r>
+            <a:r>
+              <a:rPr lang="en-US" sz="3200" dirty="0"/>
+              <a:t> pro </a:t>
+            </a:r>
+            <a:r>
+              <a:rPr lang="en-US" sz="3200" dirty="0" err="1"/>
+              <a:t>graf</a:t>
+            </a:r>
+            <a:r>
+              <a:rPr lang="en-US" sz="3000" dirty="0"/>
+              <a:t> (bez </a:t>
+            </a:r>
+            <a:r>
+              <a:rPr lang="en-US" sz="3000" dirty="0" err="1"/>
+              <a:t>zacyklení</a:t>
+            </a:r>
+            <a:r>
+              <a:rPr lang="en-US" sz="3000" dirty="0"/>
+              <a:t>)</a:t>
+            </a:r>
+          </a:p>
+          <a:p>
+            <a:r>
+              <a:rPr lang="en-US" sz="3200" dirty="0"/>
+              <a:t> Strom == </a:t>
+            </a:r>
+            <a:r>
+              <a:rPr lang="en-US" sz="3200" dirty="0" err="1"/>
+              <a:t>více</a:t>
+            </a:r>
+            <a:r>
+              <a:rPr lang="en-US" sz="3200" dirty="0"/>
+              <a:t> </a:t>
+            </a:r>
+            <a:r>
+              <a:rPr lang="en-US" sz="3200" dirty="0" err="1"/>
+              <a:t>propojených</a:t>
+            </a:r>
+            <a:r>
+              <a:rPr lang="en-US" sz="3200" dirty="0"/>
+              <a:t> </a:t>
+            </a:r>
+            <a:r>
+              <a:rPr lang="en-US" sz="3200" dirty="0" err="1"/>
+              <a:t>nodů</a:t>
+            </a:r>
+            <a:r>
+              <a:rPr lang="en-US" sz="3200" dirty="0"/>
+              <a:t>, </a:t>
+            </a:r>
+            <a:r>
+              <a:rPr lang="en-US" sz="3200" dirty="0" err="1"/>
+              <a:t>které</a:t>
+            </a:r>
+            <a:r>
+              <a:rPr lang="en-US" sz="3200" dirty="0"/>
+              <a:t> </a:t>
+            </a:r>
+            <a:r>
+              <a:rPr lang="en-US" sz="3200" dirty="0" err="1"/>
+              <a:t>bereme</a:t>
+            </a:r>
+            <a:r>
+              <a:rPr lang="en-US" sz="3200" dirty="0"/>
+              <a:t> jako </a:t>
+            </a:r>
+            <a:r>
+              <a:rPr lang="en-US" sz="3200" dirty="0" err="1"/>
+              <a:t>jeden</a:t>
+            </a:r>
+            <a:r>
+              <a:rPr lang="en-US" sz="3200" dirty="0"/>
+              <a:t> </a:t>
+            </a:r>
+            <a:r>
+              <a:rPr lang="en-US" sz="3200" dirty="0" err="1"/>
+              <a:t>prvek</a:t>
+            </a:r>
+            <a:r>
+              <a:rPr lang="en-US" sz="3200" dirty="0"/>
+              <a:t> (bez </a:t>
+            </a:r>
+            <a:r>
+              <a:rPr lang="en-US" sz="3200" dirty="0" err="1"/>
+              <a:t>zacyklení</a:t>
+            </a:r>
+            <a:r>
+              <a:rPr lang="en-US" sz="3200" dirty="0"/>
+              <a:t>)</a:t>
+            </a:r>
+            <a:endParaRPr lang="cs-CZ" sz="3200" dirty="0"/>
+          </a:p>
+        </p:txBody>
+      </p:sp>
     </p:spTree>
     <p:extLst>
       <p:ext uri="{BB962C8B-B14F-4D97-AF65-F5344CB8AC3E}">
-        <p14:creationId xmlns:p14="http://schemas.microsoft.com/office/powerpoint/2010/main" val="689638914"/>
+        <p14:creationId xmlns:p14="http://schemas.microsoft.com/office/powerpoint/2010/main" val="390612004"/>
       </p:ext>
     </p:extLst>
   </p:cSld>
   <p:clrMapOvr>
     <a:masterClrMapping/>
   </p:clrMapOvr>
-  <mc:AlternateContent xmlns:mc="http://schemas.openxmlformats.org/markup-compatibility/2006" xmlns:p159="http://schemas.microsoft.com/office/powerpoint/2015/09/main">
-    <mc:Choice Requires="p159">
+  <mc:AlternateContent xmlns:mc="http://schemas.openxmlformats.org/markup-compatibility/2006">
+    <mc:Choice xmlns:p159="http://schemas.microsoft.com/office/powerpoint/2015/09/main" Requires="p159">
       <p:transition spd="slow">
         <p159:morph option="byObject"/>
       </p:transition>
     </mc:Choice>
-    <mc:Fallback xmlns="">
+    <mc:Fallback>
       <p:transition spd="slow">
         <p:fade/>
       </p:transition>
@@ -10425,7 +11432,7 @@
           <p:cNvPr id="2" name="Nadpis 1">
             <a:extLst>
               <a:ext uri="{FF2B5EF4-FFF2-40B4-BE49-F238E27FC236}">
-                <a16:creationId xmlns:a16="http://schemas.microsoft.com/office/drawing/2014/main" id="{8A777927-F74D-CE2D-0D6E-EF61CF58A342}"/>
+                <a16:creationId xmlns:a16="http://schemas.microsoft.com/office/drawing/2014/main" id="{69750CBC-247B-C052-407A-51083D43B0D2}"/>
               </a:ext>
             </a:extLst>
           </p:cNvPr>
@@ -10433,32 +11440,51 @@
             <a:spLocks noGrp="1"/>
           </p:cNvSpPr>
           <p:nvPr>
-            <p:ph type="ctrTitle"/>
+            <p:ph type="title"/>
           </p:nvPr>
         </p:nvSpPr>
         <p:spPr>
           <a:xfrm>
-            <a:off x="0" y="1122363"/>
-            <a:ext cx="12192000" cy="2387600"/>
+            <a:off x="810000" y="447188"/>
+            <a:ext cx="10571998" cy="970450"/>
           </a:xfrm>
         </p:spPr>
         <p:txBody>
-          <a:bodyPr/>
-          <a:lstStyle/>
-          <a:p>
-            <a:r>
-              <a:rPr lang="cs-CZ" sz="4800" dirty="0"/>
-              <a:t>Jarníkův algoritmus</a:t>
-            </a:r>
-          </a:p>
-        </p:txBody>
-      </p:sp>
-      <p:sp>
-        <p:nvSpPr>
-          <p:cNvPr id="5" name="Podnadpis 4">
+          <a:bodyPr>
+            <a:normAutofit/>
+          </a:bodyPr>
+          <a:lstStyle/>
+          <a:p>
+            <a:r>
+              <a:rPr lang="cs-CZ" dirty="0"/>
+              <a:t>Borůvkův algoritmus</a:t>
+            </a:r>
+            <a:r>
+              <a:rPr lang="en-US" dirty="0"/>
+              <a:t> – </a:t>
+            </a:r>
+            <a:r>
+              <a:rPr lang="en-US" dirty="0" err="1"/>
+              <a:t>pojem</a:t>
+            </a:r>
+            <a:r>
+              <a:rPr lang="en-US" dirty="0"/>
+              <a:t> </a:t>
+            </a:r>
+            <a:r>
+              <a:rPr lang="en-US" dirty="0" err="1"/>
+              <a:t>zacyklení</a:t>
+            </a:r>
+            <a:endParaRPr lang="cs-CZ" dirty="0"/>
+          </a:p>
+        </p:txBody>
+      </p:sp>
+      <p:sp>
+        <p:nvSpPr>
+          <p:cNvPr id="3" name="Zástupný obsah 2">
             <a:extLst>
               <a:ext uri="{FF2B5EF4-FFF2-40B4-BE49-F238E27FC236}">
-                <a16:creationId xmlns:a16="http://schemas.microsoft.com/office/drawing/2014/main" id="{B4FDD6F6-D4D0-237E-EEB7-9CF90407BFAC}"/>
+                <a16:creationId xmlns:a16="http://schemas.microsoft.com/office/drawing/2014/main" id="{7A502CCF-42F5-FF07-BCFB-923EFEFD30B7}"/>
               </a:ext>
             </a:extLst>
           </p:cNvPr>
@@ -10466,35 +11492,361 @@
             <a:spLocks noGrp="1"/>
           </p:cNvSpPr>
           <p:nvPr>
-            <p:ph type="subTitle" idx="1"/>
-          </p:nvPr>
-        </p:nvSpPr>
-        <p:spPr/>
-        <p:txBody>
-          <a:bodyPr/>
-          <a:lstStyle/>
-          <a:p>
-            <a:endParaRPr lang="cs-CZ"/>
+            <p:ph idx="1"/>
+          </p:nvPr>
+        </p:nvSpPr>
+        <p:spPr>
+          <a:xfrm>
+            <a:off x="818713" y="2413000"/>
+            <a:ext cx="1626037" cy="3632200"/>
+          </a:xfrm>
+        </p:spPr>
+        <p:txBody>
+          <a:bodyPr>
+            <a:noAutofit/>
+          </a:bodyPr>
+          <a:lstStyle/>
+          <a:p>
+            <a:pPr marL="0" indent="0">
+              <a:buNone/>
+            </a:pPr>
+            <a:r>
+              <a:rPr lang="cs-CZ" sz="3200" dirty="0"/>
+              <a:t>A---B</a:t>
+            </a:r>
+          </a:p>
+          <a:p>
+            <a:pPr marL="0" indent="0">
+              <a:buNone/>
+            </a:pPr>
+            <a:r>
+              <a:rPr lang="cs-CZ" sz="3200" dirty="0"/>
+              <a:t>|\  |</a:t>
+            </a:r>
+          </a:p>
+          <a:p>
+            <a:pPr marL="0" indent="0">
+              <a:buNone/>
+            </a:pPr>
+            <a:r>
+              <a:rPr lang="cs-CZ" sz="3200" dirty="0"/>
+              <a:t>| \ |</a:t>
+            </a:r>
+          </a:p>
+          <a:p>
+            <a:pPr marL="0" indent="0">
+              <a:buNone/>
+            </a:pPr>
+            <a:r>
+              <a:rPr lang="cs-CZ" sz="3200" dirty="0"/>
+              <a:t>|  \|</a:t>
+            </a:r>
+          </a:p>
+          <a:p>
+            <a:pPr marL="0" indent="0">
+              <a:buNone/>
+            </a:pPr>
+            <a:r>
+              <a:rPr lang="cs-CZ" sz="3200" dirty="0"/>
+              <a:t>C---D</a:t>
+            </a:r>
+          </a:p>
+          <a:p>
+            <a:endParaRPr lang="cs-CZ" sz="3200" dirty="0"/>
+          </a:p>
+        </p:txBody>
+      </p:sp>
+      <p:sp>
+        <p:nvSpPr>
+          <p:cNvPr id="4" name="Zástupný obsah 2">
+            <a:extLst>
+              <a:ext uri="{FF2B5EF4-FFF2-40B4-BE49-F238E27FC236}">
+                <a16:creationId xmlns:a16="http://schemas.microsoft.com/office/drawing/2014/main" id="{02894309-8876-F40B-782F-99A76937E372}"/>
+              </a:ext>
+            </a:extLst>
+          </p:cNvPr>
+          <p:cNvSpPr txBox="1">
+            <a:spLocks/>
+          </p:cNvSpPr>
+          <p:nvPr/>
+        </p:nvSpPr>
+        <p:spPr>
+          <a:xfrm>
+            <a:off x="2628463" y="1219200"/>
+            <a:ext cx="9360337" cy="3632200"/>
+          </a:xfrm>
+          <a:prstGeom prst="rect">
+            <a:avLst/>
+          </a:prstGeom>
+          <a:effectLst>
+            <a:outerShdw blurRad="50800" dir="14400000">
+              <a:srgbClr val="000000">
+                <a:alpha val="40000"/>
+              </a:srgbClr>
+            </a:outerShdw>
+          </a:effectLst>
+        </p:spPr>
+        <p:txBody>
+          <a:bodyPr vert="horz" lIns="91440" tIns="45720" rIns="91440" bIns="45720" rtlCol="0" anchor="ctr">
+            <a:noAutofit/>
+          </a:bodyPr>
+          <a:lstStyle>
+            <a:lvl1pPr marL="342900" indent="-342900" algn="l" defTabSz="457200" rtl="0" eaLnBrk="1" latinLnBrk="0" hangingPunct="1">
+              <a:spcBef>
+                <a:spcPct val="20000"/>
+              </a:spcBef>
+              <a:spcAft>
+                <a:spcPts val="600"/>
+              </a:spcAft>
+              <a:buClr>
+                <a:schemeClr val="accent1"/>
+              </a:buClr>
+              <a:buFont typeface="Wingdings 2" charset="2"/>
+              <a:buChar char=""/>
+              <a:defRPr sz="1800" kern="1200">
+                <a:solidFill>
+                  <a:schemeClr val="tx1"/>
+                </a:solidFill>
+                <a:latin typeface="+mn-lt"/>
+                <a:ea typeface="+mn-ea"/>
+                <a:cs typeface="+mn-cs"/>
+              </a:defRPr>
+            </a:lvl1pPr>
+            <a:lvl2pPr marL="742950" indent="-285750" algn="l" defTabSz="457200" rtl="0" eaLnBrk="1" latinLnBrk="0" hangingPunct="1">
+              <a:spcBef>
+                <a:spcPct val="20000"/>
+              </a:spcBef>
+              <a:spcAft>
+                <a:spcPts val="600"/>
+              </a:spcAft>
+              <a:buClr>
+                <a:schemeClr val="accent1"/>
+              </a:buClr>
+              <a:buFont typeface="Wingdings 2" charset="2"/>
+              <a:buChar char=""/>
+              <a:defRPr sz="1600" kern="1200">
+                <a:solidFill>
+                  <a:schemeClr val="tx1"/>
+                </a:solidFill>
+                <a:latin typeface="+mn-lt"/>
+                <a:ea typeface="+mn-ea"/>
+                <a:cs typeface="+mn-cs"/>
+              </a:defRPr>
+            </a:lvl2pPr>
+            <a:lvl3pPr marL="1143000" indent="-228600" algn="l" defTabSz="457200" rtl="0" eaLnBrk="1" latinLnBrk="0" hangingPunct="1">
+              <a:spcBef>
+                <a:spcPct val="20000"/>
+              </a:spcBef>
+              <a:spcAft>
+                <a:spcPts val="600"/>
+              </a:spcAft>
+              <a:buClr>
+                <a:schemeClr val="accent1"/>
+              </a:buClr>
+              <a:buFont typeface="Wingdings 2" charset="2"/>
+              <a:buChar char=""/>
+              <a:defRPr sz="1400" kern="1200">
+                <a:solidFill>
+                  <a:schemeClr val="tx1"/>
+                </a:solidFill>
+                <a:latin typeface="+mn-lt"/>
+                <a:ea typeface="+mn-ea"/>
+                <a:cs typeface="+mn-cs"/>
+              </a:defRPr>
+            </a:lvl3pPr>
+            <a:lvl4pPr marL="1600200" indent="-228600" algn="l" defTabSz="457200" rtl="0" eaLnBrk="1" latinLnBrk="0" hangingPunct="1">
+              <a:spcBef>
+                <a:spcPct val="20000"/>
+              </a:spcBef>
+              <a:spcAft>
+                <a:spcPts val="600"/>
+              </a:spcAft>
+              <a:buClr>
+                <a:schemeClr val="accent1"/>
+              </a:buClr>
+              <a:buFont typeface="Wingdings 2" charset="2"/>
+              <a:buChar char=""/>
+              <a:defRPr sz="1200" kern="1200">
+                <a:solidFill>
+                  <a:schemeClr val="tx1"/>
+                </a:solidFill>
+                <a:latin typeface="+mn-lt"/>
+                <a:ea typeface="+mn-ea"/>
+                <a:cs typeface="+mn-cs"/>
+              </a:defRPr>
+            </a:lvl4pPr>
+            <a:lvl5pPr marL="2057400" indent="-228600" algn="l" defTabSz="457200" rtl="0" eaLnBrk="1" latinLnBrk="0" hangingPunct="1">
+              <a:spcBef>
+                <a:spcPct val="20000"/>
+              </a:spcBef>
+              <a:spcAft>
+                <a:spcPts val="600"/>
+              </a:spcAft>
+              <a:buClr>
+                <a:schemeClr val="accent1"/>
+              </a:buClr>
+              <a:buFont typeface="Wingdings 2" charset="2"/>
+              <a:buChar char=""/>
+              <a:defRPr sz="1200" kern="1200">
+                <a:solidFill>
+                  <a:schemeClr val="tx1"/>
+                </a:solidFill>
+                <a:latin typeface="+mn-lt"/>
+                <a:ea typeface="+mn-ea"/>
+                <a:cs typeface="+mn-cs"/>
+              </a:defRPr>
+            </a:lvl5pPr>
+            <a:lvl6pPr marL="2400000" indent="-228600" algn="l" defTabSz="457200" rtl="0" eaLnBrk="1" latinLnBrk="0" hangingPunct="1">
+              <a:spcBef>
+                <a:spcPct val="20000"/>
+              </a:spcBef>
+              <a:spcAft>
+                <a:spcPts val="600"/>
+              </a:spcAft>
+              <a:buClr>
+                <a:schemeClr val="accent1"/>
+              </a:buClr>
+              <a:buFont typeface="Wingdings 2" charset="2"/>
+              <a:buChar char=""/>
+              <a:defRPr sz="1200" kern="1200">
+                <a:solidFill>
+                  <a:schemeClr val="tx1"/>
+                </a:solidFill>
+                <a:latin typeface="+mn-lt"/>
+                <a:ea typeface="+mn-ea"/>
+                <a:cs typeface="+mn-cs"/>
+              </a:defRPr>
+            </a:lvl6pPr>
+            <a:lvl7pPr marL="2800000" indent="-228600" algn="l" defTabSz="457200" rtl="0" eaLnBrk="1" latinLnBrk="0" hangingPunct="1">
+              <a:spcBef>
+                <a:spcPct val="20000"/>
+              </a:spcBef>
+              <a:spcAft>
+                <a:spcPts val="600"/>
+              </a:spcAft>
+              <a:buClr>
+                <a:schemeClr val="accent1"/>
+              </a:buClr>
+              <a:buFont typeface="Wingdings 2" charset="2"/>
+              <a:buChar char=""/>
+              <a:defRPr sz="1200" kern="1200">
+                <a:solidFill>
+                  <a:schemeClr val="tx1"/>
+                </a:solidFill>
+                <a:latin typeface="+mn-lt"/>
+                <a:ea typeface="+mn-ea"/>
+                <a:cs typeface="+mn-cs"/>
+              </a:defRPr>
+            </a:lvl7pPr>
+            <a:lvl8pPr marL="3200000" indent="-228600" algn="l" defTabSz="457200" rtl="0" eaLnBrk="1" latinLnBrk="0" hangingPunct="1">
+              <a:spcBef>
+                <a:spcPct val="20000"/>
+              </a:spcBef>
+              <a:spcAft>
+                <a:spcPts val="600"/>
+              </a:spcAft>
+              <a:buClr>
+                <a:schemeClr val="accent1"/>
+              </a:buClr>
+              <a:buFont typeface="Wingdings 2" charset="2"/>
+              <a:buChar char=""/>
+              <a:defRPr sz="1200" kern="1200">
+                <a:solidFill>
+                  <a:schemeClr val="tx1"/>
+                </a:solidFill>
+                <a:latin typeface="+mn-lt"/>
+                <a:ea typeface="+mn-ea"/>
+                <a:cs typeface="+mn-cs"/>
+              </a:defRPr>
+            </a:lvl8pPr>
+            <a:lvl9pPr marL="3600000" indent="-228600" algn="l" defTabSz="457200" rtl="0" eaLnBrk="1" latinLnBrk="0" hangingPunct="1">
+              <a:spcBef>
+                <a:spcPct val="20000"/>
+              </a:spcBef>
+              <a:spcAft>
+                <a:spcPts val="600"/>
+              </a:spcAft>
+              <a:buClr>
+                <a:schemeClr val="accent1"/>
+              </a:buClr>
+              <a:buFont typeface="Wingdings 2" charset="2"/>
+              <a:buChar char=""/>
+              <a:defRPr sz="1200" kern="1200">
+                <a:solidFill>
+                  <a:schemeClr val="tx1"/>
+                </a:solidFill>
+                <a:latin typeface="+mn-lt"/>
+                <a:ea typeface="+mn-ea"/>
+                <a:cs typeface="+mn-cs"/>
+              </a:defRPr>
+            </a:lvl9pPr>
+          </a:lstStyle>
+          <a:p>
+            <a:r>
+              <a:rPr lang="en-US" sz="3200" dirty="0"/>
+              <a:t> Cesta A-B-C-A je </a:t>
+            </a:r>
+            <a:r>
+              <a:rPr lang="en-US" sz="3200" dirty="0" err="1"/>
+              <a:t>zacyklená</a:t>
+            </a:r>
+            <a:r>
+              <a:rPr lang="en-US" sz="3200" dirty="0"/>
+              <a:t>, </a:t>
+            </a:r>
+            <a:r>
+              <a:rPr lang="en-US" sz="3200" dirty="0" err="1"/>
+              <a:t>jelikož</a:t>
+            </a:r>
+            <a:r>
+              <a:rPr lang="en-US" sz="3200" dirty="0"/>
+              <a:t> </a:t>
+            </a:r>
+            <a:r>
+              <a:rPr lang="en-US" sz="3200" dirty="0" err="1"/>
+              <a:t>začíná</a:t>
+            </a:r>
+            <a:r>
+              <a:rPr lang="en-US" sz="3200" dirty="0"/>
+              <a:t> a </a:t>
+            </a:r>
+            <a:r>
+              <a:rPr lang="en-US" sz="3200" dirty="0" err="1"/>
+              <a:t>končí</a:t>
+            </a:r>
+            <a:r>
+              <a:rPr lang="en-US" sz="3200" dirty="0"/>
+              <a:t> v </a:t>
+            </a:r>
+            <a:r>
+              <a:rPr lang="en-US" sz="3200" dirty="0" err="1"/>
+              <a:t>bodě</a:t>
+            </a:r>
+            <a:r>
+              <a:rPr lang="en-US" sz="3200" dirty="0"/>
+              <a:t> A</a:t>
+            </a:r>
+            <a:endParaRPr lang="cs-CZ" sz="3200" dirty="0"/>
           </a:p>
         </p:txBody>
       </p:sp>
     </p:spTree>
     <p:extLst>
       <p:ext uri="{BB962C8B-B14F-4D97-AF65-F5344CB8AC3E}">
-        <p14:creationId xmlns:p14="http://schemas.microsoft.com/office/powerpoint/2010/main" val="2367948420"/>
+        <p14:creationId xmlns:p14="http://schemas.microsoft.com/office/powerpoint/2010/main" val="2468864024"/>
       </p:ext>
     </p:extLst>
   </p:cSld>
   <p:clrMapOvr>
     <a:masterClrMapping/>
   </p:clrMapOvr>
-  <mc:AlternateContent xmlns:mc="http://schemas.openxmlformats.org/markup-compatibility/2006" xmlns:p159="http://schemas.microsoft.com/office/powerpoint/2015/09/main">
-    <mc:Choice Requires="p159">
+  <mc:AlternateContent xmlns:mc="http://schemas.openxmlformats.org/markup-compatibility/2006">
+    <mc:Choice xmlns:p159="http://schemas.microsoft.com/office/powerpoint/2015/09/main" Requires="p159">
       <p:transition spd="slow">
         <p159:morph option="byObject"/>
       </p:transition>
     </mc:Choice>
-    <mc:Fallback xmlns="">
+    <mc:Fallback>
       <p:transition spd="slow">
         <p:fade/>
       </p:transition>
@@ -10506,14 +11858,6 @@
 <file path=ppt/slides/slide8.xml><?xml version="1.0" encoding="utf-8"?>
 <p:sld xmlns:a="http://schemas.openxmlformats.org/drawingml/2006/main" xmlns:r="http://schemas.openxmlformats.org/officeDocument/2006/relationships" xmlns:p="http://schemas.openxmlformats.org/presentationml/2006/main">
   <p:cSld>
-    <p:bg>
-      <p:bgPr>
-        <a:solidFill>
-          <a:schemeClr val="bg2"/>
-        </a:solidFill>
-        <a:effectLst/>
-      </p:bgPr>
-    </p:bg>
     <p:spTree>
       <p:nvGrpSpPr>
         <p:cNvPr id="1" name=""/>
@@ -10558,70 +11902,34 @@
           <a:p>
             <a:r>
               <a:rPr lang="cs-CZ" dirty="0"/>
-              <a:t>Jarníkův algoritmus</a:t>
-            </a:r>
-          </a:p>
-        </p:txBody>
-      </p:sp>
-      <p:sp>
-        <p:nvSpPr>
-          <p:cNvPr id="3" name="Zástupný obsah 2">
+              <a:t>Borůvkův algoritmus</a:t>
+            </a:r>
+            <a:r>
+              <a:rPr lang="en-US" dirty="0"/>
+              <a:t> – </a:t>
+            </a:r>
+            <a:r>
+              <a:rPr lang="en-US" dirty="0" err="1"/>
+              <a:t>postup</a:t>
+            </a:r>
+            <a:r>
+              <a:rPr lang="en-US" dirty="0"/>
+              <a:t> </a:t>
+            </a:r>
+            <a:r>
+              <a:rPr lang="en-US" dirty="0" err="1"/>
+              <a:t>pseudokód</a:t>
+            </a:r>
+            <a:endParaRPr lang="cs-CZ" dirty="0"/>
+          </a:p>
+        </p:txBody>
+      </p:sp>
+      <p:pic>
+        <p:nvPicPr>
+          <p:cNvPr id="8" name="Obrázek 7">
             <a:extLst>
               <a:ext uri="{FF2B5EF4-FFF2-40B4-BE49-F238E27FC236}">
-                <a16:creationId xmlns:a16="http://schemas.microsoft.com/office/drawing/2014/main" id="{7A502CCF-42F5-FF07-BCFB-923EFEFD30B7}"/>
-              </a:ext>
-            </a:extLst>
-          </p:cNvPr>
-          <p:cNvSpPr>
-            <a:spLocks noGrp="1"/>
-          </p:cNvSpPr>
-          <p:nvPr>
-            <p:ph idx="1"/>
-          </p:nvPr>
-        </p:nvSpPr>
-        <p:spPr>
-          <a:xfrm>
-            <a:off x="818713" y="2413000"/>
-            <a:ext cx="6487434" cy="3632200"/>
-          </a:xfrm>
-        </p:spPr>
-        <p:txBody>
-          <a:bodyPr>
-            <a:normAutofit fontScale="85000" lnSpcReduction="10000"/>
-          </a:bodyPr>
-          <a:lstStyle/>
-          <a:p>
-            <a:r>
-              <a:rPr lang="cs-CZ" sz="3200" dirty="0"/>
-              <a:t> Poprvé popsán roku 1930 v dopisu O. Borůvkovi</a:t>
-            </a:r>
-          </a:p>
-          <a:p>
-            <a:endParaRPr lang="cs-CZ" sz="3200" dirty="0"/>
-          </a:p>
-          <a:p>
-            <a:r>
-              <a:rPr lang="cs-CZ" sz="3200" dirty="0"/>
-              <a:t>Zjednodušená verze Borůvkova algoritmu</a:t>
-            </a:r>
-          </a:p>
-          <a:p>
-            <a:endParaRPr lang="cs-CZ" sz="3200" dirty="0"/>
-          </a:p>
-          <a:p>
-            <a:r>
-              <a:rPr lang="cs-CZ" sz="3200" dirty="0"/>
-              <a:t>V zahraničí prakticky zapomenut</a:t>
-            </a:r>
-          </a:p>
-        </p:txBody>
-      </p:sp>
-      <p:pic>
-        <p:nvPicPr>
-          <p:cNvPr id="5" name="Obrázek 4" descr="Obsah obrázku osoba, klobouk&#10;&#10;Popis byl vytvořen automaticky">
-            <a:extLst>
-              <a:ext uri="{FF2B5EF4-FFF2-40B4-BE49-F238E27FC236}">
-                <a16:creationId xmlns:a16="http://schemas.microsoft.com/office/drawing/2014/main" id="{3F302B17-6E69-67D8-0EEB-C377CCE9A48B}"/>
+                <a16:creationId xmlns:a16="http://schemas.microsoft.com/office/drawing/2014/main" id="{FAD14B50-C1E9-EBB5-71D5-54E2DD16F639}"/>
               </a:ext>
             </a:extLst>
           </p:cNvPr>
@@ -10631,52 +11939,38 @@
           <p:nvPr/>
         </p:nvPicPr>
         <p:blipFill>
-          <a:blip r:embed="rId3">
-            <a:extLst>
-              <a:ext uri="{28A0092B-C50C-407E-A947-70E740481C1C}">
-                <a14:useLocalDpi xmlns:a14="http://schemas.microsoft.com/office/drawing/2010/main" val="0"/>
-              </a:ext>
-            </a:extLst>
-          </a:blip>
+          <a:blip r:embed="rId3"/>
           <a:stretch>
             <a:fillRect/>
           </a:stretch>
         </p:blipFill>
         <p:spPr>
           <a:xfrm>
-            <a:off x="8120958" y="2123967"/>
-            <a:ext cx="3261039" cy="4602374"/>
+            <a:off x="927930" y="1887988"/>
+            <a:ext cx="10085568" cy="4522824"/>
           </a:xfrm>
-          <a:prstGeom prst="roundRect">
-            <a:avLst>
-              <a:gd name="adj" fmla="val 3876"/>
-            </a:avLst>
+          <a:prstGeom prst="rect">
+            <a:avLst/>
           </a:prstGeom>
-          <a:ln>
-            <a:solidFill>
-              <a:schemeClr val="accent1"/>
-            </a:solidFill>
-          </a:ln>
-          <a:effectLst/>
         </p:spPr>
       </p:pic>
     </p:spTree>
     <p:extLst>
       <p:ext uri="{BB962C8B-B14F-4D97-AF65-F5344CB8AC3E}">
-        <p14:creationId xmlns:p14="http://schemas.microsoft.com/office/powerpoint/2010/main" val="2405836106"/>
+        <p14:creationId xmlns:p14="http://schemas.microsoft.com/office/powerpoint/2010/main" val="669422556"/>
       </p:ext>
     </p:extLst>
   </p:cSld>
   <p:clrMapOvr>
     <a:masterClrMapping/>
   </p:clrMapOvr>
-  <mc:AlternateContent xmlns:mc="http://schemas.openxmlformats.org/markup-compatibility/2006" xmlns:p159="http://schemas.microsoft.com/office/powerpoint/2015/09/main">
-    <mc:Choice Requires="p159">
+  <mc:AlternateContent xmlns:mc="http://schemas.openxmlformats.org/markup-compatibility/2006">
+    <mc:Choice xmlns:p159="http://schemas.microsoft.com/office/powerpoint/2015/09/main" Requires="p159">
       <p:transition spd="slow">
         <p159:morph option="byObject"/>
       </p:transition>
     </mc:Choice>
-    <mc:Fallback xmlns="">
+    <mc:Fallback>
       <p:transition spd="slow">
         <p:fade/>
       </p:transition>
@@ -10732,75 +12026,67 @@
           <a:p>
             <a:r>
               <a:rPr lang="cs-CZ" dirty="0"/>
-              <a:t>Jarníkův algoritmus</a:t>
-            </a:r>
-          </a:p>
-        </p:txBody>
-      </p:sp>
-      <p:sp>
-        <p:nvSpPr>
-          <p:cNvPr id="3" name="Zástupný obsah 2">
+              <a:t>Borůvkův algoritmus</a:t>
+            </a:r>
+            <a:r>
+              <a:rPr lang="en-US" dirty="0"/>
+              <a:t> – </a:t>
+            </a:r>
+            <a:r>
+              <a:rPr lang="en-US" dirty="0" err="1"/>
+              <a:t>postup</a:t>
+            </a:r>
+            <a:r>
+              <a:rPr lang="en-US" dirty="0"/>
+              <a:t> </a:t>
+            </a:r>
+            <a:r>
+              <a:rPr lang="en-US" dirty="0" err="1"/>
+              <a:t>vizualizace</a:t>
+            </a:r>
+            <a:endParaRPr lang="cs-CZ" dirty="0"/>
+          </a:p>
+        </p:txBody>
+      </p:sp>
+      <p:pic>
+        <p:nvPicPr>
+          <p:cNvPr id="7" name="Zástupný obsah 6" descr="Obsah obrázku diagram&#10;&#10;Popis byl vytvořen automaticky">
             <a:extLst>
               <a:ext uri="{FF2B5EF4-FFF2-40B4-BE49-F238E27FC236}">
-                <a16:creationId xmlns:a16="http://schemas.microsoft.com/office/drawing/2014/main" id="{7A502CCF-42F5-FF07-BCFB-923EFEFD30B7}"/>
+                <a16:creationId xmlns:a16="http://schemas.microsoft.com/office/drawing/2014/main" id="{FCC2BF2B-43AD-011D-28D9-310B52EC9377}"/>
               </a:ext>
             </a:extLst>
           </p:cNvPr>
-          <p:cNvSpPr>
-            <a:spLocks noGrp="1"/>
-          </p:cNvSpPr>
+          <p:cNvPicPr>
+            <a:picLocks noGrp="1" noChangeAspect="1"/>
+          </p:cNvPicPr>
           <p:nvPr>
             <p:ph idx="1"/>
           </p:nvPr>
-        </p:nvSpPr>
+        </p:nvPicPr>
+        <p:blipFill>
+          <a:blip r:embed="rId3">
+            <a:extLst>
+              <a:ext uri="{28A0092B-C50C-407E-A947-70E740481C1C}">
+                <a14:useLocalDpi xmlns:a14="http://schemas.microsoft.com/office/drawing/2010/main" val="0"/>
+              </a:ext>
+            </a:extLst>
+          </a:blip>
+          <a:stretch>
+            <a:fillRect/>
+          </a:stretch>
+        </p:blipFill>
         <p:spPr>
           <a:xfrm>
-            <a:off x="818713" y="2413000"/>
-            <a:ext cx="10563285" cy="3632200"/>
+            <a:off x="1678535" y="2227152"/>
+            <a:ext cx="8834929" cy="4630848"/>
           </a:xfrm>
         </p:spPr>
-        <p:txBody>
-          <a:bodyPr>
-            <a:noAutofit/>
-          </a:bodyPr>
-          <a:lstStyle/>
-          <a:p>
-            <a:r>
-              <a:rPr lang="cs-CZ" sz="3200" dirty="0"/>
-              <a:t>Princip:</a:t>
-            </a:r>
-          </a:p>
-          <a:p>
-            <a:pPr lvl="1"/>
-            <a:r>
-              <a:rPr lang="cs-CZ" sz="3000" dirty="0"/>
-              <a:t>Najdi nejlevnější nenavštívenou cestu a označ počátek i konec za navštívené</a:t>
-            </a:r>
-          </a:p>
-          <a:p>
-            <a:pPr lvl="1"/>
-            <a:r>
-              <a:rPr lang="cs-CZ" sz="3000" dirty="0"/>
-              <a:t>Přidej nejlevnější nalezenou cestu do minimální kostry</a:t>
-            </a:r>
-          </a:p>
-          <a:p>
-            <a:pPr lvl="1"/>
-            <a:r>
-              <a:rPr lang="cs-CZ" sz="3000" dirty="0"/>
-              <a:t>Opakuj dokud nenavštívíš všechny body</a:t>
-            </a:r>
-          </a:p>
-          <a:p>
-            <a:pPr lvl="1"/>
-            <a:endParaRPr lang="cs-CZ" sz="3000" dirty="0"/>
-          </a:p>
-        </p:txBody>
-      </p:sp>
+      </p:pic>
     </p:spTree>
     <p:extLst>
       <p:ext uri="{BB962C8B-B14F-4D97-AF65-F5344CB8AC3E}">
-        <p14:creationId xmlns:p14="http://schemas.microsoft.com/office/powerpoint/2010/main" val="3670569241"/>
+        <p14:creationId xmlns:p14="http://schemas.microsoft.com/office/powerpoint/2010/main" val="689638914"/>
       </p:ext>
     </p:extLst>
   </p:cSld>

</xml_diff>